<commit_message>
add merge add file directory
</commit_message>
<xml_diff>
--- a/src/main/resources/templates/report.pptx
+++ b/src/main/resources/templates/report.pptx
@@ -4,6 +4,9 @@
   <p:sldMasterIdLst>
     <p:sldMasterId id="2147483660" r:id="rId1"/>
   </p:sldMasterIdLst>
+  <p:notesMasterIdLst>
+    <p:notesMasterId r:id="rId3"/>
+  </p:notesMasterIdLst>
   <p:sldIdLst>
     <p:sldId id="256" r:id="rId2"/>
   </p:sldIdLst>
@@ -110,6 +113,442 @@
     </p:ext>
   </p:extLst>
 </p:presentation>
+</file>
+
+<file path=ppt/notesMasters/notesMaster1.xml><?xml version="1.0" encoding="utf-8"?>
+<p:notesMaster xmlns:a="http://schemas.openxmlformats.org/drawingml/2006/main" xmlns:r="http://schemas.openxmlformats.org/officeDocument/2006/relationships" xmlns:p="http://schemas.openxmlformats.org/presentationml/2006/main">
+  <p:cSld>
+    <p:bg>
+      <p:bgRef idx="1001">
+        <a:schemeClr val="bg1"/>
+      </p:bgRef>
+    </p:bg>
+    <p:spTree>
+      <p:nvGrpSpPr>
+        <p:cNvPr id="1" name=""/>
+        <p:cNvGrpSpPr/>
+        <p:nvPr/>
+      </p:nvGrpSpPr>
+      <p:grpSpPr>
+        <a:xfrm>
+          <a:off x="0" y="0"/>
+          <a:ext cx="0" cy="0"/>
+          <a:chOff x="0" y="0"/>
+          <a:chExt cx="0" cy="0"/>
+        </a:xfrm>
+      </p:grpSpPr>
+      <p:sp>
+        <p:nvSpPr>
+          <p:cNvPr id="2" name="Верхний колонтитул 1"/>
+          <p:cNvSpPr>
+            <a:spLocks noGrp="1"/>
+          </p:cNvSpPr>
+          <p:nvPr>
+            <p:ph type="hdr" sz="quarter"/>
+          </p:nvPr>
+        </p:nvSpPr>
+        <p:spPr>
+          <a:xfrm>
+            <a:off x="0" y="0"/>
+            <a:ext cx="2971800" cy="458788"/>
+          </a:xfrm>
+          <a:prstGeom prst="rect">
+            <a:avLst/>
+          </a:prstGeom>
+        </p:spPr>
+        <p:txBody>
+          <a:bodyPr vert="horz" lIns="91440" tIns="45720" rIns="91440" bIns="45720" rtlCol="0"/>
+          <a:lstStyle>
+            <a:lvl1pPr algn="l">
+              <a:defRPr sz="1200"/>
+            </a:lvl1pPr>
+          </a:lstStyle>
+          <a:p>
+            <a:endParaRPr lang="ru-RU"/>
+          </a:p>
+        </p:txBody>
+      </p:sp>
+      <p:sp>
+        <p:nvSpPr>
+          <p:cNvPr id="3" name="Дата 2"/>
+          <p:cNvSpPr>
+            <a:spLocks noGrp="1"/>
+          </p:cNvSpPr>
+          <p:nvPr>
+            <p:ph type="dt" idx="1"/>
+          </p:nvPr>
+        </p:nvSpPr>
+        <p:spPr>
+          <a:xfrm>
+            <a:off x="3884613" y="0"/>
+            <a:ext cx="2971800" cy="458788"/>
+          </a:xfrm>
+          <a:prstGeom prst="rect">
+            <a:avLst/>
+          </a:prstGeom>
+        </p:spPr>
+        <p:txBody>
+          <a:bodyPr vert="horz" lIns="91440" tIns="45720" rIns="91440" bIns="45720" rtlCol="0"/>
+          <a:lstStyle>
+            <a:lvl1pPr algn="r">
+              <a:defRPr sz="1200"/>
+            </a:lvl1pPr>
+          </a:lstStyle>
+          <a:p>
+            <a:fld id="{8C51F99D-5886-4972-8F28-1BFBC160FA28}" type="datetimeFigureOut">
+              <a:rPr lang="ru-RU" smtClean="0"/>
+              <a:t>04.04.2018</a:t>
+            </a:fld>
+            <a:endParaRPr lang="ru-RU"/>
+          </a:p>
+        </p:txBody>
+      </p:sp>
+      <p:sp>
+        <p:nvSpPr>
+          <p:cNvPr id="4" name="Образ слайда 3"/>
+          <p:cNvSpPr>
+            <a:spLocks noGrp="1" noRot="1" noChangeAspect="1"/>
+          </p:cNvSpPr>
+          <p:nvPr>
+            <p:ph type="sldImg" idx="2"/>
+          </p:nvPr>
+        </p:nvSpPr>
+        <p:spPr>
+          <a:xfrm>
+            <a:off x="1371600" y="1143000"/>
+            <a:ext cx="4114800" cy="3086100"/>
+          </a:xfrm>
+          <a:prstGeom prst="rect">
+            <a:avLst/>
+          </a:prstGeom>
+          <a:noFill/>
+          <a:ln w="12700">
+            <a:solidFill>
+              <a:prstClr val="black"/>
+            </a:solidFill>
+          </a:ln>
+        </p:spPr>
+        <p:txBody>
+          <a:bodyPr vert="horz" lIns="91440" tIns="45720" rIns="91440" bIns="45720" rtlCol="0" anchor="ctr"/>
+          <a:lstStyle/>
+          <a:p>
+            <a:endParaRPr lang="ru-RU"/>
+          </a:p>
+        </p:txBody>
+      </p:sp>
+      <p:sp>
+        <p:nvSpPr>
+          <p:cNvPr id="5" name="Заметки 4"/>
+          <p:cNvSpPr>
+            <a:spLocks noGrp="1"/>
+          </p:cNvSpPr>
+          <p:nvPr>
+            <p:ph type="body" sz="quarter" idx="3"/>
+          </p:nvPr>
+        </p:nvSpPr>
+        <p:spPr>
+          <a:xfrm>
+            <a:off x="685800" y="4400550"/>
+            <a:ext cx="5486400" cy="3600450"/>
+          </a:xfrm>
+          <a:prstGeom prst="rect">
+            <a:avLst/>
+          </a:prstGeom>
+        </p:spPr>
+        <p:txBody>
+          <a:bodyPr vert="horz" lIns="91440" tIns="45720" rIns="91440" bIns="45720" rtlCol="0"/>
+          <a:lstStyle/>
+          <a:p>
+            <a:pPr lvl="0"/>
+            <a:r>
+              <a:rPr lang="ru-RU" smtClean="0"/>
+              <a:t>Образец текста</a:t>
+            </a:r>
+          </a:p>
+          <a:p>
+            <a:pPr lvl="1"/>
+            <a:r>
+              <a:rPr lang="ru-RU" smtClean="0"/>
+              <a:t>Второй уровень</a:t>
+            </a:r>
+          </a:p>
+          <a:p>
+            <a:pPr lvl="2"/>
+            <a:r>
+              <a:rPr lang="ru-RU" smtClean="0"/>
+              <a:t>Третий уровень</a:t>
+            </a:r>
+          </a:p>
+          <a:p>
+            <a:pPr lvl="3"/>
+            <a:r>
+              <a:rPr lang="ru-RU" smtClean="0"/>
+              <a:t>Четвертый уровень</a:t>
+            </a:r>
+          </a:p>
+          <a:p>
+            <a:pPr lvl="4"/>
+            <a:r>
+              <a:rPr lang="ru-RU" smtClean="0"/>
+              <a:t>Пятый уровень</a:t>
+            </a:r>
+            <a:endParaRPr lang="ru-RU"/>
+          </a:p>
+        </p:txBody>
+      </p:sp>
+      <p:sp>
+        <p:nvSpPr>
+          <p:cNvPr id="6" name="Нижний колонтитул 5"/>
+          <p:cNvSpPr>
+            <a:spLocks noGrp="1"/>
+          </p:cNvSpPr>
+          <p:nvPr>
+            <p:ph type="ftr" sz="quarter" idx="4"/>
+          </p:nvPr>
+        </p:nvSpPr>
+        <p:spPr>
+          <a:xfrm>
+            <a:off x="0" y="8685213"/>
+            <a:ext cx="2971800" cy="458787"/>
+          </a:xfrm>
+          <a:prstGeom prst="rect">
+            <a:avLst/>
+          </a:prstGeom>
+        </p:spPr>
+        <p:txBody>
+          <a:bodyPr vert="horz" lIns="91440" tIns="45720" rIns="91440" bIns="45720" rtlCol="0" anchor="b"/>
+          <a:lstStyle>
+            <a:lvl1pPr algn="l">
+              <a:defRPr sz="1200"/>
+            </a:lvl1pPr>
+          </a:lstStyle>
+          <a:p>
+            <a:endParaRPr lang="ru-RU"/>
+          </a:p>
+        </p:txBody>
+      </p:sp>
+      <p:sp>
+        <p:nvSpPr>
+          <p:cNvPr id="7" name="Номер слайда 6"/>
+          <p:cNvSpPr>
+            <a:spLocks noGrp="1"/>
+          </p:cNvSpPr>
+          <p:nvPr>
+            <p:ph type="sldNum" sz="quarter" idx="5"/>
+          </p:nvPr>
+        </p:nvSpPr>
+        <p:spPr>
+          <a:xfrm>
+            <a:off x="3884613" y="8685213"/>
+            <a:ext cx="2971800" cy="458787"/>
+          </a:xfrm>
+          <a:prstGeom prst="rect">
+            <a:avLst/>
+          </a:prstGeom>
+        </p:spPr>
+        <p:txBody>
+          <a:bodyPr vert="horz" lIns="91440" tIns="45720" rIns="91440" bIns="45720" rtlCol="0" anchor="b"/>
+          <a:lstStyle>
+            <a:lvl1pPr algn="r">
+              <a:defRPr sz="1200"/>
+            </a:lvl1pPr>
+          </a:lstStyle>
+          <a:p>
+            <a:fld id="{9C1BA69A-C89D-4483-869B-988C5B028F3F}" type="slidenum">
+              <a:rPr lang="ru-RU" smtClean="0"/>
+              <a:t>‹#›</a:t>
+            </a:fld>
+            <a:endParaRPr lang="ru-RU"/>
+          </a:p>
+        </p:txBody>
+      </p:sp>
+    </p:spTree>
+    <p:extLst>
+      <p:ext uri="{BB962C8B-B14F-4D97-AF65-F5344CB8AC3E}">
+        <p14:creationId xmlns:p14="http://schemas.microsoft.com/office/powerpoint/2010/main" val="1497136680"/>
+      </p:ext>
+    </p:extLst>
+  </p:cSld>
+  <p:clrMap bg1="lt1" tx1="dk1" bg2="lt2" tx2="dk2" accent1="accent1" accent2="accent2" accent3="accent3" accent4="accent4" accent5="accent5" accent6="accent6" hlink="hlink" folHlink="folHlink"/>
+  <p:notesStyle>
+    <a:lvl1pPr marL="0" algn="l" defTabSz="914400" rtl="0" eaLnBrk="1" latinLnBrk="0" hangingPunct="1">
+      <a:defRPr sz="1200" kern="1200">
+        <a:solidFill>
+          <a:schemeClr val="tx1"/>
+        </a:solidFill>
+        <a:latin typeface="+mn-lt"/>
+        <a:ea typeface="+mn-ea"/>
+        <a:cs typeface="+mn-cs"/>
+      </a:defRPr>
+    </a:lvl1pPr>
+    <a:lvl2pPr marL="457200" algn="l" defTabSz="914400" rtl="0" eaLnBrk="1" latinLnBrk="0" hangingPunct="1">
+      <a:defRPr sz="1200" kern="1200">
+        <a:solidFill>
+          <a:schemeClr val="tx1"/>
+        </a:solidFill>
+        <a:latin typeface="+mn-lt"/>
+        <a:ea typeface="+mn-ea"/>
+        <a:cs typeface="+mn-cs"/>
+      </a:defRPr>
+    </a:lvl2pPr>
+    <a:lvl3pPr marL="914400" algn="l" defTabSz="914400" rtl="0" eaLnBrk="1" latinLnBrk="0" hangingPunct="1">
+      <a:defRPr sz="1200" kern="1200">
+        <a:solidFill>
+          <a:schemeClr val="tx1"/>
+        </a:solidFill>
+        <a:latin typeface="+mn-lt"/>
+        <a:ea typeface="+mn-ea"/>
+        <a:cs typeface="+mn-cs"/>
+      </a:defRPr>
+    </a:lvl3pPr>
+    <a:lvl4pPr marL="1371600" algn="l" defTabSz="914400" rtl="0" eaLnBrk="1" latinLnBrk="0" hangingPunct="1">
+      <a:defRPr sz="1200" kern="1200">
+        <a:solidFill>
+          <a:schemeClr val="tx1"/>
+        </a:solidFill>
+        <a:latin typeface="+mn-lt"/>
+        <a:ea typeface="+mn-ea"/>
+        <a:cs typeface="+mn-cs"/>
+      </a:defRPr>
+    </a:lvl4pPr>
+    <a:lvl5pPr marL="1828800" algn="l" defTabSz="914400" rtl="0" eaLnBrk="1" latinLnBrk="0" hangingPunct="1">
+      <a:defRPr sz="1200" kern="1200">
+        <a:solidFill>
+          <a:schemeClr val="tx1"/>
+        </a:solidFill>
+        <a:latin typeface="+mn-lt"/>
+        <a:ea typeface="+mn-ea"/>
+        <a:cs typeface="+mn-cs"/>
+      </a:defRPr>
+    </a:lvl5pPr>
+    <a:lvl6pPr marL="2286000" algn="l" defTabSz="914400" rtl="0" eaLnBrk="1" latinLnBrk="0" hangingPunct="1">
+      <a:defRPr sz="1200" kern="1200">
+        <a:solidFill>
+          <a:schemeClr val="tx1"/>
+        </a:solidFill>
+        <a:latin typeface="+mn-lt"/>
+        <a:ea typeface="+mn-ea"/>
+        <a:cs typeface="+mn-cs"/>
+      </a:defRPr>
+    </a:lvl6pPr>
+    <a:lvl7pPr marL="2743200" algn="l" defTabSz="914400" rtl="0" eaLnBrk="1" latinLnBrk="0" hangingPunct="1">
+      <a:defRPr sz="1200" kern="1200">
+        <a:solidFill>
+          <a:schemeClr val="tx1"/>
+        </a:solidFill>
+        <a:latin typeface="+mn-lt"/>
+        <a:ea typeface="+mn-ea"/>
+        <a:cs typeface="+mn-cs"/>
+      </a:defRPr>
+    </a:lvl7pPr>
+    <a:lvl8pPr marL="3200400" algn="l" defTabSz="914400" rtl="0" eaLnBrk="1" latinLnBrk="0" hangingPunct="1">
+      <a:defRPr sz="1200" kern="1200">
+        <a:solidFill>
+          <a:schemeClr val="tx1"/>
+        </a:solidFill>
+        <a:latin typeface="+mn-lt"/>
+        <a:ea typeface="+mn-ea"/>
+        <a:cs typeface="+mn-cs"/>
+      </a:defRPr>
+    </a:lvl8pPr>
+    <a:lvl9pPr marL="3657600" algn="l" defTabSz="914400" rtl="0" eaLnBrk="1" latinLnBrk="0" hangingPunct="1">
+      <a:defRPr sz="1200" kern="1200">
+        <a:solidFill>
+          <a:schemeClr val="tx1"/>
+        </a:solidFill>
+        <a:latin typeface="+mn-lt"/>
+        <a:ea typeface="+mn-ea"/>
+        <a:cs typeface="+mn-cs"/>
+      </a:defRPr>
+    </a:lvl9pPr>
+  </p:notesStyle>
+</p:notesMaster>
+</file>
+
+<file path=ppt/notesSlides/notesSlide1.xml><?xml version="1.0" encoding="utf-8"?>
+<p:notes xmlns:a="http://schemas.openxmlformats.org/drawingml/2006/main" xmlns:r="http://schemas.openxmlformats.org/officeDocument/2006/relationships" xmlns:p="http://schemas.openxmlformats.org/presentationml/2006/main">
+  <p:cSld>
+    <p:spTree>
+      <p:nvGrpSpPr>
+        <p:cNvPr id="1" name=""/>
+        <p:cNvGrpSpPr/>
+        <p:nvPr/>
+      </p:nvGrpSpPr>
+      <p:grpSpPr>
+        <a:xfrm>
+          <a:off x="0" y="0"/>
+          <a:ext cx="0" cy="0"/>
+          <a:chOff x="0" y="0"/>
+          <a:chExt cx="0" cy="0"/>
+        </a:xfrm>
+      </p:grpSpPr>
+      <p:sp>
+        <p:nvSpPr>
+          <p:cNvPr id="2" name="Образ слайда 1"/>
+          <p:cNvSpPr>
+            <a:spLocks noGrp="1" noRot="1" noChangeAspect="1"/>
+          </p:cNvSpPr>
+          <p:nvPr>
+            <p:ph type="sldImg"/>
+          </p:nvPr>
+        </p:nvSpPr>
+        <p:spPr/>
+      </p:sp>
+      <p:sp>
+        <p:nvSpPr>
+          <p:cNvPr id="3" name="Заметки 2"/>
+          <p:cNvSpPr>
+            <a:spLocks noGrp="1"/>
+          </p:cNvSpPr>
+          <p:nvPr>
+            <p:ph type="body" idx="1"/>
+          </p:nvPr>
+        </p:nvSpPr>
+        <p:spPr/>
+        <p:txBody>
+          <a:bodyPr/>
+          <a:lstStyle/>
+          <a:p>
+            <a:endParaRPr lang="ru-RU" sz="1000" baseline="0" dirty="0">
+              <a:latin typeface="Times New Roman" panose="02020603050405020304" pitchFamily="18" charset="0"/>
+            </a:endParaRPr>
+          </a:p>
+        </p:txBody>
+      </p:sp>
+      <p:sp>
+        <p:nvSpPr>
+          <p:cNvPr id="4" name="Номер слайда 3"/>
+          <p:cNvSpPr>
+            <a:spLocks noGrp="1"/>
+          </p:cNvSpPr>
+          <p:nvPr>
+            <p:ph type="sldNum" sz="quarter" idx="10"/>
+          </p:nvPr>
+        </p:nvSpPr>
+        <p:spPr/>
+        <p:txBody>
+          <a:bodyPr/>
+          <a:lstStyle/>
+          <a:p>
+            <a:fld id="{9C1BA69A-C89D-4483-869B-988C5B028F3F}" type="slidenum">
+              <a:rPr lang="ru-RU" smtClean="0"/>
+              <a:t>1</a:t>
+            </a:fld>
+            <a:endParaRPr lang="ru-RU"/>
+          </a:p>
+        </p:txBody>
+      </p:sp>
+    </p:spTree>
+    <p:extLst>
+      <p:ext uri="{BB962C8B-B14F-4D97-AF65-F5344CB8AC3E}">
+        <p14:creationId xmlns:p14="http://schemas.microsoft.com/office/powerpoint/2010/main" val="76383810"/>
+      </p:ext>
+    </p:extLst>
+  </p:cSld>
+  <p:clrMapOvr>
+    <a:masterClrMapping/>
+  </p:clrMapOvr>
+</p:notes>
 </file>
 
 <file path=ppt/slideLayouts/slideLayout1.xml><?xml version="1.0" encoding="utf-8"?>
@@ -243,7 +682,7 @@
           <a:p>
             <a:fld id="{7F4954BA-B241-4C48-A9A9-A8072D854C54}" type="datetimeFigureOut">
               <a:rPr lang="ru-RU" smtClean="0"/>
-              <a:t>28.03.2018</a:t>
+              <a:t>04.04.2018</a:t>
             </a:fld>
             <a:endParaRPr lang="ru-RU"/>
           </a:p>
@@ -413,7 +852,7 @@
           <a:p>
             <a:fld id="{7F4954BA-B241-4C48-A9A9-A8072D854C54}" type="datetimeFigureOut">
               <a:rPr lang="ru-RU" smtClean="0"/>
-              <a:t>28.03.2018</a:t>
+              <a:t>04.04.2018</a:t>
             </a:fld>
             <a:endParaRPr lang="ru-RU"/>
           </a:p>
@@ -593,7 +1032,7 @@
           <a:p>
             <a:fld id="{7F4954BA-B241-4C48-A9A9-A8072D854C54}" type="datetimeFigureOut">
               <a:rPr lang="ru-RU" smtClean="0"/>
-              <a:t>28.03.2018</a:t>
+              <a:t>04.04.2018</a:t>
             </a:fld>
             <a:endParaRPr lang="ru-RU"/>
           </a:p>
@@ -763,7 +1202,7 @@
           <a:p>
             <a:fld id="{7F4954BA-B241-4C48-A9A9-A8072D854C54}" type="datetimeFigureOut">
               <a:rPr lang="ru-RU" smtClean="0"/>
-              <a:t>28.03.2018</a:t>
+              <a:t>04.04.2018</a:t>
             </a:fld>
             <a:endParaRPr lang="ru-RU"/>
           </a:p>
@@ -1007,7 +1446,7 @@
           <a:p>
             <a:fld id="{7F4954BA-B241-4C48-A9A9-A8072D854C54}" type="datetimeFigureOut">
               <a:rPr lang="ru-RU" smtClean="0"/>
-              <a:t>28.03.2018</a:t>
+              <a:t>04.04.2018</a:t>
             </a:fld>
             <a:endParaRPr lang="ru-RU"/>
           </a:p>
@@ -1239,7 +1678,7 @@
           <a:p>
             <a:fld id="{7F4954BA-B241-4C48-A9A9-A8072D854C54}" type="datetimeFigureOut">
               <a:rPr lang="ru-RU" smtClean="0"/>
-              <a:t>28.03.2018</a:t>
+              <a:t>04.04.2018</a:t>
             </a:fld>
             <a:endParaRPr lang="ru-RU"/>
           </a:p>
@@ -1606,7 +2045,7 @@
           <a:p>
             <a:fld id="{7F4954BA-B241-4C48-A9A9-A8072D854C54}" type="datetimeFigureOut">
               <a:rPr lang="ru-RU" smtClean="0"/>
-              <a:t>28.03.2018</a:t>
+              <a:t>04.04.2018</a:t>
             </a:fld>
             <a:endParaRPr lang="ru-RU"/>
           </a:p>
@@ -1724,7 +2163,7 @@
           <a:p>
             <a:fld id="{7F4954BA-B241-4C48-A9A9-A8072D854C54}" type="datetimeFigureOut">
               <a:rPr lang="ru-RU" smtClean="0"/>
-              <a:t>28.03.2018</a:t>
+              <a:t>04.04.2018</a:t>
             </a:fld>
             <a:endParaRPr lang="ru-RU"/>
           </a:p>
@@ -1819,7 +2258,7 @@
           <a:p>
             <a:fld id="{7F4954BA-B241-4C48-A9A9-A8072D854C54}" type="datetimeFigureOut">
               <a:rPr lang="ru-RU" smtClean="0"/>
-              <a:t>28.03.2018</a:t>
+              <a:t>04.04.2018</a:t>
             </a:fld>
             <a:endParaRPr lang="ru-RU"/>
           </a:p>
@@ -2096,7 +2535,7 @@
           <a:p>
             <a:fld id="{7F4954BA-B241-4C48-A9A9-A8072D854C54}" type="datetimeFigureOut">
               <a:rPr lang="ru-RU" smtClean="0"/>
-              <a:t>28.03.2018</a:t>
+              <a:t>04.04.2018</a:t>
             </a:fld>
             <a:endParaRPr lang="ru-RU"/>
           </a:p>
@@ -2353,7 +2792,7 @@
           <a:p>
             <a:fld id="{7F4954BA-B241-4C48-A9A9-A8072D854C54}" type="datetimeFigureOut">
               <a:rPr lang="ru-RU" smtClean="0"/>
-              <a:t>28.03.2018</a:t>
+              <a:t>04.04.2018</a:t>
             </a:fld>
             <a:endParaRPr lang="ru-RU"/>
           </a:p>
@@ -2566,7 +3005,7 @@
           <a:p>
             <a:fld id="{7F4954BA-B241-4C48-A9A9-A8072D854C54}" type="datetimeFigureOut">
               <a:rPr lang="ru-RU" smtClean="0"/>
-              <a:t>28.03.2018</a:t>
+              <a:t>04.04.2018</a:t>
             </a:fld>
             <a:endParaRPr lang="ru-RU"/>
           </a:p>
@@ -2981,7 +3420,7 @@
         </p:nvSpPr>
         <p:spPr bwMode="auto">
           <a:xfrm>
-            <a:off x="452885" y="425854"/>
+            <a:off x="590840" y="70681"/>
             <a:ext cx="5206738" cy="184666"/>
           </a:xfrm>
           <a:prstGeom prst="rect">
@@ -3133,14 +3572,14 @@
           <p:nvPr>
             <p:extLst>
               <p:ext uri="{D42A27DB-BD31-4B8C-83A1-F6EECF244321}">
-                <p14:modId xmlns:p14="http://schemas.microsoft.com/office/powerpoint/2010/main" val="3074989525"/>
+                <p14:modId xmlns:p14="http://schemas.microsoft.com/office/powerpoint/2010/main" val="920668375"/>
               </p:ext>
             </p:extLst>
           </p:nvPr>
         </p:nvGraphicFramePr>
         <p:xfrm>
-          <a:off x="104274" y="720687"/>
-          <a:ext cx="5768328" cy="1598620"/>
+          <a:off x="66789" y="255347"/>
+          <a:ext cx="5768330" cy="1348327"/>
         </p:xfrm>
         <a:graphic>
           <a:graphicData uri="http://schemas.openxmlformats.org/drawingml/2006/table">
@@ -3152,33 +3591,33 @@
                 <a:gridCol w="309908">
                   <a:extLst>
                     <a:ext uri="{9D8B030D-6E8A-4147-A177-3AD203B41FA5}">
-                      <a16:colId xmlns="" xmlns:a16="http://schemas.microsoft.com/office/drawing/2014/main" val="20000"/>
+                      <a16:colId xmlns:a16="http://schemas.microsoft.com/office/drawing/2014/main" xmlns="" val="20000"/>
                     </a:ext>
                   </a:extLst>
                 </a:gridCol>
                 <a:gridCol w="1674165">
                   <a:extLst>
                     <a:ext uri="{9D8B030D-6E8A-4147-A177-3AD203B41FA5}">
-                      <a16:colId xmlns="" xmlns:a16="http://schemas.microsoft.com/office/drawing/2014/main" val="20001"/>
+                      <a16:colId xmlns:a16="http://schemas.microsoft.com/office/drawing/2014/main" xmlns="" val="20001"/>
                     </a:ext>
                   </a:extLst>
                 </a:gridCol>
-                <a:gridCol w="2484850">
+                <a:gridCol w="2484851">
                   <a:extLst>
                     <a:ext uri="{9D8B030D-6E8A-4147-A177-3AD203B41FA5}">
-                      <a16:colId xmlns="" xmlns:a16="http://schemas.microsoft.com/office/drawing/2014/main" val="20002"/>
+                      <a16:colId xmlns:a16="http://schemas.microsoft.com/office/drawing/2014/main" xmlns="" val="20002"/>
                     </a:ext>
                   </a:extLst>
                 </a:gridCol>
-                <a:gridCol w="1299405">
+                <a:gridCol w="1299406">
                   <a:extLst>
                     <a:ext uri="{9D8B030D-6E8A-4147-A177-3AD203B41FA5}">
-                      <a16:colId xmlns="" xmlns:a16="http://schemas.microsoft.com/office/drawing/2014/main" val="20003"/>
+                      <a16:colId xmlns:a16="http://schemas.microsoft.com/office/drawing/2014/main" xmlns="" val="20003"/>
                     </a:ext>
                   </a:extLst>
                 </a:gridCol>
               </a:tblGrid>
-              <a:tr h="143122">
+              <a:tr h="144116">
                 <a:tc>
                   <a:txBody>
                     <a:bodyPr/>
@@ -3193,21 +3632,21 @@
                         </a:spcAft>
                       </a:pPr>
                       <a:r>
-                        <a:rPr lang="ru-RU" sz="900" kern="1200" dirty="0">
+                        <a:rPr lang="ru-RU" sz="800" kern="1200" dirty="0">
                           <a:solidFill>
                             <a:schemeClr val="tx1"/>
                           </a:solidFill>
                           <a:effectLst/>
-                          <a:latin typeface="+mn-lt"/>
+                          <a:latin typeface="Times New Roman" panose="02020603050405020304" pitchFamily="18" charset="0"/>
                         </a:rPr>
                         <a:t>№ п/п</a:t>
                       </a:r>
-                      <a:endParaRPr lang="ru-RU" sz="900" dirty="0">
+                      <a:endParaRPr lang="ru-RU" sz="800" dirty="0">
                         <a:solidFill>
                           <a:schemeClr val="tx1"/>
                         </a:solidFill>
                         <a:effectLst/>
-                        <a:latin typeface="+mn-lt"/>
+                        <a:latin typeface="Times New Roman" panose="02020603050405020304" pitchFamily="18" charset="0"/>
                         <a:ea typeface="Times New Roman" panose="02020603050405020304" pitchFamily="18" charset="0"/>
                         <a:cs typeface="Times New Roman" panose="02020603050405020304" pitchFamily="18" charset="0"/>
                       </a:endParaRPr>
@@ -3279,35 +3718,35 @@
                         </a:spcAft>
                       </a:pPr>
                       <a:r>
-                        <a:rPr lang="ru-RU" sz="900" kern="1200" dirty="0" smtClean="0">
+                        <a:rPr lang="ru-RU" sz="800" kern="1200" dirty="0" smtClean="0">
                           <a:solidFill>
                             <a:schemeClr val="tx1"/>
                           </a:solidFill>
                           <a:effectLst/>
-                          <a:latin typeface="+mn-lt"/>
+                          <a:latin typeface="Times New Roman" panose="02020603050405020304" pitchFamily="18" charset="0"/>
                           <a:ea typeface="+mn-ea"/>
                           <a:cs typeface="+mn-cs"/>
                         </a:rPr>
                         <a:t>Адрес</a:t>
                       </a:r>
                       <a:r>
-                        <a:rPr lang="ru-RU" sz="900" kern="1200" baseline="0" dirty="0" smtClean="0">
+                        <a:rPr lang="ru-RU" sz="800" kern="1200" baseline="0" dirty="0" smtClean="0">
                           <a:solidFill>
                             <a:schemeClr val="tx1"/>
                           </a:solidFill>
                           <a:effectLst/>
-                          <a:latin typeface="+mn-lt"/>
+                          <a:latin typeface="Times New Roman" panose="02020603050405020304" pitchFamily="18" charset="0"/>
                           <a:ea typeface="+mn-ea"/>
                           <a:cs typeface="+mn-cs"/>
                         </a:rPr>
                         <a:t> по списку</a:t>
                       </a:r>
-                      <a:endParaRPr lang="ru-RU" sz="900" dirty="0">
+                      <a:endParaRPr lang="ru-RU" sz="800" dirty="0">
                         <a:solidFill>
                           <a:schemeClr val="tx1"/>
                         </a:solidFill>
                         <a:effectLst/>
-                        <a:latin typeface="+mn-lt"/>
+                        <a:latin typeface="Times New Roman" panose="02020603050405020304" pitchFamily="18" charset="0"/>
                         <a:ea typeface="Times New Roman" panose="02020603050405020304" pitchFamily="18" charset="0"/>
                         <a:cs typeface="Times New Roman" panose="02020603050405020304" pitchFamily="18" charset="0"/>
                       </a:endParaRPr>
@@ -3379,21 +3818,21 @@
                         </a:spcAft>
                       </a:pPr>
                       <a:r>
-                        <a:rPr lang="ru-RU" sz="900" kern="1200" dirty="0" smtClean="0">
+                        <a:rPr lang="ru-RU" sz="800" kern="1200" dirty="0" smtClean="0">
                           <a:solidFill>
                             <a:schemeClr val="tx1"/>
                           </a:solidFill>
                           <a:effectLst/>
-                          <a:latin typeface="+mn-lt"/>
+                          <a:latin typeface="Times New Roman" panose="02020603050405020304" pitchFamily="18" charset="0"/>
                         </a:rPr>
                         <a:t>Собственник</a:t>
                       </a:r>
-                      <a:endParaRPr lang="ru-RU" sz="900" dirty="0">
+                      <a:endParaRPr lang="ru-RU" sz="800" dirty="0">
                         <a:solidFill>
                           <a:schemeClr val="tx1"/>
                         </a:solidFill>
                         <a:effectLst/>
-                        <a:latin typeface="+mn-lt"/>
+                        <a:latin typeface="Times New Roman" panose="02020603050405020304" pitchFamily="18" charset="0"/>
                         <a:ea typeface="Times New Roman" panose="02020603050405020304" pitchFamily="18" charset="0"/>
                         <a:cs typeface="Times New Roman" panose="02020603050405020304" pitchFamily="18" charset="0"/>
                       </a:endParaRPr>
@@ -3465,7 +3904,7 @@
                         </a:spcAft>
                       </a:pPr>
                       <a:r>
-                        <a:rPr lang="ru-RU" sz="1000" kern="1200" dirty="0" smtClean="0">
+                        <a:rPr lang="ru-RU" sz="800" kern="1200" dirty="0" smtClean="0">
                           <a:solidFill>
                             <a:schemeClr val="tx1"/>
                           </a:solidFill>
@@ -3476,7 +3915,7 @@
                         <a:t>Площадь помещения, </a:t>
                       </a:r>
                       <a:r>
-                        <a:rPr lang="ru-RU" sz="1000" kern="1200" dirty="0" err="1" smtClean="0">
+                        <a:rPr lang="ru-RU" sz="800" kern="1200" dirty="0" err="1" smtClean="0">
                           <a:solidFill>
                             <a:schemeClr val="tx1"/>
                           </a:solidFill>
@@ -3487,7 +3926,7 @@
                         <a:t>кв.м</a:t>
                       </a:r>
                       <a:r>
-                        <a:rPr lang="ru-RU" sz="1000" kern="1200" dirty="0" smtClean="0">
+                        <a:rPr lang="ru-RU" sz="800" kern="1200" dirty="0" smtClean="0">
                           <a:solidFill>
                             <a:schemeClr val="tx1"/>
                           </a:solidFill>
@@ -3497,7 +3936,7 @@
                         </a:rPr>
                         <a:t>.</a:t>
                       </a:r>
-                      <a:endParaRPr lang="ru-RU" sz="1000" dirty="0">
+                      <a:endParaRPr lang="ru-RU" sz="800" dirty="0">
                         <a:solidFill>
                           <a:schemeClr val="tx1"/>
                         </a:solidFill>
@@ -3562,11 +4001,11 @@
                 </a:tc>
                 <a:extLst>
                   <a:ext uri="{0D108BD9-81ED-4DB2-BD59-A6C34878D82A}">
-                    <a16:rowId xmlns="" xmlns:a16="http://schemas.microsoft.com/office/drawing/2014/main" val="10000"/>
+                    <a16:rowId xmlns:a16="http://schemas.microsoft.com/office/drawing/2014/main" xmlns="" val="10000"/>
                   </a:ext>
                 </a:extLst>
               </a:tr>
-              <a:tr h="88034">
+              <a:tr h="132358">
                 <a:tc>
                   <a:txBody>
                     <a:bodyPr/>
@@ -3581,7 +4020,7 @@
                         </a:spcAft>
                       </a:pPr>
                       <a:r>
-                        <a:rPr lang="en-US" sz="1000" dirty="0" smtClean="0">
+                        <a:rPr lang="en-US" sz="800" baseline="0" dirty="0" smtClean="0">
                           <a:solidFill>
                             <a:schemeClr val="tx1"/>
                           </a:solidFill>
@@ -3592,7 +4031,7 @@
                         </a:rPr>
                         <a:t>1</a:t>
                       </a:r>
-                      <a:endParaRPr lang="ru-RU" sz="1000" dirty="0">
+                      <a:endParaRPr lang="ru-RU" sz="800" baseline="0" dirty="0">
                         <a:solidFill>
                           <a:schemeClr val="tx1"/>
                         </a:solidFill>
@@ -3667,15 +4106,15 @@
                         </a:spcAft>
                       </a:pPr>
                       <a:r>
-                        <a:rPr lang="ru-RU" sz="1000" dirty="0" smtClean="0">
+                        <a:rPr lang="ru-RU" sz="800" baseline="0" dirty="0" smtClean="0">
                           <a:effectLst/>
                           <a:latin typeface="Times New Roman" panose="02020603050405020304" pitchFamily="18" charset="0"/>
                           <a:ea typeface="Calibri" panose="020F0502020204030204" pitchFamily="34" charset="0"/>
                           <a:cs typeface="Times New Roman" panose="02020603050405020304" pitchFamily="18" charset="0"/>
                         </a:rPr>
-                        <a:t>тест1</a:t>
+                        <a:t>тест</a:t>
                       </a:r>
-                      <a:endParaRPr lang="ru-RU" sz="1000" dirty="0">
+                      <a:endParaRPr lang="ru-RU" sz="800" baseline="0" dirty="0">
                         <a:effectLst/>
                         <a:latin typeface="Times New Roman" panose="02020603050405020304" pitchFamily="18" charset="0"/>
                         <a:ea typeface="Calibri" panose="020F0502020204030204" pitchFamily="34" charset="0"/>
@@ -3744,7 +4183,7 @@
                         </a:lnSpc>
                       </a:pPr>
                       <a:r>
-                        <a:rPr lang="ru-RU" sz="1000" kern="1200" dirty="0" smtClean="0">
+                        <a:rPr lang="ru-RU" sz="800" kern="1200" baseline="0" dirty="0" smtClean="0">
                           <a:solidFill>
                             <a:schemeClr val="dk1"/>
                           </a:solidFill>
@@ -3753,9 +4192,9 @@
                           <a:ea typeface="Calibri" panose="020F0502020204030204" pitchFamily="34" charset="0"/>
                           <a:cs typeface="Times New Roman" panose="02020603050405020304" pitchFamily="18" charset="0"/>
                         </a:rPr>
-                        <a:t>тест1</a:t>
+                        <a:t>тест</a:t>
                       </a:r>
-                      <a:endParaRPr lang="ru-RU" sz="1000" kern="1200" dirty="0">
+                      <a:endParaRPr lang="ru-RU" sz="800" kern="1200" baseline="0" dirty="0">
                         <a:solidFill>
                           <a:schemeClr val="dk1"/>
                         </a:solidFill>
@@ -3827,7 +4266,7 @@
                         </a:lnSpc>
                       </a:pPr>
                       <a:r>
-                        <a:rPr lang="ru-RU" sz="1000" kern="1200" dirty="0" smtClean="0">
+                        <a:rPr lang="ru-RU" sz="800" kern="1200" baseline="0" smtClean="0">
                           <a:solidFill>
                             <a:schemeClr val="dk1"/>
                           </a:solidFill>
@@ -3836,9 +4275,9 @@
                           <a:ea typeface="Calibri" panose="020F0502020204030204" pitchFamily="34" charset="0"/>
                           <a:cs typeface="Times New Roman" panose="02020603050405020304" pitchFamily="18" charset="0"/>
                         </a:rPr>
-                        <a:t>0</a:t>
+                        <a:t>1-1</a:t>
                       </a:r>
-                      <a:endParaRPr lang="ru-RU" sz="1000" kern="1200" dirty="0">
+                      <a:endParaRPr lang="ru-RU" sz="800" kern="1200" baseline="0" dirty="0">
                         <a:solidFill>
                           <a:schemeClr val="dk1"/>
                         </a:solidFill>
@@ -3901,11 +4340,11 @@
                 </a:tc>
                 <a:extLst>
                   <a:ext uri="{0D108BD9-81ED-4DB2-BD59-A6C34878D82A}">
-                    <a16:rowId xmlns="" xmlns:a16="http://schemas.microsoft.com/office/drawing/2014/main" val="10001"/>
+                    <a16:rowId xmlns:a16="http://schemas.microsoft.com/office/drawing/2014/main" xmlns="" val="10001"/>
                   </a:ext>
                 </a:extLst>
               </a:tr>
-              <a:tr h="0">
+              <a:tr h="132358">
                 <a:tc>
                   <a:txBody>
                     <a:bodyPr/>
@@ -3920,7 +4359,7 @@
                         </a:spcAft>
                       </a:pPr>
                       <a:r>
-                        <a:rPr lang="ru-RU" sz="1000" dirty="0" smtClean="0">
+                        <a:rPr lang="ru-RU" sz="800" b="0" i="0" baseline="0" dirty="0" smtClean="0">
                           <a:solidFill>
                             <a:schemeClr val="tx1"/>
                           </a:solidFill>
@@ -3931,7 +4370,7 @@
                         </a:rPr>
                         <a:t>2</a:t>
                       </a:r>
-                      <a:endParaRPr lang="ru-RU" sz="1000" dirty="0">
+                      <a:endParaRPr lang="ru-RU" sz="800" b="0" i="0" baseline="0" dirty="0">
                         <a:solidFill>
                           <a:schemeClr val="tx1"/>
                         </a:solidFill>
@@ -4006,7 +4445,7 @@
                         </a:spcAft>
                       </a:pPr>
                       <a:r>
-                        <a:rPr lang="ru-RU" sz="1000" dirty="0" smtClean="0">
+                        <a:rPr lang="ru-RU" sz="800" b="0" i="0" baseline="0" dirty="0" smtClean="0">
                           <a:effectLst/>
                           <a:latin typeface="Times New Roman" panose="02020603050405020304" pitchFamily="18" charset="0"/>
                           <a:ea typeface="Calibri" panose="020F0502020204030204" pitchFamily="34" charset="0"/>
@@ -4014,7 +4453,7 @@
                         </a:rPr>
                         <a:t>тест2</a:t>
                       </a:r>
-                      <a:endParaRPr lang="ru-RU" sz="1000" dirty="0">
+                      <a:endParaRPr lang="ru-RU" sz="800" b="0" i="0" baseline="0" dirty="0">
                         <a:effectLst/>
                         <a:latin typeface="Times New Roman" panose="02020603050405020304" pitchFamily="18" charset="0"/>
                         <a:ea typeface="Calibri" panose="020F0502020204030204" pitchFamily="34" charset="0"/>
@@ -4083,7 +4522,7 @@
                         </a:lnSpc>
                       </a:pPr>
                       <a:r>
-                        <a:rPr lang="ru-RU" sz="1000" b="1" kern="1200" dirty="0" smtClean="0">
+                        <a:rPr lang="ru-RU" sz="800" b="0" i="0" kern="1200" baseline="0" dirty="0" smtClean="0">
                           <a:solidFill>
                             <a:srgbClr val="FF0000"/>
                           </a:solidFill>
@@ -4094,7 +4533,7 @@
                         </a:rPr>
                         <a:t>тест2</a:t>
                       </a:r>
-                      <a:endParaRPr lang="ru-RU" sz="1000" b="1" kern="1200" dirty="0">
+                      <a:endParaRPr lang="ru-RU" sz="800" b="0" i="0" kern="1200" baseline="0" dirty="0">
                         <a:solidFill>
                           <a:srgbClr val="FF0000"/>
                         </a:solidFill>
@@ -4166,7 +4605,7 @@
                         </a:lnSpc>
                       </a:pPr>
                       <a:r>
-                        <a:rPr lang="ru-RU" sz="1000" kern="1200" smtClean="0">
+                        <a:rPr lang="en-US" sz="800" b="0" i="0" kern="1200" baseline="0" dirty="0" smtClean="0">
                           <a:solidFill>
                             <a:schemeClr val="dk1"/>
                           </a:solidFill>
@@ -4175,9 +4614,9 @@
                           <a:ea typeface="Calibri" panose="020F0502020204030204" pitchFamily="34" charset="0"/>
                           <a:cs typeface="Times New Roman" panose="02020603050405020304" pitchFamily="18" charset="0"/>
                         </a:rPr>
-                        <a:t>0</a:t>
+                        <a:t>2-2</a:t>
                       </a:r>
-                      <a:endParaRPr lang="ru-RU" sz="1000" kern="1200" dirty="0">
+                      <a:endParaRPr lang="ru-RU" sz="800" b="0" i="0" kern="1200" baseline="0" dirty="0">
                         <a:solidFill>
                           <a:schemeClr val="dk1"/>
                         </a:solidFill>
@@ -4240,11 +4679,11 @@
                 </a:tc>
                 <a:extLst>
                   <a:ext uri="{0D108BD9-81ED-4DB2-BD59-A6C34878D82A}">
-                    <a16:rowId xmlns="" xmlns:a16="http://schemas.microsoft.com/office/drawing/2014/main" val="10002"/>
+                    <a16:rowId xmlns:a16="http://schemas.microsoft.com/office/drawing/2014/main" xmlns="" val="10002"/>
                   </a:ext>
                 </a:extLst>
               </a:tr>
-              <a:tr h="76530">
+              <a:tr h="122767">
                 <a:tc gridSpan="4">
                   <a:txBody>
                     <a:bodyPr/>
@@ -4259,7 +4698,7 @@
                         </a:spcAft>
                       </a:pPr>
                       <a:r>
-                        <a:rPr lang="ru-RU" sz="1000" b="0" smtClean="0">
+                        <a:rPr lang="ru-RU" sz="800" b="0" dirty="0" smtClean="0">
                           <a:solidFill>
                             <a:schemeClr val="tx1"/>
                           </a:solidFill>
@@ -4270,7 +4709,7 @@
                         </a:rPr>
                         <a:t>тест3</a:t>
                       </a:r>
-                      <a:endParaRPr lang="ru-RU" sz="1000" b="0" dirty="0">
+                      <a:endParaRPr lang="ru-RU" sz="800" b="0" dirty="0">
                         <a:solidFill>
                           <a:schemeClr val="tx1"/>
                         </a:solidFill>
@@ -4542,11 +4981,11 @@
                 </a:tc>
                 <a:extLst>
                   <a:ext uri="{0D108BD9-81ED-4DB2-BD59-A6C34878D82A}">
-                    <a16:rowId xmlns="" xmlns:a16="http://schemas.microsoft.com/office/drawing/2014/main" val="10003"/>
+                    <a16:rowId xmlns:a16="http://schemas.microsoft.com/office/drawing/2014/main" xmlns="" val="10003"/>
                   </a:ext>
                 </a:extLst>
               </a:tr>
-              <a:tr h="175966">
+              <a:tr h="177189">
                 <a:tc gridSpan="3">
                   <a:txBody>
                     <a:bodyPr/>
@@ -4570,23 +5009,23 @@
                         <a:defRPr/>
                       </a:pPr>
                       <a:r>
-                        <a:rPr lang="ru-RU" sz="900" b="1" dirty="0" smtClean="0">
+                        <a:rPr lang="ru-RU" sz="800" b="1" baseline="0" dirty="0" smtClean="0">
                           <a:solidFill>
                             <a:schemeClr val="tx1"/>
                           </a:solidFill>
                           <a:effectLst/>
-                          <a:latin typeface="+mn-lt"/>
+                          <a:latin typeface="Times New Roman" panose="02020603050405020304" pitchFamily="18" charset="0"/>
                           <a:ea typeface="Times New Roman" panose="02020603050405020304" pitchFamily="18" charset="0"/>
                           <a:cs typeface="Times New Roman" panose="02020603050405020304" pitchFamily="18" charset="0"/>
                         </a:rPr>
                         <a:t>ИТОГО:</a:t>
                       </a:r>
-                      <a:endParaRPr lang="ru-RU" sz="900" dirty="0">
+                      <a:endParaRPr lang="ru-RU" sz="800" baseline="0" dirty="0">
                         <a:solidFill>
                           <a:schemeClr val="tx1"/>
                         </a:solidFill>
                         <a:effectLst/>
-                        <a:latin typeface="+mn-lt"/>
+                        <a:latin typeface="Times New Roman" panose="02020603050405020304" pitchFamily="18" charset="0"/>
                         <a:ea typeface="Times New Roman" panose="02020603050405020304" pitchFamily="18" charset="0"/>
                         <a:cs typeface="Times New Roman" panose="02020603050405020304" pitchFamily="18" charset="0"/>
                       </a:endParaRPr>
@@ -4798,7 +5237,7 @@
                         </a:lnSpc>
                       </a:pPr>
                       <a:r>
-                        <a:rPr lang="ru-RU" sz="1000" b="1" kern="1200" dirty="0" smtClean="0">
+                        <a:rPr lang="en-US" sz="800" b="1" kern="1200" baseline="0" dirty="0" smtClean="0">
                           <a:solidFill>
                             <a:schemeClr val="dk1"/>
                           </a:solidFill>
@@ -4807,9 +5246,9 @@
                           <a:ea typeface="Calibri" panose="020F0502020204030204" pitchFamily="34" charset="0"/>
                           <a:cs typeface="Times New Roman" panose="02020603050405020304" pitchFamily="18" charset="0"/>
                         </a:rPr>
-                        <a:t>0</a:t>
+                        <a:t>1</a:t>
                       </a:r>
-                      <a:endParaRPr lang="ru-RU" sz="1000" b="1" kern="1200" dirty="0">
+                      <a:endParaRPr lang="ru-RU" sz="800" b="1" kern="1200" baseline="0" dirty="0">
                         <a:solidFill>
                           <a:schemeClr val="dk1"/>
                         </a:solidFill>
@@ -4872,11 +5311,11 @@
                 </a:tc>
                 <a:extLst>
                   <a:ext uri="{0D108BD9-81ED-4DB2-BD59-A6C34878D82A}">
-                    <a16:rowId xmlns="" xmlns:a16="http://schemas.microsoft.com/office/drawing/2014/main" val="10004"/>
+                    <a16:rowId xmlns:a16="http://schemas.microsoft.com/office/drawing/2014/main" xmlns="" val="10004"/>
                   </a:ext>
                 </a:extLst>
               </a:tr>
-              <a:tr h="81534">
+              <a:tr h="131335">
                 <a:tc gridSpan="3">
                   <a:txBody>
                     <a:bodyPr/>
@@ -4900,47 +5339,47 @@
                         <a:defRPr/>
                       </a:pPr>
                       <a:r>
-                        <a:rPr lang="ru-RU" sz="1000" b="1" dirty="0" smtClean="0">
+                        <a:rPr lang="ru-RU" sz="800" b="1" dirty="0" smtClean="0">
                           <a:solidFill>
                             <a:schemeClr val="tx1"/>
                           </a:solidFill>
                           <a:effectLst/>
-                          <a:latin typeface="+mn-lt"/>
+                          <a:latin typeface="Times New Roman" panose="02020603050405020304" pitchFamily="18" charset="0"/>
                           <a:ea typeface="Times New Roman" panose="02020603050405020304" pitchFamily="18" charset="0"/>
                           <a:cs typeface="Times New Roman" panose="02020603050405020304" pitchFamily="18" charset="0"/>
                         </a:rPr>
                         <a:t>Собственность</a:t>
                       </a:r>
                       <a:r>
-                        <a:rPr lang="ru-RU" sz="1000" b="1" baseline="0" dirty="0" smtClean="0">
+                        <a:rPr lang="ru-RU" sz="800" b="1" baseline="0" dirty="0" smtClean="0">
                           <a:solidFill>
                             <a:schemeClr val="tx1"/>
                           </a:solidFill>
                           <a:effectLst/>
-                          <a:latin typeface="+mn-lt"/>
+                          <a:latin typeface="Times New Roman" panose="02020603050405020304" pitchFamily="18" charset="0"/>
                           <a:ea typeface="Times New Roman" panose="02020603050405020304" pitchFamily="18" charset="0"/>
                           <a:cs typeface="Times New Roman" panose="02020603050405020304" pitchFamily="18" charset="0"/>
                         </a:rPr>
                         <a:t> РФ ИТОГО</a:t>
                       </a:r>
                       <a:r>
-                        <a:rPr lang="en-US" sz="1000" b="1" baseline="0" dirty="0" smtClean="0">
+                        <a:rPr lang="en-US" sz="800" b="1" baseline="0" dirty="0" smtClean="0">
                           <a:solidFill>
                             <a:schemeClr val="tx1"/>
                           </a:solidFill>
                           <a:effectLst/>
-                          <a:latin typeface="+mn-lt"/>
+                          <a:latin typeface="Times New Roman" panose="02020603050405020304" pitchFamily="18" charset="0"/>
                           <a:ea typeface="Times New Roman" panose="02020603050405020304" pitchFamily="18" charset="0"/>
                           <a:cs typeface="Times New Roman" panose="02020603050405020304" pitchFamily="18" charset="0"/>
                         </a:rPr>
                         <a:t>:</a:t>
                       </a:r>
-                      <a:endParaRPr lang="ru-RU" sz="1000" b="1" dirty="0" smtClean="0">
+                      <a:endParaRPr lang="ru-RU" sz="800" b="1" dirty="0" smtClean="0">
                         <a:solidFill>
                           <a:schemeClr val="tx1"/>
                         </a:solidFill>
                         <a:effectLst/>
-                        <a:latin typeface="+mn-lt"/>
+                        <a:latin typeface="Times New Roman" panose="02020603050405020304" pitchFamily="18" charset="0"/>
                         <a:ea typeface="Times New Roman" panose="02020603050405020304" pitchFamily="18" charset="0"/>
                         <a:cs typeface="Times New Roman" panose="02020603050405020304" pitchFamily="18" charset="0"/>
                       </a:endParaRPr>
@@ -5150,7 +5589,7 @@
                         </a:lnSpc>
                       </a:pPr>
                       <a:r>
-                        <a:rPr lang="ru-RU" sz="1000" b="1" i="0" u="none" strike="noStrike" kern="1200" dirty="0" smtClean="0">
+                        <a:rPr lang="en-US" sz="800" b="1" i="0" u="none" strike="noStrike" kern="1200" dirty="0" smtClean="0">
                           <a:solidFill>
                             <a:schemeClr val="tx1"/>
                           </a:solidFill>
@@ -5159,9 +5598,9 @@
                           <a:ea typeface="+mn-ea"/>
                           <a:cs typeface="Times New Roman" panose="02020603050405020304" pitchFamily="18" charset="0"/>
                         </a:rPr>
-                        <a:t>0</a:t>
+                        <a:t>2</a:t>
                       </a:r>
-                      <a:endParaRPr lang="ru-RU" sz="1000" b="1" i="0" u="none" strike="noStrike" kern="1200" dirty="0">
+                      <a:endParaRPr lang="ru-RU" sz="800" b="1" i="0" u="none" strike="noStrike" kern="1200" dirty="0">
                         <a:solidFill>
                           <a:schemeClr val="tx1"/>
                         </a:solidFill>
@@ -5224,11 +5663,11 @@
                 </a:tc>
                 <a:extLst>
                   <a:ext uri="{0D108BD9-81ED-4DB2-BD59-A6C34878D82A}">
-                    <a16:rowId xmlns="" xmlns:a16="http://schemas.microsoft.com/office/drawing/2014/main" val="10005"/>
+                    <a16:rowId xmlns:a16="http://schemas.microsoft.com/office/drawing/2014/main" xmlns="" val="10005"/>
                   </a:ext>
                 </a:extLst>
               </a:tr>
-              <a:tr h="0">
+              <a:tr h="131335">
                 <a:tc gridSpan="3">
                   <a:txBody>
                     <a:bodyPr/>
@@ -5252,83 +5691,83 @@
                         <a:defRPr/>
                       </a:pPr>
                       <a:r>
-                        <a:rPr lang="ru-RU" sz="1000" b="1" dirty="0" smtClean="0">
+                        <a:rPr lang="ru-RU" sz="800" b="1" dirty="0" smtClean="0">
                           <a:solidFill>
                             <a:schemeClr val="tx1"/>
                           </a:solidFill>
                           <a:effectLst/>
-                          <a:latin typeface="+mn-lt"/>
+                          <a:latin typeface="Times New Roman" panose="02020603050405020304" pitchFamily="18" charset="0"/>
                           <a:ea typeface="Times New Roman" panose="02020603050405020304" pitchFamily="18" charset="0"/>
                           <a:cs typeface="Times New Roman" panose="02020603050405020304" pitchFamily="18" charset="0"/>
                         </a:rPr>
                         <a:t>Собственность</a:t>
                       </a:r>
                       <a:r>
-                        <a:rPr lang="en-US" sz="1000" b="1" dirty="0" smtClean="0">
+                        <a:rPr lang="en-US" sz="800" b="1" dirty="0" smtClean="0">
                           <a:solidFill>
                             <a:schemeClr val="tx1"/>
                           </a:solidFill>
                           <a:effectLst/>
-                          <a:latin typeface="+mn-lt"/>
+                          <a:latin typeface="Times New Roman" panose="02020603050405020304" pitchFamily="18" charset="0"/>
                           <a:ea typeface="Times New Roman" panose="02020603050405020304" pitchFamily="18" charset="0"/>
                           <a:cs typeface="Times New Roman" panose="02020603050405020304" pitchFamily="18" charset="0"/>
                         </a:rPr>
                         <a:t> </a:t>
                       </a:r>
                       <a:r>
-                        <a:rPr lang="ru-RU" sz="1000" b="1" smtClean="0">
+                        <a:rPr lang="ru-RU" sz="800" b="1" smtClean="0">
                           <a:solidFill>
                             <a:schemeClr val="tx1"/>
                           </a:solidFill>
                           <a:effectLst/>
-                          <a:latin typeface="+mn-lt"/>
+                          <a:latin typeface="Times New Roman" panose="02020603050405020304" pitchFamily="18" charset="0"/>
                           <a:ea typeface="Times New Roman" panose="02020603050405020304" pitchFamily="18" charset="0"/>
                           <a:cs typeface="Times New Roman" panose="02020603050405020304" pitchFamily="18" charset="0"/>
                         </a:rPr>
                         <a:t>г.</a:t>
                       </a:r>
                       <a:r>
-                        <a:rPr lang="ru-RU" sz="1000" b="1" baseline="0" smtClean="0">
+                        <a:rPr lang="ru-RU" sz="800" b="1" baseline="0" smtClean="0">
                           <a:solidFill>
                             <a:schemeClr val="tx1"/>
                           </a:solidFill>
                           <a:effectLst/>
-                          <a:latin typeface="+mn-lt"/>
+                          <a:latin typeface="Times New Roman" panose="02020603050405020304" pitchFamily="18" charset="0"/>
                           <a:ea typeface="Times New Roman" panose="02020603050405020304" pitchFamily="18" charset="0"/>
                           <a:cs typeface="Times New Roman" panose="02020603050405020304" pitchFamily="18" charset="0"/>
                         </a:rPr>
                         <a:t> </a:t>
                       </a:r>
                       <a:r>
-                        <a:rPr lang="ru-RU" sz="1000" b="1" baseline="0" dirty="0" smtClean="0">
+                        <a:rPr lang="ru-RU" sz="800" b="1" baseline="0" dirty="0" smtClean="0">
                           <a:solidFill>
                             <a:schemeClr val="tx1"/>
                           </a:solidFill>
                           <a:effectLst/>
-                          <a:latin typeface="+mn-lt"/>
+                          <a:latin typeface="Times New Roman" panose="02020603050405020304" pitchFamily="18" charset="0"/>
                           <a:ea typeface="Times New Roman" panose="02020603050405020304" pitchFamily="18" charset="0"/>
                           <a:cs typeface="Times New Roman" panose="02020603050405020304" pitchFamily="18" charset="0"/>
                         </a:rPr>
                         <a:t>Москвы ИТОГО</a:t>
                       </a:r>
                       <a:r>
-                        <a:rPr lang="en-US" sz="1000" b="1" baseline="0" dirty="0" smtClean="0">
+                        <a:rPr lang="en-US" sz="800" b="1" baseline="0" dirty="0" smtClean="0">
                           <a:solidFill>
                             <a:schemeClr val="tx1"/>
                           </a:solidFill>
                           <a:effectLst/>
-                          <a:latin typeface="+mn-lt"/>
+                          <a:latin typeface="Times New Roman" panose="02020603050405020304" pitchFamily="18" charset="0"/>
                           <a:ea typeface="Times New Roman" panose="02020603050405020304" pitchFamily="18" charset="0"/>
                           <a:cs typeface="Times New Roman" panose="02020603050405020304" pitchFamily="18" charset="0"/>
                         </a:rPr>
                         <a:t>:</a:t>
                       </a:r>
-                      <a:endParaRPr lang="ru-RU" sz="1000" b="1" dirty="0" smtClean="0">
+                      <a:endParaRPr lang="ru-RU" sz="800" b="1" dirty="0" smtClean="0">
                         <a:solidFill>
                           <a:schemeClr val="tx1"/>
                         </a:solidFill>
                         <a:effectLst/>
-                        <a:latin typeface="+mn-lt"/>
+                        <a:latin typeface="Times New Roman" panose="02020603050405020304" pitchFamily="18" charset="0"/>
                         <a:ea typeface="Times New Roman" panose="02020603050405020304" pitchFamily="18" charset="0"/>
                         <a:cs typeface="Times New Roman" panose="02020603050405020304" pitchFamily="18" charset="0"/>
                       </a:endParaRPr>
@@ -5415,7 +5854,7 @@
                         </a:lnSpc>
                       </a:pPr>
                       <a:r>
-                        <a:rPr lang="ru-RU" sz="1000" b="1" i="0" u="none" strike="noStrike" kern="1200" dirty="0" smtClean="0">
+                        <a:rPr lang="en-US" sz="800" b="1" i="0" u="none" strike="noStrike" kern="1200" dirty="0" smtClean="0">
                           <a:solidFill>
                             <a:schemeClr val="tx1"/>
                           </a:solidFill>
@@ -5424,9 +5863,9 @@
                           <a:ea typeface="+mn-ea"/>
                           <a:cs typeface="Times New Roman" panose="02020603050405020304" pitchFamily="18" charset="0"/>
                         </a:rPr>
-                        <a:t>0</a:t>
+                        <a:t>3</a:t>
                       </a:r>
-                      <a:endParaRPr lang="ru-RU" sz="1000" b="1" i="0" u="none" strike="noStrike" kern="1200" dirty="0">
+                      <a:endParaRPr lang="ru-RU" sz="800" b="1" i="0" u="none" strike="noStrike" kern="1200" dirty="0">
                         <a:solidFill>
                           <a:schemeClr val="tx1"/>
                         </a:solidFill>
@@ -5489,11 +5928,11 @@
                 </a:tc>
                 <a:extLst>
                   <a:ext uri="{0D108BD9-81ED-4DB2-BD59-A6C34878D82A}">
-                    <a16:rowId xmlns="" xmlns:a16="http://schemas.microsoft.com/office/drawing/2014/main" val="10006"/>
+                    <a16:rowId xmlns:a16="http://schemas.microsoft.com/office/drawing/2014/main" xmlns="" val="10006"/>
                   </a:ext>
                 </a:extLst>
               </a:tr>
-              <a:tr h="76564">
+              <a:tr h="131335">
                 <a:tc gridSpan="3">
                   <a:txBody>
                     <a:bodyPr/>
@@ -5508,35 +5947,35 @@
                         </a:spcAft>
                       </a:pPr>
                       <a:r>
-                        <a:rPr lang="ru-RU" sz="1000" b="1" dirty="0" smtClean="0">
+                        <a:rPr lang="ru-RU" sz="800" b="1" baseline="0" dirty="0" smtClean="0">
                           <a:solidFill>
                             <a:schemeClr val="tx1"/>
                           </a:solidFill>
                           <a:effectLst/>
-                          <a:latin typeface="+mn-lt"/>
+                          <a:latin typeface="Times New Roman" panose="02020603050405020304" pitchFamily="18" charset="0"/>
                           <a:ea typeface="Times New Roman" panose="02020603050405020304" pitchFamily="18" charset="0"/>
                           <a:cs typeface="Times New Roman" panose="02020603050405020304" pitchFamily="18" charset="0"/>
                         </a:rPr>
                         <a:t>Собственность физических/юридических лиц ИТОГО</a:t>
                       </a:r>
                       <a:r>
-                        <a:rPr lang="en-US" sz="1000" b="1" dirty="0" smtClean="0">
+                        <a:rPr lang="en-US" sz="800" b="1" baseline="0" dirty="0" smtClean="0">
                           <a:solidFill>
                             <a:schemeClr val="tx1"/>
                           </a:solidFill>
                           <a:effectLst/>
-                          <a:latin typeface="+mn-lt"/>
+                          <a:latin typeface="Times New Roman" panose="02020603050405020304" pitchFamily="18" charset="0"/>
                           <a:ea typeface="Times New Roman" panose="02020603050405020304" pitchFamily="18" charset="0"/>
                           <a:cs typeface="Times New Roman" panose="02020603050405020304" pitchFamily="18" charset="0"/>
                         </a:rPr>
                         <a:t>:</a:t>
                       </a:r>
-                      <a:endParaRPr lang="ru-RU" sz="1000" b="1" dirty="0">
+                      <a:endParaRPr lang="ru-RU" sz="800" b="1" baseline="0" dirty="0">
                         <a:solidFill>
                           <a:schemeClr val="tx1"/>
                         </a:solidFill>
                         <a:effectLst/>
-                        <a:latin typeface="+mn-lt"/>
+                        <a:latin typeface="Times New Roman" panose="02020603050405020304" pitchFamily="18" charset="0"/>
                         <a:ea typeface="Times New Roman" panose="02020603050405020304" pitchFamily="18" charset="0"/>
                         <a:cs typeface="Times New Roman" panose="02020603050405020304" pitchFamily="18" charset="0"/>
                       </a:endParaRPr>
@@ -5746,7 +6185,7 @@
                         </a:lnSpc>
                       </a:pPr>
                       <a:r>
-                        <a:rPr lang="ru-RU" sz="1000" b="1" i="0" u="none" strike="noStrike" kern="1200" dirty="0" smtClean="0">
+                        <a:rPr lang="en-US" sz="800" b="1" i="0" u="none" strike="noStrike" kern="1200" baseline="0" dirty="0" smtClean="0">
                           <a:solidFill>
                             <a:schemeClr val="tx1"/>
                           </a:solidFill>
@@ -5755,9 +6194,9 @@
                           <a:ea typeface="+mn-ea"/>
                           <a:cs typeface="Times New Roman" panose="02020603050405020304" pitchFamily="18" charset="0"/>
                         </a:rPr>
-                        <a:t>0</a:t>
+                        <a:t>4</a:t>
                       </a:r>
-                      <a:endParaRPr lang="ru-RU" sz="1000" b="1" i="0" u="none" strike="noStrike" kern="1200" dirty="0">
+                      <a:endParaRPr lang="ru-RU" sz="800" b="1" i="0" u="none" strike="noStrike" kern="1200" baseline="0" dirty="0">
                         <a:solidFill>
                           <a:schemeClr val="tx1"/>
                         </a:solidFill>
@@ -5820,42 +6259,51 @@
                 </a:tc>
                 <a:extLst>
                   <a:ext uri="{0D108BD9-81ED-4DB2-BD59-A6C34878D82A}">
-                    <a16:rowId xmlns="" xmlns:a16="http://schemas.microsoft.com/office/drawing/2014/main" val="10007"/>
+                    <a16:rowId xmlns:a16="http://schemas.microsoft.com/office/drawing/2014/main" xmlns="" val="10007"/>
                   </a:ext>
                 </a:extLst>
               </a:tr>
-              <a:tr h="71561">
+              <a:tr h="122767">
                 <a:tc gridSpan="3">
                   <a:txBody>
                     <a:bodyPr/>
                     <a:lstStyle/>
                     <a:p>
-                      <a:pPr algn="r">
+                      <a:pPr marL="0" marR="0" lvl="0" indent="0" algn="r" defTabSz="1280160" rtl="0" eaLnBrk="1" fontAlgn="auto" latinLnBrk="0" hangingPunct="1">
                         <a:lnSpc>
                           <a:spcPct val="100000"/>
                         </a:lnSpc>
+                        <a:spcBef>
+                          <a:spcPts val="0"/>
+                        </a:spcBef>
                         <a:spcAft>
                           <a:spcPts val="0"/>
                         </a:spcAft>
+                        <a:buClrTx/>
+                        <a:buSzTx/>
+                        <a:buFontTx/>
+                        <a:buNone/>
+                        <a:tabLst/>
+                        <a:defRPr/>
                       </a:pPr>
                       <a:r>
-                        <a:rPr lang="ru-RU" sz="1000" b="1" dirty="0" smtClean="0">
+                        <a:rPr lang="ru-RU" sz="800" b="1" baseline="0" dirty="0" smtClean="0">
                           <a:solidFill>
                             <a:schemeClr val="tx1"/>
                           </a:solidFill>
                           <a:effectLst/>
-                          <a:latin typeface="+mn-lt"/>
+                          <a:latin typeface="Times New Roman" panose="02020603050405020304" pitchFamily="18" charset="0"/>
                           <a:ea typeface="Times New Roman" panose="02020603050405020304" pitchFamily="18" charset="0"/>
                           <a:cs typeface="Times New Roman" panose="02020603050405020304" pitchFamily="18" charset="0"/>
                         </a:rPr>
                         <a:t>ОБЩИЙ ИТОГ:</a:t>
                       </a:r>
-                      <a:endParaRPr lang="ru-RU" sz="1000" b="1" dirty="0">
+                      <a:endParaRPr lang="ru-RU" sz="800" b="1" baseline="0" dirty="0">
                         <a:solidFill>
                           <a:schemeClr val="tx1"/>
                         </a:solidFill>
                         <a:effectLst/>
-                        <a:latin typeface="+mn-lt"/>
+                        <a:latin typeface="Times New Roman" panose="02020603050405020304" pitchFamily="18" charset="0"/>
                         <a:ea typeface="Times New Roman" panose="02020603050405020304" pitchFamily="18" charset="0"/>
                         <a:cs typeface="Times New Roman" panose="02020603050405020304" pitchFamily="18" charset="0"/>
                       </a:endParaRPr>
@@ -6065,7 +6513,7 @@
                         </a:lnSpc>
                       </a:pPr>
                       <a:r>
-                        <a:rPr lang="ru-RU" sz="1000" b="1" i="0" u="none" strike="noStrike" kern="1200" dirty="0" smtClean="0">
+                        <a:rPr lang="en-US" sz="800" b="1" i="0" u="none" strike="noStrike" kern="1200" baseline="0" dirty="0" smtClean="0">
                           <a:solidFill>
                             <a:schemeClr val="tx1"/>
                           </a:solidFill>
@@ -6074,9 +6522,9 @@
                           <a:ea typeface="+mn-ea"/>
                           <a:cs typeface="Times New Roman" panose="02020603050405020304" pitchFamily="18" charset="0"/>
                         </a:rPr>
-                        <a:t>0</a:t>
+                        <a:t>5</a:t>
                       </a:r>
-                      <a:endParaRPr lang="ru-RU" sz="1000" b="1" i="0" u="none" strike="noStrike" kern="1200" dirty="0">
+                      <a:endParaRPr lang="ru-RU" sz="800" b="1" i="0" u="none" strike="noStrike" kern="1200" baseline="0" dirty="0">
                         <a:solidFill>
                           <a:schemeClr val="tx1"/>
                         </a:solidFill>
@@ -6139,9 +6587,314 @@
                 </a:tc>
                 <a:extLst>
                   <a:ext uri="{0D108BD9-81ED-4DB2-BD59-A6C34878D82A}">
-                    <a16:rowId xmlns="" xmlns:a16="http://schemas.microsoft.com/office/drawing/2014/main" val="10008"/>
+                    <a16:rowId xmlns:a16="http://schemas.microsoft.com/office/drawing/2014/main" xmlns="" val="10008"/>
                   </a:ext>
                 </a:extLst>
+              </a:tr>
+              <a:tr h="122767">
+                <a:tc>
+                  <a:txBody>
+                    <a:bodyPr/>
+                    <a:lstStyle/>
+                    <a:p>
+                      <a:pPr algn="ctr">
+                        <a:lnSpc>
+                          <a:spcPct val="100000"/>
+                        </a:lnSpc>
+                        <a:spcAft>
+                          <a:spcPts val="0"/>
+                        </a:spcAft>
+                      </a:pPr>
+                      <a:r>
+                        <a:rPr lang="en-US" sz="800" b="0" i="0" baseline="0" smtClean="0">
+                          <a:solidFill>
+                            <a:schemeClr val="tx1"/>
+                          </a:solidFill>
+                          <a:effectLst/>
+                          <a:latin typeface="Times New Roman" panose="02020603050405020304" pitchFamily="18" charset="0"/>
+                          <a:ea typeface="Times New Roman" panose="02020603050405020304" pitchFamily="18" charset="0"/>
+                          <a:cs typeface="Times New Roman" panose="02020603050405020304" pitchFamily="18" charset="0"/>
+                        </a:rPr>
+                        <a:t> </a:t>
+                      </a:r>
+                      <a:endParaRPr lang="ru-RU" sz="800" b="0" i="0" baseline="0" dirty="0">
+                        <a:solidFill>
+                          <a:schemeClr val="tx1"/>
+                        </a:solidFill>
+                        <a:effectLst/>
+                        <a:latin typeface="Times New Roman" panose="02020603050405020304" pitchFamily="18" charset="0"/>
+                        <a:ea typeface="Times New Roman" panose="02020603050405020304" pitchFamily="18" charset="0"/>
+                        <a:cs typeface="Times New Roman" panose="02020603050405020304" pitchFamily="18" charset="0"/>
+                      </a:endParaRPr>
+                    </a:p>
+                  </a:txBody>
+                  <a:tcPr marL="0" marR="0" marT="0" marB="0" anchor="ctr">
+                    <a:lnL w="6350" cap="flat" cmpd="sng" algn="ctr">
+                      <a:solidFill>
+                        <a:schemeClr val="bg1">
+                          <a:lumMod val="65000"/>
+                        </a:schemeClr>
+                      </a:solidFill>
+                      <a:prstDash val="solid"/>
+                      <a:round/>
+                      <a:headEnd type="none" w="med" len="med"/>
+                      <a:tailEnd type="none" w="med" len="med"/>
+                    </a:lnL>
+                    <a:lnR w="6350" cap="flat" cmpd="sng" algn="ctr">
+                      <a:solidFill>
+                        <a:schemeClr val="bg1">
+                          <a:lumMod val="65000"/>
+                        </a:schemeClr>
+                      </a:solidFill>
+                      <a:prstDash val="solid"/>
+                      <a:round/>
+                      <a:headEnd type="none" w="med" len="med"/>
+                      <a:tailEnd type="none" w="med" len="med"/>
+                    </a:lnR>
+                    <a:lnT w="6350" cap="flat" cmpd="sng" algn="ctr">
+                      <a:solidFill>
+                        <a:schemeClr val="bg1">
+                          <a:lumMod val="65000"/>
+                        </a:schemeClr>
+                      </a:solidFill>
+                      <a:prstDash val="solid"/>
+                      <a:round/>
+                      <a:headEnd type="none" w="med" len="med"/>
+                      <a:tailEnd type="none" w="med" len="med"/>
+                    </a:lnT>
+                    <a:lnB w="6350" cap="flat" cmpd="sng" algn="ctr">
+                      <a:solidFill>
+                        <a:schemeClr val="bg1">
+                          <a:lumMod val="65000"/>
+                        </a:schemeClr>
+                      </a:solidFill>
+                      <a:prstDash val="solid"/>
+                      <a:round/>
+                      <a:headEnd type="none" w="med" len="med"/>
+                      <a:tailEnd type="none" w="med" len="med"/>
+                    </a:lnB>
+                    <a:solidFill>
+                      <a:schemeClr val="bg1"/>
+                    </a:solidFill>
+                  </a:tcPr>
+                </a:tc>
+                <a:tc>
+                  <a:txBody>
+                    <a:bodyPr/>
+                    <a:lstStyle/>
+                    <a:p>
+                      <a:pPr algn="ctr"/>
+                      <a:r>
+                        <a:rPr lang="en-US" sz="800" b="0" i="0" baseline="0" smtClean="0">
+                          <a:latin typeface="Times New Roman" panose="02020603050405020304" pitchFamily="18" charset="0"/>
+                        </a:rPr>
+                        <a:t> </a:t>
+                      </a:r>
+                      <a:endParaRPr lang="ru-RU" sz="800" b="0" i="0" baseline="0" dirty="0">
+                        <a:latin typeface="Times New Roman" panose="02020603050405020304" pitchFamily="18" charset="0"/>
+                      </a:endParaRPr>
+                    </a:p>
+                  </a:txBody>
+                  <a:tcPr marL="0" marR="0" marT="0" marB="0" anchor="ctr">
+                    <a:lnL w="6350" cap="flat" cmpd="sng" algn="ctr">
+                      <a:solidFill>
+                        <a:schemeClr val="bg1">
+                          <a:lumMod val="65000"/>
+                        </a:schemeClr>
+                      </a:solidFill>
+                      <a:prstDash val="solid"/>
+                      <a:round/>
+                      <a:headEnd type="none" w="med" len="med"/>
+                      <a:tailEnd type="none" w="med" len="med"/>
+                    </a:lnL>
+                    <a:lnR w="6350" cap="flat" cmpd="sng" algn="ctr">
+                      <a:solidFill>
+                        <a:schemeClr val="bg1">
+                          <a:lumMod val="65000"/>
+                        </a:schemeClr>
+                      </a:solidFill>
+                      <a:prstDash val="solid"/>
+                      <a:round/>
+                      <a:headEnd type="none" w="med" len="med"/>
+                      <a:tailEnd type="none" w="med" len="med"/>
+                    </a:lnR>
+                    <a:lnT w="6350" cap="flat" cmpd="sng" algn="ctr">
+                      <a:solidFill>
+                        <a:schemeClr val="bg1">
+                          <a:lumMod val="65000"/>
+                        </a:schemeClr>
+                      </a:solidFill>
+                      <a:prstDash val="solid"/>
+                      <a:round/>
+                      <a:headEnd type="none" w="med" len="med"/>
+                      <a:tailEnd type="none" w="med" len="med"/>
+                    </a:lnT>
+                    <a:lnB w="6350" cap="flat" cmpd="sng" algn="ctr">
+                      <a:solidFill>
+                        <a:schemeClr val="bg1">
+                          <a:lumMod val="65000"/>
+                        </a:schemeClr>
+                      </a:solidFill>
+                      <a:prstDash val="solid"/>
+                      <a:round/>
+                      <a:headEnd type="none" w="med" len="med"/>
+                      <a:tailEnd type="none" w="med" len="med"/>
+                    </a:lnB>
+                    <a:solidFill>
+                      <a:schemeClr val="bg1"/>
+                    </a:solidFill>
+                  </a:tcPr>
+                </a:tc>
+                <a:tc>
+                  <a:txBody>
+                    <a:bodyPr/>
+                    <a:lstStyle/>
+                    <a:p>
+                      <a:pPr algn="ctr"/>
+                      <a:r>
+                        <a:rPr lang="en-US" sz="800" b="0" i="0" baseline="0" dirty="0" smtClean="0">
+                          <a:latin typeface="Times New Roman" panose="02020603050405020304" pitchFamily="18" charset="0"/>
+                        </a:rPr>
+                        <a:t> </a:t>
+                      </a:r>
+                      <a:endParaRPr lang="ru-RU" sz="800" b="0" i="0" baseline="0" dirty="0">
+                        <a:latin typeface="Times New Roman" panose="02020603050405020304" pitchFamily="18" charset="0"/>
+                      </a:endParaRPr>
+                    </a:p>
+                  </a:txBody>
+                  <a:tcPr marL="0" marR="0" marT="0" marB="0" anchor="ctr">
+                    <a:lnL w="6350" cap="flat" cmpd="sng" algn="ctr">
+                      <a:solidFill>
+                        <a:schemeClr val="bg1">
+                          <a:lumMod val="65000"/>
+                        </a:schemeClr>
+                      </a:solidFill>
+                      <a:prstDash val="solid"/>
+                      <a:round/>
+                      <a:headEnd type="none" w="med" len="med"/>
+                      <a:tailEnd type="none" w="med" len="med"/>
+                    </a:lnL>
+                    <a:lnR w="6350" cap="flat" cmpd="sng" algn="ctr">
+                      <a:solidFill>
+                        <a:schemeClr val="bg1">
+                          <a:lumMod val="65000"/>
+                        </a:schemeClr>
+                      </a:solidFill>
+                      <a:prstDash val="solid"/>
+                      <a:round/>
+                      <a:headEnd type="none" w="med" len="med"/>
+                      <a:tailEnd type="none" w="med" len="med"/>
+                    </a:lnR>
+                    <a:lnT w="6350" cap="flat" cmpd="sng" algn="ctr">
+                      <a:solidFill>
+                        <a:schemeClr val="bg1">
+                          <a:lumMod val="65000"/>
+                        </a:schemeClr>
+                      </a:solidFill>
+                      <a:prstDash val="solid"/>
+                      <a:round/>
+                      <a:headEnd type="none" w="med" len="med"/>
+                      <a:tailEnd type="none" w="med" len="med"/>
+                    </a:lnT>
+                    <a:lnB w="6350" cap="flat" cmpd="sng" algn="ctr">
+                      <a:solidFill>
+                        <a:schemeClr val="bg1">
+                          <a:lumMod val="65000"/>
+                        </a:schemeClr>
+                      </a:solidFill>
+                      <a:prstDash val="solid"/>
+                      <a:round/>
+                      <a:headEnd type="none" w="med" len="med"/>
+                      <a:tailEnd type="none" w="med" len="med"/>
+                    </a:lnB>
+                    <a:solidFill>
+                      <a:schemeClr val="bg1"/>
+                    </a:solidFill>
+                  </a:tcPr>
+                </a:tc>
+                <a:tc>
+                  <a:txBody>
+                    <a:bodyPr/>
+                    <a:lstStyle/>
+                    <a:p>
+                      <a:pPr algn="ctr" fontAlgn="b">
+                        <a:lnSpc>
+                          <a:spcPct val="100000"/>
+                        </a:lnSpc>
+                      </a:pPr>
+                      <a:r>
+                        <a:rPr lang="en-US" sz="800" b="0" i="0" u="none" strike="noStrike" kern="1200" baseline="0" dirty="0" smtClean="0">
+                          <a:solidFill>
+                            <a:schemeClr val="tx1"/>
+                          </a:solidFill>
+                          <a:effectLst/>
+                          <a:latin typeface="Times New Roman" panose="02020603050405020304" pitchFamily="18" charset="0"/>
+                          <a:ea typeface="+mn-ea"/>
+                          <a:cs typeface="Times New Roman" panose="02020603050405020304" pitchFamily="18" charset="0"/>
+                        </a:rPr>
+                        <a:t> </a:t>
+                      </a:r>
+                      <a:endParaRPr lang="ru-RU" sz="800" b="0" i="0" u="none" strike="noStrike" kern="1200" baseline="0" dirty="0">
+                        <a:solidFill>
+                          <a:schemeClr val="tx1"/>
+                        </a:solidFill>
+                        <a:effectLst/>
+                        <a:latin typeface="Times New Roman" panose="02020603050405020304" pitchFamily="18" charset="0"/>
+                        <a:ea typeface="+mn-ea"/>
+                        <a:cs typeface="Times New Roman" panose="02020603050405020304" pitchFamily="18" charset="0"/>
+                      </a:endParaRPr>
+                    </a:p>
+                  </a:txBody>
+                  <a:tcPr marL="0" marR="0" marT="0" marB="0" anchor="ctr">
+                    <a:lnL w="6350" cap="flat" cmpd="sng" algn="ctr">
+                      <a:solidFill>
+                        <a:schemeClr val="bg1">
+                          <a:lumMod val="65000"/>
+                        </a:schemeClr>
+                      </a:solidFill>
+                      <a:prstDash val="solid"/>
+                      <a:round/>
+                      <a:headEnd type="none" w="med" len="med"/>
+                      <a:tailEnd type="none" w="med" len="med"/>
+                    </a:lnL>
+                    <a:lnR w="6350" cap="flat" cmpd="sng" algn="ctr">
+                      <a:solidFill>
+                        <a:schemeClr val="bg1">
+                          <a:lumMod val="65000"/>
+                        </a:schemeClr>
+                      </a:solidFill>
+                      <a:prstDash val="solid"/>
+                      <a:round/>
+                      <a:headEnd type="none" w="med" len="med"/>
+                      <a:tailEnd type="none" w="med" len="med"/>
+                    </a:lnR>
+                    <a:lnT w="6350" cap="flat" cmpd="sng" algn="ctr">
+                      <a:solidFill>
+                        <a:schemeClr val="bg1">
+                          <a:lumMod val="65000"/>
+                        </a:schemeClr>
+                      </a:solidFill>
+                      <a:prstDash val="solid"/>
+                      <a:round/>
+                      <a:headEnd type="none" w="med" len="med"/>
+                      <a:tailEnd type="none" w="med" len="med"/>
+                    </a:lnT>
+                    <a:lnB w="6350" cap="flat" cmpd="sng" algn="ctr">
+                      <a:solidFill>
+                        <a:schemeClr val="bg1">
+                          <a:lumMod val="65000"/>
+                        </a:schemeClr>
+                      </a:solidFill>
+                      <a:prstDash val="solid"/>
+                      <a:round/>
+                      <a:headEnd type="none" w="med" len="med"/>
+                      <a:tailEnd type="none" w="med" len="med"/>
+                    </a:lnB>
+                    <a:solidFill>
+                      <a:schemeClr val="bg1"/>
+                    </a:solidFill>
+                  </a:tcPr>
+                </a:tc>
               </a:tr>
             </a:tbl>
           </a:graphicData>
@@ -6155,7 +6908,7 @@
         </p:nvSpPr>
         <p:spPr>
           <a:xfrm>
-            <a:off x="6290395" y="417833"/>
+            <a:off x="6261181" y="22398"/>
             <a:ext cx="6484760" cy="281231"/>
           </a:xfrm>
           <a:prstGeom prst="rect">
@@ -6197,14 +6950,14 @@
           <p:nvPr>
             <p:extLst>
               <p:ext uri="{D42A27DB-BD31-4B8C-83A1-F6EECF244321}">
-                <p14:modId xmlns:p14="http://schemas.microsoft.com/office/powerpoint/2010/main" val="3414288338"/>
+                <p14:modId xmlns:p14="http://schemas.microsoft.com/office/powerpoint/2010/main" val="2820339288"/>
               </p:ext>
             </p:extLst>
           </p:nvPr>
         </p:nvGraphicFramePr>
         <p:xfrm>
-          <a:off x="6040253" y="722189"/>
-          <a:ext cx="6552808" cy="1643032"/>
+          <a:off x="6034054" y="255347"/>
+          <a:ext cx="6582281" cy="1597387"/>
         </p:xfrm>
         <a:graphic>
           <a:graphicData uri="http://schemas.openxmlformats.org/drawingml/2006/table">
@@ -6214,61 +6967,61 @@
                 <a:gridCol w="275144">
                   <a:extLst>
                     <a:ext uri="{9D8B030D-6E8A-4147-A177-3AD203B41FA5}">
-                      <a16:colId xmlns="" xmlns:a16="http://schemas.microsoft.com/office/drawing/2014/main" val="20000"/>
+                      <a16:colId xmlns:a16="http://schemas.microsoft.com/office/drawing/2014/main" xmlns="" val="20000"/>
                     </a:ext>
                   </a:extLst>
                 </a:gridCol>
                 <a:gridCol w="748096">
                   <a:extLst>
                     <a:ext uri="{9D8B030D-6E8A-4147-A177-3AD203B41FA5}">
-                      <a16:colId xmlns="" xmlns:a16="http://schemas.microsoft.com/office/drawing/2014/main" val="20001"/>
+                      <a16:colId xmlns:a16="http://schemas.microsoft.com/office/drawing/2014/main" xmlns="" val="20001"/>
                     </a:ext>
                   </a:extLst>
                 </a:gridCol>
-                <a:gridCol w="876936">
+                <a:gridCol w="876937">
                   <a:extLst>
                     <a:ext uri="{9D8B030D-6E8A-4147-A177-3AD203B41FA5}">
-                      <a16:colId xmlns="" xmlns:a16="http://schemas.microsoft.com/office/drawing/2014/main" val="20002"/>
+                      <a16:colId xmlns:a16="http://schemas.microsoft.com/office/drawing/2014/main" xmlns="" val="20002"/>
                     </a:ext>
                   </a:extLst>
                 </a:gridCol>
                 <a:gridCol w="918548">
                   <a:extLst>
                     <a:ext uri="{9D8B030D-6E8A-4147-A177-3AD203B41FA5}">
-                      <a16:colId xmlns="" xmlns:a16="http://schemas.microsoft.com/office/drawing/2014/main" val="20003"/>
+                      <a16:colId xmlns:a16="http://schemas.microsoft.com/office/drawing/2014/main" xmlns="" val="20003"/>
                     </a:ext>
                   </a:extLst>
                 </a:gridCol>
-                <a:gridCol w="843444">
+                <a:gridCol w="872913">
                   <a:extLst>
                     <a:ext uri="{9D8B030D-6E8A-4147-A177-3AD203B41FA5}">
-                      <a16:colId xmlns="" xmlns:a16="http://schemas.microsoft.com/office/drawing/2014/main" val="20004"/>
+                      <a16:colId xmlns:a16="http://schemas.microsoft.com/office/drawing/2014/main" xmlns="" val="20004"/>
                     </a:ext>
                   </a:extLst>
                 </a:gridCol>
-                <a:gridCol w="909416">
+                <a:gridCol w="909417">
                   <a:extLst>
                     <a:ext uri="{9D8B030D-6E8A-4147-A177-3AD203B41FA5}">
-                      <a16:colId xmlns="" xmlns:a16="http://schemas.microsoft.com/office/drawing/2014/main" val="20005"/>
+                      <a16:colId xmlns:a16="http://schemas.microsoft.com/office/drawing/2014/main" xmlns="" val="20005"/>
                     </a:ext>
                   </a:extLst>
                 </a:gridCol>
                 <a:gridCol w="1201726">
                   <a:extLst>
                     <a:ext uri="{9D8B030D-6E8A-4147-A177-3AD203B41FA5}">
-                      <a16:colId xmlns="" xmlns:a16="http://schemas.microsoft.com/office/drawing/2014/main" val="20006"/>
+                      <a16:colId xmlns:a16="http://schemas.microsoft.com/office/drawing/2014/main" xmlns="" val="20006"/>
                     </a:ext>
                   </a:extLst>
                 </a:gridCol>
-                <a:gridCol w="779498">
+                <a:gridCol w="779500">
                   <a:extLst>
                     <a:ext uri="{9D8B030D-6E8A-4147-A177-3AD203B41FA5}">
-                      <a16:colId xmlns="" xmlns:a16="http://schemas.microsoft.com/office/drawing/2014/main" val="20007"/>
+                      <a16:colId xmlns:a16="http://schemas.microsoft.com/office/drawing/2014/main" xmlns="" val="20007"/>
                     </a:ext>
                   </a:extLst>
                 </a:gridCol>
               </a:tblGrid>
-              <a:tr h="394250">
+              <a:tr h="337576">
                 <a:tc>
                   <a:txBody>
                     <a:bodyPr/>
@@ -6281,7 +7034,7 @@
                             <a:srgbClr val="000000"/>
                           </a:solidFill>
                           <a:effectLst/>
-                          <a:latin typeface="+mn-lt"/>
+                          <a:latin typeface="Times New Roman" panose="02020603050405020304" pitchFamily="18" charset="0"/>
                         </a:rPr>
                         <a:t>№</a:t>
                       </a:r>
@@ -6290,7 +7043,7 @@
                           <a:srgbClr val="000000"/>
                         </a:solidFill>
                         <a:effectLst/>
-                        <a:latin typeface="+mn-lt"/>
+                        <a:latin typeface="Times New Roman" panose="02020603050405020304" pitchFamily="18" charset="0"/>
                       </a:endParaRPr>
                     </a:p>
                     <a:p>
@@ -6301,7 +7054,7 @@
                             <a:srgbClr val="000000"/>
                           </a:solidFill>
                           <a:effectLst/>
-                          <a:latin typeface="+mn-lt"/>
+                          <a:latin typeface="Times New Roman" panose="02020603050405020304" pitchFamily="18" charset="0"/>
                         </a:rPr>
                         <a:t>п/п</a:t>
                       </a:r>
@@ -6310,7 +7063,7 @@
                           <a:srgbClr val="000000"/>
                         </a:solidFill>
                         <a:effectLst/>
-                        <a:latin typeface="+mn-lt"/>
+                        <a:latin typeface="Times New Roman" panose="02020603050405020304" pitchFamily="18" charset="0"/>
                       </a:endParaRPr>
                     </a:p>
                   </a:txBody>
@@ -6378,7 +7131,7 @@
                             <a:srgbClr val="000000"/>
                           </a:solidFill>
                           <a:effectLst/>
-                          <a:latin typeface="+mn-lt"/>
+                          <a:latin typeface="Times New Roman" panose="02020603050405020304" pitchFamily="18" charset="0"/>
                         </a:rPr>
                         <a:t>Адрес</a:t>
                       </a:r>
@@ -6448,7 +7201,7 @@
                             <a:srgbClr val="000000"/>
                           </a:solidFill>
                           <a:effectLst/>
-                          <a:latin typeface="+mn-lt"/>
+                          <a:latin typeface="Times New Roman" panose="02020603050405020304" pitchFamily="18" charset="0"/>
                         </a:rPr>
                         <a:t>Группа инвалидности</a:t>
                       </a:r>
@@ -6518,7 +7271,7 @@
                             <a:srgbClr val="000000"/>
                           </a:solidFill>
                           <a:effectLst/>
-                          <a:latin typeface="+mn-lt"/>
+                          <a:latin typeface="Times New Roman" panose="02020603050405020304" pitchFamily="18" charset="0"/>
                         </a:rPr>
                         <a:t>Необходимость пользования </a:t>
                       </a:r>
@@ -6528,7 +7281,7 @@
                             <a:srgbClr val="000000"/>
                           </a:solidFill>
                           <a:effectLst/>
-                          <a:latin typeface="+mn-lt"/>
+                          <a:latin typeface="Times New Roman" panose="02020603050405020304" pitchFamily="18" charset="0"/>
                         </a:rPr>
                       </a:br>
                       <a:r>
@@ -6537,7 +7290,7 @@
                             <a:srgbClr val="000000"/>
                           </a:solidFill>
                           <a:effectLst/>
-                          <a:latin typeface="+mn-lt"/>
+                          <a:latin typeface="Times New Roman" panose="02020603050405020304" pitchFamily="18" charset="0"/>
                         </a:rPr>
                         <a:t>кресло-коляской</a:t>
                       </a:r>
@@ -6546,7 +7299,7 @@
                           <a:srgbClr val="000000"/>
                         </a:solidFill>
                         <a:effectLst/>
-                        <a:latin typeface="+mn-lt"/>
+                        <a:latin typeface="Times New Roman" panose="02020603050405020304" pitchFamily="18" charset="0"/>
                       </a:endParaRPr>
                     </a:p>
                   </a:txBody>
@@ -6614,7 +7367,7 @@
                             <a:srgbClr val="000000"/>
                           </a:solidFill>
                           <a:effectLst/>
-                          <a:latin typeface="+mn-lt"/>
+                          <a:latin typeface="Times New Roman" panose="02020603050405020304" pitchFamily="18" charset="0"/>
                         </a:rPr>
                         <a:t>Одинокое проживание</a:t>
                       </a:r>
@@ -6623,7 +7376,7 @@
                           <a:srgbClr val="000000"/>
                         </a:solidFill>
                         <a:effectLst/>
-                        <a:latin typeface="+mn-lt"/>
+                        <a:latin typeface="Times New Roman" panose="02020603050405020304" pitchFamily="18" charset="0"/>
                       </a:endParaRPr>
                     </a:p>
                   </a:txBody>
@@ -6691,7 +7444,7 @@
                             <a:srgbClr val="000000"/>
                           </a:solidFill>
                           <a:effectLst/>
-                          <a:latin typeface="+mn-lt"/>
+                          <a:latin typeface="Times New Roman" panose="02020603050405020304" pitchFamily="18" charset="0"/>
                         </a:rPr>
                         <a:t>Улучшение</a:t>
                       </a:r>
@@ -6701,7 +7454,7 @@
                             <a:srgbClr val="000000"/>
                           </a:solidFill>
                           <a:effectLst/>
-                          <a:latin typeface="+mn-lt"/>
+                          <a:latin typeface="Times New Roman" panose="02020603050405020304" pitchFamily="18" charset="0"/>
                         </a:rPr>
                         <a:t> условий</a:t>
                       </a:r>
@@ -6710,7 +7463,7 @@
                           <a:srgbClr val="000000"/>
                         </a:solidFill>
                         <a:effectLst/>
-                        <a:latin typeface="+mn-lt"/>
+                        <a:latin typeface="Times New Roman" panose="02020603050405020304" pitchFamily="18" charset="0"/>
                       </a:endParaRPr>
                     </a:p>
                   </a:txBody>
@@ -6778,7 +7531,7 @@
                             <a:srgbClr val="000000"/>
                           </a:solidFill>
                           <a:effectLst/>
-                          <a:latin typeface="+mn-lt"/>
+                          <a:latin typeface="Times New Roman" panose="02020603050405020304" pitchFamily="18" charset="0"/>
                         </a:rPr>
                         <a:t>Приспособление</a:t>
                       </a:r>
@@ -6787,7 +7540,7 @@
                           <a:srgbClr val="000000"/>
                         </a:solidFill>
                         <a:effectLst/>
-                        <a:latin typeface="+mn-lt"/>
+                        <a:latin typeface="Times New Roman" panose="02020603050405020304" pitchFamily="18" charset="0"/>
                       </a:endParaRPr>
                     </a:p>
                   </a:txBody>
@@ -6855,7 +7608,7 @@
                             <a:srgbClr val="000000"/>
                           </a:solidFill>
                           <a:effectLst/>
-                          <a:latin typeface="+mn-lt"/>
+                          <a:latin typeface="Times New Roman" panose="02020603050405020304" pitchFamily="18" charset="0"/>
                         </a:rPr>
                         <a:t>Всего Кол-во,</a:t>
                       </a:r>
@@ -6868,7 +7621,7 @@
                             <a:srgbClr val="000000"/>
                           </a:solidFill>
                           <a:effectLst/>
-                          <a:latin typeface="+mn-lt"/>
+                          <a:latin typeface="Times New Roman" panose="02020603050405020304" pitchFamily="18" charset="0"/>
                         </a:rPr>
                         <a:t> чел.</a:t>
                       </a:r>
@@ -6877,7 +7630,7 @@
                           <a:srgbClr val="000000"/>
                         </a:solidFill>
                         <a:effectLst/>
-                        <a:latin typeface="+mn-lt"/>
+                        <a:latin typeface="Times New Roman" panose="02020603050405020304" pitchFamily="18" charset="0"/>
                       </a:endParaRPr>
                     </a:p>
                   </a:txBody>
@@ -6935,11 +7688,11 @@
                 </a:tc>
                 <a:extLst>
                   <a:ext uri="{0D108BD9-81ED-4DB2-BD59-A6C34878D82A}">
-                    <a16:rowId xmlns="" xmlns:a16="http://schemas.microsoft.com/office/drawing/2014/main" val="10000"/>
+                    <a16:rowId xmlns:a16="http://schemas.microsoft.com/office/drawing/2014/main" xmlns="" val="10000"/>
                   </a:ext>
                 </a:extLst>
               </a:tr>
-              <a:tr h="61008">
+              <a:tr h="145655">
                 <a:tc>
                   <a:txBody>
                     <a:bodyPr/>
@@ -6947,7 +7700,7 @@
                     <a:p>
                       <a:pPr algn="ctr" fontAlgn="ctr"/>
                       <a:r>
-                        <a:rPr lang="ru-RU" sz="1000" b="0" i="0" u="none" strike="noStrike" dirty="0" smtClean="0">
+                        <a:rPr lang="ru-RU" sz="800" b="0" i="0" u="none" strike="noStrike" baseline="0" dirty="0" smtClean="0">
                           <a:solidFill>
                             <a:srgbClr val="000000"/>
                           </a:solidFill>
@@ -6957,7 +7710,7 @@
                         </a:rPr>
                         <a:t>1</a:t>
                       </a:r>
-                      <a:endParaRPr lang="ru-RU" sz="1000" b="0" i="0" u="none" strike="noStrike" dirty="0">
+                      <a:endParaRPr lang="ru-RU" sz="800" b="0" i="0" u="none" strike="noStrike" baseline="0" dirty="0">
                         <a:solidFill>
                           <a:srgbClr val="000000"/>
                         </a:solidFill>
@@ -7028,7 +7781,7 @@
                         </a:spcAft>
                       </a:pPr>
                       <a:r>
-                        <a:rPr lang="ru-RU" sz="800" dirty="0" smtClean="0">
+                        <a:rPr lang="ru-RU" sz="800" baseline="0" dirty="0" smtClean="0">
                           <a:solidFill>
                             <a:schemeClr val="tx1"/>
                           </a:solidFill>
@@ -7039,7 +7792,7 @@
                         </a:rPr>
                         <a:t>тест</a:t>
                       </a:r>
-                      <a:endParaRPr lang="ru-RU" sz="800" dirty="0">
+                      <a:endParaRPr lang="ru-RU" sz="800" baseline="0" dirty="0">
                         <a:solidFill>
                           <a:schemeClr val="tx1"/>
                         </a:solidFill>
@@ -7104,7 +7857,7 @@
                     <a:p>
                       <a:pPr algn="ctr" fontAlgn="ctr"/>
                       <a:r>
-                        <a:rPr lang="ru-RU" sz="1000" b="0" i="0" u="none" strike="noStrike" dirty="0" smtClean="0">
+                        <a:rPr lang="ru-RU" sz="800" b="0" i="0" u="none" strike="noStrike" baseline="0" dirty="0" smtClean="0">
                           <a:solidFill>
                             <a:schemeClr val="tx1"/>
                           </a:solidFill>
@@ -7114,7 +7867,7 @@
                         </a:rPr>
                         <a:t>тест</a:t>
                       </a:r>
-                      <a:endParaRPr lang="ru-RU" sz="1000" b="0" i="0" u="none" strike="noStrike" dirty="0">
+                      <a:endParaRPr lang="ru-RU" sz="800" b="0" i="0" u="none" strike="noStrike" baseline="0" dirty="0">
                         <a:solidFill>
                           <a:schemeClr val="tx1"/>
                         </a:solidFill>
@@ -7178,7 +7931,7 @@
                     <a:p>
                       <a:pPr algn="ctr" fontAlgn="ctr"/>
                       <a:r>
-                        <a:rPr lang="ru-RU" sz="1000" b="0" i="0" u="none" strike="noStrike" dirty="0" smtClean="0">
+                        <a:rPr lang="ru-RU" sz="800" b="0" i="0" u="none" strike="noStrike" baseline="0" dirty="0" smtClean="0">
                           <a:solidFill>
                             <a:schemeClr val="tx1"/>
                           </a:solidFill>
@@ -7188,7 +7941,7 @@
                         </a:rPr>
                         <a:t>тест</a:t>
                       </a:r>
-                      <a:endParaRPr lang="ru-RU" sz="1000" b="0" i="0" u="none" strike="noStrike" dirty="0">
+                      <a:endParaRPr lang="ru-RU" sz="800" b="0" i="0" u="none" strike="noStrike" baseline="0" dirty="0">
                         <a:solidFill>
                           <a:schemeClr val="tx1"/>
                         </a:solidFill>
@@ -7252,7 +8005,7 @@
                     <a:p>
                       <a:pPr algn="ctr" fontAlgn="ctr"/>
                       <a:r>
-                        <a:rPr lang="ru-RU" sz="1000" b="0" i="0" u="none" strike="noStrike" dirty="0" smtClean="0">
+                        <a:rPr lang="ru-RU" sz="800" b="0" i="0" u="none" strike="noStrike" baseline="0" dirty="0" smtClean="0">
                           <a:solidFill>
                             <a:schemeClr val="tx1"/>
                           </a:solidFill>
@@ -7262,7 +8015,7 @@
                         </a:rPr>
                         <a:t>тест</a:t>
                       </a:r>
-                      <a:endParaRPr lang="ru-RU" sz="1000" b="0" i="0" u="none" strike="noStrike" dirty="0">
+                      <a:endParaRPr lang="ru-RU" sz="800" b="0" i="0" u="none" strike="noStrike" baseline="0" dirty="0">
                         <a:solidFill>
                           <a:schemeClr val="tx1"/>
                         </a:solidFill>
@@ -7326,7 +8079,7 @@
                     <a:p>
                       <a:pPr algn="ctr" fontAlgn="ctr"/>
                       <a:r>
-                        <a:rPr lang="ru-RU" sz="1000" b="0" i="0" u="none" strike="noStrike" dirty="0" smtClean="0">
+                        <a:rPr lang="ru-RU" sz="800" b="0" i="0" u="none" strike="noStrike" baseline="0" dirty="0" smtClean="0">
                           <a:solidFill>
                             <a:schemeClr val="tx1"/>
                           </a:solidFill>
@@ -7336,7 +8089,7 @@
                         </a:rPr>
                         <a:t>тест</a:t>
                       </a:r>
-                      <a:endParaRPr lang="ru-RU" sz="1000" b="0" i="0" u="none" strike="noStrike" dirty="0">
+                      <a:endParaRPr lang="ru-RU" sz="800" b="0" i="0" u="none" strike="noStrike" baseline="0" dirty="0">
                         <a:solidFill>
                           <a:schemeClr val="tx1"/>
                         </a:solidFill>
@@ -7400,7 +8153,7 @@
                     <a:p>
                       <a:pPr algn="ctr" fontAlgn="ctr"/>
                       <a:r>
-                        <a:rPr lang="ru-RU" sz="1000" b="0" i="0" u="none" strike="noStrike" dirty="0" smtClean="0">
+                        <a:rPr lang="ru-RU" sz="800" b="0" i="0" u="none" strike="noStrike" baseline="0" dirty="0" smtClean="0">
                           <a:solidFill>
                             <a:schemeClr val="tx1"/>
                           </a:solidFill>
@@ -7410,7 +8163,7 @@
                         </a:rPr>
                         <a:t>тест</a:t>
                       </a:r>
-                      <a:endParaRPr lang="ru-RU" sz="1000" b="0" i="0" u="none" strike="noStrike" dirty="0">
+                      <a:endParaRPr lang="ru-RU" sz="800" b="0" i="0" u="none" strike="noStrike" baseline="0" dirty="0">
                         <a:solidFill>
                           <a:schemeClr val="tx1"/>
                         </a:solidFill>
@@ -7474,7 +8227,7 @@
                     <a:p>
                       <a:pPr algn="ctr" fontAlgn="ctr"/>
                       <a:r>
-                        <a:rPr lang="ru-RU" sz="1000" b="0" i="0" u="none" strike="noStrike" dirty="0" smtClean="0">
+                        <a:rPr lang="ru-RU" sz="800" b="0" i="0" u="none" strike="noStrike" baseline="0" dirty="0" smtClean="0">
                           <a:solidFill>
                             <a:schemeClr val="tx1"/>
                           </a:solidFill>
@@ -7484,7 +8237,7 @@
                         </a:rPr>
                         <a:t>тест</a:t>
                       </a:r>
-                      <a:endParaRPr lang="ru-RU" sz="1000" b="0" i="0" u="none" strike="noStrike" dirty="0">
+                      <a:endParaRPr lang="ru-RU" sz="800" b="0" i="0" u="none" strike="noStrike" baseline="0" dirty="0">
                         <a:solidFill>
                           <a:schemeClr val="tx1"/>
                         </a:solidFill>
@@ -7543,11 +8296,11 @@
                 </a:tc>
                 <a:extLst>
                   <a:ext uri="{0D108BD9-81ED-4DB2-BD59-A6C34878D82A}">
-                    <a16:rowId xmlns="" xmlns:a16="http://schemas.microsoft.com/office/drawing/2014/main" val="10001"/>
+                    <a16:rowId xmlns:a16="http://schemas.microsoft.com/office/drawing/2014/main" xmlns="" val="10001"/>
                   </a:ext>
                 </a:extLst>
               </a:tr>
-              <a:tr h="0">
+              <a:tr h="145655">
                 <a:tc gridSpan="8">
                   <a:txBody>
                     <a:bodyPr/>
@@ -7555,7 +8308,7 @@
                     <a:p>
                       <a:pPr algn="ctr" fontAlgn="ctr"/>
                       <a:r>
-                        <a:rPr lang="ru-RU" sz="1000" b="0" i="0" u="none" strike="noStrike" dirty="0" smtClean="0">
+                        <a:rPr lang="ru-RU" sz="800" b="0" i="0" u="none" strike="noStrike" dirty="0" smtClean="0">
                           <a:solidFill>
                             <a:srgbClr val="000000"/>
                           </a:solidFill>
@@ -7565,7 +8318,7 @@
                         </a:rPr>
                         <a:t>тест</a:t>
                       </a:r>
-                      <a:endParaRPr lang="ru-RU" sz="1000" b="0" i="0" u="none" strike="noStrike" dirty="0">
+                      <a:endParaRPr lang="ru-RU" sz="800" b="0" i="0" u="none" strike="noStrike" dirty="0">
                         <a:solidFill>
                           <a:srgbClr val="000000"/>
                         </a:solidFill>
@@ -8067,11 +8820,11 @@
                 </a:tc>
                 <a:extLst>
                   <a:ext uri="{0D108BD9-81ED-4DB2-BD59-A6C34878D82A}">
-                    <a16:rowId xmlns="" xmlns:a16="http://schemas.microsoft.com/office/drawing/2014/main" val="10002"/>
+                    <a16:rowId xmlns:a16="http://schemas.microsoft.com/office/drawing/2014/main" xmlns="" val="10002"/>
                   </a:ext>
                 </a:extLst>
               </a:tr>
-              <a:tr h="170108">
+              <a:tr h="145655">
                 <a:tc gridSpan="3">
                   <a:txBody>
                     <a:bodyPr/>
@@ -8095,35 +8848,35 @@
                         <a:defRPr/>
                       </a:pPr>
                       <a:r>
-                        <a:rPr lang="ru-RU" sz="1000" b="1" i="0" u="none" strike="noStrike" kern="1200" dirty="0" smtClean="0">
+                        <a:rPr lang="ru-RU" sz="800" b="1" i="0" u="none" strike="noStrike" kern="1200" baseline="0" dirty="0" smtClean="0">
                           <a:solidFill>
                             <a:srgbClr val="000000"/>
                           </a:solidFill>
                           <a:effectLst/>
-                          <a:latin typeface="+mn-lt"/>
+                          <a:latin typeface="Times New Roman" panose="02020603050405020304" pitchFamily="18" charset="0"/>
                           <a:ea typeface="+mn-ea"/>
                           <a:cs typeface="+mn-cs"/>
                         </a:rPr>
                         <a:t>Итого</a:t>
                       </a:r>
                       <a:r>
-                        <a:rPr lang="en-US" sz="1000" b="1" i="0" u="none" strike="noStrike" kern="1200" dirty="0" smtClean="0">
+                        <a:rPr lang="en-US" sz="800" b="1" i="0" u="none" strike="noStrike" kern="1200" baseline="0" dirty="0" smtClean="0">
                           <a:solidFill>
                             <a:srgbClr val="000000"/>
                           </a:solidFill>
                           <a:effectLst/>
-                          <a:latin typeface="+mn-lt"/>
+                          <a:latin typeface="Times New Roman" panose="02020603050405020304" pitchFamily="18" charset="0"/>
                           <a:ea typeface="+mn-ea"/>
                           <a:cs typeface="+mn-cs"/>
                         </a:rPr>
                         <a:t>:</a:t>
                       </a:r>
-                      <a:endParaRPr lang="ru-RU" sz="1000" b="1" i="0" u="none" strike="noStrike" kern="1200" dirty="0">
+                      <a:endParaRPr lang="ru-RU" sz="800" b="1" i="0" u="none" strike="noStrike" kern="1200" baseline="0" dirty="0">
                         <a:solidFill>
                           <a:srgbClr val="000000"/>
                         </a:solidFill>
                         <a:effectLst/>
-                        <a:latin typeface="+mn-lt"/>
+                        <a:latin typeface="Times New Roman" panose="02020603050405020304" pitchFamily="18" charset="0"/>
                         <a:ea typeface="+mn-ea"/>
                         <a:cs typeface="+mn-cs"/>
                       </a:endParaRPr>
@@ -8253,7 +9006,7 @@
                     <a:p>
                       <a:pPr marL="0" algn="ctr" defTabSz="1280160" rtl="0" eaLnBrk="1" fontAlgn="ctr" latinLnBrk="0" hangingPunct="1"/>
                       <a:r>
-                        <a:rPr lang="ru-RU" sz="1000" b="1" i="0" u="none" strike="noStrike" kern="1200" dirty="0" smtClean="0">
+                        <a:rPr lang="ru-RU" sz="800" b="1" i="0" u="none" strike="noStrike" kern="1200" baseline="0" dirty="0" smtClean="0">
                           <a:solidFill>
                             <a:srgbClr val="000000"/>
                           </a:solidFill>
@@ -8264,7 +9017,7 @@
                         </a:rPr>
                         <a:t>0</a:t>
                       </a:r>
-                      <a:endParaRPr lang="ru-RU" sz="1000" b="1" i="0" u="none" strike="noStrike" kern="1200" dirty="0">
+                      <a:endParaRPr lang="ru-RU" sz="800" b="1" i="0" u="none" strike="noStrike" kern="1200" baseline="0" dirty="0">
                         <a:solidFill>
                           <a:srgbClr val="000000"/>
                         </a:solidFill>
@@ -8334,7 +9087,7 @@
                     <a:p>
                       <a:pPr algn="ctr" fontAlgn="ctr"/>
                       <a:r>
-                        <a:rPr lang="ru-RU" sz="1000" b="1" i="0" u="none" strike="noStrike" dirty="0" smtClean="0">
+                        <a:rPr lang="ru-RU" sz="800" b="1" i="0" u="none" strike="noStrike" baseline="0" dirty="0" smtClean="0">
                           <a:solidFill>
                             <a:srgbClr val="000000"/>
                           </a:solidFill>
@@ -8405,7 +9158,7 @@
                     <a:p>
                       <a:pPr algn="ctr" fontAlgn="ctr"/>
                       <a:r>
-                        <a:rPr lang="ru-RU" sz="1000" b="1" i="0" u="none" strike="noStrike" dirty="0" smtClean="0">
+                        <a:rPr lang="ru-RU" sz="800" b="1" i="0" u="none" strike="noStrike" baseline="0" dirty="0" smtClean="0">
                           <a:solidFill>
                             <a:srgbClr val="000000"/>
                           </a:solidFill>
@@ -8476,7 +9229,7 @@
                     <a:p>
                       <a:pPr marL="0" algn="ctr" defTabSz="1280160" rtl="0" eaLnBrk="1" fontAlgn="ctr" latinLnBrk="0" hangingPunct="1"/>
                       <a:r>
-                        <a:rPr lang="ru-RU" sz="1000" b="1" i="0" u="none" strike="noStrike" kern="1200" dirty="0" smtClean="0">
+                        <a:rPr lang="ru-RU" sz="800" b="1" i="0" u="none" strike="noStrike" kern="1200" baseline="0" dirty="0" smtClean="0">
                           <a:solidFill>
                             <a:schemeClr val="tx1"/>
                           </a:solidFill>
@@ -8548,7 +9301,7 @@
                     <a:p>
                       <a:pPr algn="ctr" fontAlgn="ctr"/>
                       <a:r>
-                        <a:rPr lang="ru-RU" sz="1000" b="1" i="0" u="none" strike="noStrike" dirty="0" smtClean="0">
+                        <a:rPr lang="ru-RU" sz="800" b="1" i="0" u="none" strike="noStrike" baseline="0" dirty="0" smtClean="0">
                           <a:solidFill>
                             <a:srgbClr val="000000"/>
                           </a:solidFill>
@@ -8614,11 +9367,11 @@
                 </a:tc>
                 <a:extLst>
                   <a:ext uri="{0D108BD9-81ED-4DB2-BD59-A6C34878D82A}">
-                    <a16:rowId xmlns="" xmlns:a16="http://schemas.microsoft.com/office/drawing/2014/main" val="10003"/>
+                    <a16:rowId xmlns:a16="http://schemas.microsoft.com/office/drawing/2014/main" xmlns="" val="10003"/>
                   </a:ext>
                 </a:extLst>
               </a:tr>
-              <a:tr h="170108">
+              <a:tr h="145655">
                 <a:tc gridSpan="7">
                   <a:txBody>
                     <a:bodyPr/>
@@ -8642,12 +9395,12 @@
                         <a:defRPr/>
                       </a:pPr>
                       <a:r>
-                        <a:rPr lang="ru-RU" sz="1000" b="1" i="0" u="none" strike="noStrike" dirty="0" smtClean="0">
+                        <a:rPr lang="ru-RU" sz="800" b="1" i="0" u="none" strike="noStrike" baseline="0" dirty="0" smtClean="0">
                           <a:solidFill>
                             <a:srgbClr val="000000"/>
                           </a:solidFill>
                           <a:effectLst/>
-                          <a:latin typeface="+mn-lt"/>
+                          <a:latin typeface="Times New Roman" panose="02020603050405020304" pitchFamily="18" charset="0"/>
                         </a:rPr>
                         <a:t>Итого 1-й группы инвалидности:</a:t>
                       </a:r>
@@ -8977,7 +9730,7 @@
                     <a:p>
                       <a:pPr algn="ctr" fontAlgn="ctr"/>
                       <a:r>
-                        <a:rPr lang="ru-RU" sz="1000" b="1" i="0" u="none" strike="noStrike" dirty="0" smtClean="0">
+                        <a:rPr lang="ru-RU" sz="800" b="1" i="0" u="none" strike="noStrike" baseline="0" dirty="0" smtClean="0">
                           <a:solidFill>
                             <a:srgbClr val="000000"/>
                           </a:solidFill>
@@ -9038,11 +9791,11 @@
                 </a:tc>
                 <a:extLst>
                   <a:ext uri="{0D108BD9-81ED-4DB2-BD59-A6C34878D82A}">
-                    <a16:rowId xmlns="" xmlns:a16="http://schemas.microsoft.com/office/drawing/2014/main" val="10004"/>
+                    <a16:rowId xmlns:a16="http://schemas.microsoft.com/office/drawing/2014/main" xmlns="" val="10004"/>
                   </a:ext>
                 </a:extLst>
               </a:tr>
-              <a:tr h="170108">
+              <a:tr h="145655">
                 <a:tc gridSpan="7">
                   <a:txBody>
                     <a:bodyPr/>
@@ -9066,12 +9819,12 @@
                         <a:defRPr/>
                       </a:pPr>
                       <a:r>
-                        <a:rPr lang="ru-RU" sz="1000" b="1" i="0" u="none" strike="noStrike" dirty="0" smtClean="0">
+                        <a:rPr lang="ru-RU" sz="800" b="1" i="0" u="none" strike="noStrike" baseline="0" dirty="0" smtClean="0">
                           <a:solidFill>
                             <a:srgbClr val="000000"/>
                           </a:solidFill>
                           <a:effectLst/>
-                          <a:latin typeface="+mn-lt"/>
+                          <a:latin typeface="Times New Roman" panose="02020603050405020304" pitchFamily="18" charset="0"/>
                         </a:rPr>
                         <a:t>Итого 2-й группы инвалидности:</a:t>
                       </a:r>
@@ -9446,7 +10199,7 @@
                     <a:p>
                       <a:pPr algn="ctr" fontAlgn="ctr"/>
                       <a:r>
-                        <a:rPr lang="ru-RU" sz="1000" b="1" i="0" u="none" strike="noStrike" dirty="0" smtClean="0">
+                        <a:rPr lang="ru-RU" sz="800" b="1" i="0" u="none" strike="noStrike" baseline="0" dirty="0" smtClean="0">
                           <a:solidFill>
                             <a:srgbClr val="000000"/>
                           </a:solidFill>
@@ -9456,7 +10209,7 @@
                         </a:rPr>
                         <a:t>0</a:t>
                       </a:r>
-                      <a:endParaRPr lang="ru-RU" sz="1000" b="1" i="0" u="none" strike="noStrike" dirty="0">
+                      <a:endParaRPr lang="ru-RU" sz="800" b="1" i="0" u="none" strike="noStrike" baseline="0" dirty="0">
                         <a:solidFill>
                           <a:srgbClr val="000000"/>
                         </a:solidFill>
@@ -9515,11 +10268,11 @@
                 </a:tc>
                 <a:extLst>
                   <a:ext uri="{0D108BD9-81ED-4DB2-BD59-A6C34878D82A}">
-                    <a16:rowId xmlns="" xmlns:a16="http://schemas.microsoft.com/office/drawing/2014/main" val="10005"/>
+                    <a16:rowId xmlns:a16="http://schemas.microsoft.com/office/drawing/2014/main" xmlns="" val="10005"/>
                   </a:ext>
                 </a:extLst>
               </a:tr>
-              <a:tr h="170108">
+              <a:tr h="145655">
                 <a:tc gridSpan="7">
                   <a:txBody>
                     <a:bodyPr/>
@@ -9543,32 +10296,32 @@
                         <a:defRPr/>
                       </a:pPr>
                       <a:r>
-                        <a:rPr lang="ru-RU" sz="1000" b="1" i="0" u="none" strike="noStrike" dirty="0" smtClean="0">
+                        <a:rPr lang="ru-RU" sz="800" b="1" i="0" u="none" strike="noStrike" baseline="0" dirty="0" smtClean="0">
                           <a:solidFill>
                             <a:srgbClr val="000000"/>
                           </a:solidFill>
                           <a:effectLst/>
-                          <a:latin typeface="+mn-lt"/>
+                          <a:latin typeface="Times New Roman" panose="02020603050405020304" pitchFamily="18" charset="0"/>
                         </a:rPr>
                         <a:t>Итого </a:t>
                       </a:r>
                       <a:r>
-                        <a:rPr lang="en-US" sz="1000" b="1" i="0" u="none" strike="noStrike" dirty="0" smtClean="0">
+                        <a:rPr lang="en-US" sz="800" b="1" i="0" u="none" strike="noStrike" baseline="0" dirty="0" smtClean="0">
                           <a:solidFill>
                             <a:srgbClr val="000000"/>
                           </a:solidFill>
                           <a:effectLst/>
-                          <a:latin typeface="+mn-lt"/>
+                          <a:latin typeface="Times New Roman" panose="02020603050405020304" pitchFamily="18" charset="0"/>
                         </a:rPr>
                         <a:t>3</a:t>
                       </a:r>
                       <a:r>
-                        <a:rPr lang="ru-RU" sz="1000" b="1" i="0" u="none" strike="noStrike" dirty="0" smtClean="0">
+                        <a:rPr lang="ru-RU" sz="800" b="1" i="0" u="none" strike="noStrike" baseline="0" dirty="0" smtClean="0">
                           <a:solidFill>
                             <a:srgbClr val="000000"/>
                           </a:solidFill>
                           <a:effectLst/>
-                          <a:latin typeface="+mn-lt"/>
+                          <a:latin typeface="Times New Roman" panose="02020603050405020304" pitchFamily="18" charset="0"/>
                         </a:rPr>
                         <a:t>-й группы инвалидности:</a:t>
                       </a:r>
@@ -9943,7 +10696,7 @@
                     <a:p>
                       <a:pPr algn="ctr" fontAlgn="ctr"/>
                       <a:r>
-                        <a:rPr lang="ru-RU" sz="1000" b="1" i="0" u="none" strike="noStrike" dirty="0" smtClean="0">
+                        <a:rPr lang="ru-RU" sz="800" b="1" i="0" u="none" strike="noStrike" baseline="0" dirty="0" smtClean="0">
                           <a:solidFill>
                             <a:srgbClr val="000000"/>
                           </a:solidFill>
@@ -9953,7 +10706,7 @@
                         </a:rPr>
                         <a:t>0</a:t>
                       </a:r>
-                      <a:endParaRPr lang="ru-RU" sz="1000" b="1" i="0" u="none" strike="noStrike" dirty="0">
+                      <a:endParaRPr lang="ru-RU" sz="800" b="1" i="0" u="none" strike="noStrike" baseline="0" dirty="0">
                         <a:solidFill>
                           <a:srgbClr val="000000"/>
                         </a:solidFill>
@@ -10012,11 +10765,11 @@
                 </a:tc>
                 <a:extLst>
                   <a:ext uri="{0D108BD9-81ED-4DB2-BD59-A6C34878D82A}">
-                    <a16:rowId xmlns="" xmlns:a16="http://schemas.microsoft.com/office/drawing/2014/main" val="10006"/>
+                    <a16:rowId xmlns:a16="http://schemas.microsoft.com/office/drawing/2014/main" xmlns="" val="10006"/>
                   </a:ext>
                 </a:extLst>
               </a:tr>
-              <a:tr h="244500">
+              <a:tr h="212999">
                 <a:tc gridSpan="7">
                   <a:txBody>
                     <a:bodyPr/>
@@ -10040,52 +10793,52 @@
                         <a:defRPr/>
                       </a:pPr>
                       <a:r>
-                        <a:rPr lang="ru-RU" sz="1000" b="1" i="0" u="none" strike="noStrike" dirty="0" smtClean="0">
+                        <a:rPr lang="ru-RU" sz="800" b="1" i="0" u="none" strike="noStrike" dirty="0" smtClean="0">
                           <a:solidFill>
                             <a:srgbClr val="000000"/>
                           </a:solidFill>
                           <a:effectLst/>
-                          <a:latin typeface="+mn-lt"/>
+                          <a:latin typeface="Times New Roman" panose="02020603050405020304" pitchFamily="18" charset="0"/>
                         </a:rPr>
                         <a:t>Итого 4-й группы инвалидности (</a:t>
                       </a:r>
                       <a:r>
-                        <a:rPr lang="ru-RU" sz="1000" b="1" i="0" u="none" strike="noStrike" dirty="0" smtClean="0">
+                        <a:rPr lang="ru-RU" sz="800" b="1" i="0" u="none" strike="noStrike" dirty="0" smtClean="0">
                           <a:solidFill>
                             <a:schemeClr val="tx1"/>
                           </a:solidFill>
                           <a:effectLst/>
-                          <a:latin typeface="+mn-lt"/>
+                          <a:latin typeface="Times New Roman" panose="02020603050405020304" pitchFamily="18" charset="0"/>
                         </a:rPr>
                         <a:t>ребенок</a:t>
                       </a:r>
                       <a:r>
-                        <a:rPr lang="ru-RU" sz="1000" b="1" i="0" u="none" strike="noStrike" baseline="0" dirty="0" smtClean="0">
+                        <a:rPr lang="ru-RU" sz="800" b="1" i="0" u="none" strike="noStrike" baseline="0" dirty="0" smtClean="0">
                           <a:solidFill>
                             <a:schemeClr val="tx1"/>
                           </a:solidFill>
                           <a:effectLst/>
-                          <a:latin typeface="+mn-lt"/>
+                          <a:latin typeface="Times New Roman" panose="02020603050405020304" pitchFamily="18" charset="0"/>
                         </a:rPr>
                         <a:t>-</a:t>
                       </a:r>
                       <a:r>
-                        <a:rPr lang="ru-RU" sz="1000" b="1" i="0" u="none" strike="noStrike" dirty="0" smtClean="0">
+                        <a:rPr lang="ru-RU" sz="800" b="1" i="0" u="none" strike="noStrike" dirty="0" smtClean="0">
                           <a:solidFill>
                             <a:schemeClr val="tx1"/>
                           </a:solidFill>
                           <a:effectLst/>
-                          <a:latin typeface="+mn-lt"/>
+                          <a:latin typeface="Times New Roman" panose="02020603050405020304" pitchFamily="18" charset="0"/>
                         </a:rPr>
                         <a:t>инвалид</a:t>
                       </a:r>
                       <a:r>
-                        <a:rPr lang="ru-RU" sz="1000" b="1" i="0" u="none" strike="noStrike" dirty="0" smtClean="0">
+                        <a:rPr lang="ru-RU" sz="800" b="1" i="0" u="none" strike="noStrike" dirty="0" smtClean="0">
                           <a:solidFill>
                             <a:srgbClr val="000000"/>
                           </a:solidFill>
                           <a:effectLst/>
-                          <a:latin typeface="+mn-lt"/>
+                          <a:latin typeface="Times New Roman" panose="02020603050405020304" pitchFamily="18" charset="0"/>
                         </a:rPr>
                         <a:t>):</a:t>
                       </a:r>
@@ -10460,7 +11213,7 @@
                     <a:p>
                       <a:pPr algn="ctr" fontAlgn="ctr"/>
                       <a:r>
-                        <a:rPr lang="ru-RU" sz="1000" b="1" i="0" u="none" strike="noStrike" dirty="0" smtClean="0">
+                        <a:rPr lang="ru-RU" sz="800" b="1" i="0" u="none" strike="noStrike" dirty="0" smtClean="0">
                           <a:solidFill>
                             <a:srgbClr val="000000"/>
                           </a:solidFill>
@@ -10470,7 +11223,7 @@
                         </a:rPr>
                         <a:t>0</a:t>
                       </a:r>
-                      <a:endParaRPr lang="ru-RU" sz="1000" b="1" i="0" u="none" strike="noStrike" dirty="0">
+                      <a:endParaRPr lang="ru-RU" sz="800" b="1" i="0" u="none" strike="noStrike" dirty="0">
                         <a:solidFill>
                           <a:srgbClr val="000000"/>
                         </a:solidFill>
@@ -10529,9 +11282,511 @@
                 </a:tc>
                 <a:extLst>
                   <a:ext uri="{0D108BD9-81ED-4DB2-BD59-A6C34878D82A}">
-                    <a16:rowId xmlns="" xmlns:a16="http://schemas.microsoft.com/office/drawing/2014/main" val="10007"/>
+                    <a16:rowId xmlns:a16="http://schemas.microsoft.com/office/drawing/2014/main" xmlns="" val="10007"/>
                   </a:ext>
                 </a:extLst>
+              </a:tr>
+              <a:tr h="135173">
+                <a:tc>
+                  <a:txBody>
+                    <a:bodyPr/>
+                    <a:lstStyle/>
+                    <a:p>
+                      <a:pPr marL="0" marR="0" lvl="0" indent="0" algn="ctr" defTabSz="1280160" rtl="0" eaLnBrk="1" fontAlgn="ctr" latinLnBrk="0" hangingPunct="1">
+                        <a:lnSpc>
+                          <a:spcPct val="100000"/>
+                        </a:lnSpc>
+                        <a:spcBef>
+                          <a:spcPts val="0"/>
+                        </a:spcBef>
+                        <a:spcAft>
+                          <a:spcPts val="0"/>
+                        </a:spcAft>
+                        <a:buClrTx/>
+                        <a:buSzTx/>
+                        <a:buFontTx/>
+                        <a:buNone/>
+                        <a:tabLst/>
+                        <a:defRPr/>
+                      </a:pPr>
+                      <a:r>
+                        <a:rPr lang="en-US" sz="800" b="0" i="0" u="none" strike="noStrike" baseline="0" dirty="0" smtClean="0">
+                          <a:solidFill>
+                            <a:srgbClr val="000000"/>
+                          </a:solidFill>
+                          <a:effectLst/>
+                          <a:latin typeface="Times New Roman" panose="02020603050405020304" pitchFamily="18" charset="0"/>
+                        </a:rPr>
+                        <a:t> </a:t>
+                      </a:r>
+                      <a:endParaRPr lang="ru-RU" sz="800" b="0" i="0" u="none" strike="noStrike" baseline="0" dirty="0" smtClean="0">
+                        <a:solidFill>
+                          <a:srgbClr val="000000"/>
+                        </a:solidFill>
+                        <a:effectLst/>
+                        <a:latin typeface="Times New Roman" panose="02020603050405020304" pitchFamily="18" charset="0"/>
+                      </a:endParaRPr>
+                    </a:p>
+                  </a:txBody>
+                  <a:tcPr marL="9525" marR="72000" marT="9525" marB="0" anchor="ctr">
+                    <a:lnL w="19050" cap="flat" cmpd="sng" algn="ctr">
+                      <a:solidFill>
+                        <a:schemeClr val="bg1">
+                          <a:lumMod val="75000"/>
+                        </a:schemeClr>
+                      </a:solidFill>
+                      <a:prstDash val="solid"/>
+                      <a:round/>
+                      <a:headEnd type="none" w="med" len="med"/>
+                      <a:tailEnd type="none" w="med" len="med"/>
+                    </a:lnL>
+                    <a:lnR w="12700" cap="flat" cmpd="sng" algn="ctr">
+                      <a:solidFill>
+                        <a:schemeClr val="bg1">
+                          <a:lumMod val="75000"/>
+                        </a:schemeClr>
+                      </a:solidFill>
+                      <a:prstDash val="solid"/>
+                      <a:round/>
+                      <a:headEnd type="none" w="med" len="med"/>
+                      <a:tailEnd type="none" w="med" len="med"/>
+                    </a:lnR>
+                    <a:lnT w="12700" cap="flat" cmpd="sng" algn="ctr">
+                      <a:solidFill>
+                        <a:schemeClr val="bg1">
+                          <a:lumMod val="75000"/>
+                        </a:schemeClr>
+                      </a:solidFill>
+                      <a:prstDash val="solid"/>
+                      <a:round/>
+                      <a:headEnd type="none" w="med" len="med"/>
+                      <a:tailEnd type="none" w="med" len="med"/>
+                    </a:lnT>
+                    <a:lnB w="12700" cap="flat" cmpd="sng" algn="ctr">
+                      <a:solidFill>
+                        <a:schemeClr val="bg1">
+                          <a:lumMod val="75000"/>
+                        </a:schemeClr>
+                      </a:solidFill>
+                      <a:prstDash val="solid"/>
+                      <a:round/>
+                      <a:headEnd type="none" w="med" len="med"/>
+                      <a:tailEnd type="none" w="med" len="med"/>
+                    </a:lnB>
+                  </a:tcPr>
+                </a:tc>
+                <a:tc>
+                  <a:txBody>
+                    <a:bodyPr/>
+                    <a:lstStyle/>
+                    <a:p>
+                      <a:pPr algn="ctr"/>
+                      <a:r>
+                        <a:rPr lang="en-US" sz="800" b="0" i="0" baseline="0" smtClean="0">
+                          <a:latin typeface="Times New Roman" panose="02020603050405020304" pitchFamily="18" charset="0"/>
+                        </a:rPr>
+                        <a:t> </a:t>
+                      </a:r>
+                      <a:endParaRPr lang="ru-RU" sz="800" b="0" i="0" baseline="0" dirty="0">
+                        <a:latin typeface="Times New Roman" panose="02020603050405020304" pitchFamily="18" charset="0"/>
+                      </a:endParaRPr>
+                    </a:p>
+                  </a:txBody>
+                  <a:tcPr marL="9525" marR="72000" marT="9525" marB="0" anchor="ctr">
+                    <a:lnL w="12700" cap="flat" cmpd="sng" algn="ctr">
+                      <a:solidFill>
+                        <a:schemeClr val="bg1">
+                          <a:lumMod val="75000"/>
+                        </a:schemeClr>
+                      </a:solidFill>
+                      <a:prstDash val="solid"/>
+                      <a:round/>
+                      <a:headEnd type="none" w="med" len="med"/>
+                      <a:tailEnd type="none" w="med" len="med"/>
+                    </a:lnL>
+                    <a:lnR w="12700" cap="flat" cmpd="sng" algn="ctr">
+                      <a:solidFill>
+                        <a:schemeClr val="bg1">
+                          <a:lumMod val="75000"/>
+                        </a:schemeClr>
+                      </a:solidFill>
+                      <a:prstDash val="solid"/>
+                      <a:round/>
+                      <a:headEnd type="none" w="med" len="med"/>
+                      <a:tailEnd type="none" w="med" len="med"/>
+                    </a:lnR>
+                    <a:lnT w="12700" cap="flat" cmpd="sng" algn="ctr">
+                      <a:solidFill>
+                        <a:schemeClr val="bg1">
+                          <a:lumMod val="75000"/>
+                        </a:schemeClr>
+                      </a:solidFill>
+                      <a:prstDash val="solid"/>
+                      <a:round/>
+                      <a:headEnd type="none" w="med" len="med"/>
+                      <a:tailEnd type="none" w="med" len="med"/>
+                    </a:lnT>
+                    <a:lnB w="12700" cap="flat" cmpd="sng" algn="ctr">
+                      <a:solidFill>
+                        <a:schemeClr val="bg1">
+                          <a:lumMod val="75000"/>
+                        </a:schemeClr>
+                      </a:solidFill>
+                      <a:prstDash val="solid"/>
+                      <a:round/>
+                      <a:headEnd type="none" w="med" len="med"/>
+                      <a:tailEnd type="none" w="med" len="med"/>
+                    </a:lnB>
+                  </a:tcPr>
+                </a:tc>
+                <a:tc>
+                  <a:txBody>
+                    <a:bodyPr/>
+                    <a:lstStyle/>
+                    <a:p>
+                      <a:endParaRPr lang="ru-RU" sz="800" b="0" i="0" baseline="0" dirty="0">
+                        <a:latin typeface="Times New Roman" panose="02020603050405020304" pitchFamily="18" charset="0"/>
+                      </a:endParaRPr>
+                    </a:p>
+                  </a:txBody>
+                  <a:tcPr marL="9525" marR="72000" marT="9525" marB="0" anchor="ctr">
+                    <a:lnL w="12700" cap="flat" cmpd="sng" algn="ctr">
+                      <a:solidFill>
+                        <a:schemeClr val="bg1">
+                          <a:lumMod val="75000"/>
+                        </a:schemeClr>
+                      </a:solidFill>
+                      <a:prstDash val="solid"/>
+                      <a:round/>
+                      <a:headEnd type="none" w="med" len="med"/>
+                      <a:tailEnd type="none" w="med" len="med"/>
+                    </a:lnL>
+                    <a:lnR w="12700" cap="flat" cmpd="sng" algn="ctr">
+                      <a:solidFill>
+                        <a:schemeClr val="bg1">
+                          <a:lumMod val="75000"/>
+                        </a:schemeClr>
+                      </a:solidFill>
+                      <a:prstDash val="solid"/>
+                      <a:round/>
+                      <a:headEnd type="none" w="med" len="med"/>
+                      <a:tailEnd type="none" w="med" len="med"/>
+                    </a:lnR>
+                    <a:lnT w="12700" cap="flat" cmpd="sng" algn="ctr">
+                      <a:solidFill>
+                        <a:schemeClr val="bg1">
+                          <a:lumMod val="75000"/>
+                        </a:schemeClr>
+                      </a:solidFill>
+                      <a:prstDash val="solid"/>
+                      <a:round/>
+                      <a:headEnd type="none" w="med" len="med"/>
+                      <a:tailEnd type="none" w="med" len="med"/>
+                    </a:lnT>
+                    <a:lnB w="12700" cap="flat" cmpd="sng" algn="ctr">
+                      <a:solidFill>
+                        <a:schemeClr val="bg1">
+                          <a:lumMod val="75000"/>
+                        </a:schemeClr>
+                      </a:solidFill>
+                      <a:prstDash val="solid"/>
+                      <a:round/>
+                      <a:headEnd type="none" w="med" len="med"/>
+                      <a:tailEnd type="none" w="med" len="med"/>
+                    </a:lnB>
+                  </a:tcPr>
+                </a:tc>
+                <a:tc>
+                  <a:txBody>
+                    <a:bodyPr/>
+                    <a:lstStyle/>
+                    <a:p>
+                      <a:endParaRPr lang="ru-RU" sz="800" b="0" i="0" baseline="0" dirty="0">
+                        <a:latin typeface="Times New Roman" panose="02020603050405020304" pitchFamily="18" charset="0"/>
+                      </a:endParaRPr>
+                    </a:p>
+                  </a:txBody>
+                  <a:tcPr marL="9525" marR="72000" marT="9525" marB="0" anchor="ctr">
+                    <a:lnL w="12700" cap="flat" cmpd="sng" algn="ctr">
+                      <a:solidFill>
+                        <a:schemeClr val="bg1">
+                          <a:lumMod val="75000"/>
+                        </a:schemeClr>
+                      </a:solidFill>
+                      <a:prstDash val="solid"/>
+                      <a:round/>
+                      <a:headEnd type="none" w="med" len="med"/>
+                      <a:tailEnd type="none" w="med" len="med"/>
+                    </a:lnL>
+                    <a:lnR w="12700" cap="flat" cmpd="sng" algn="ctr">
+                      <a:solidFill>
+                        <a:schemeClr val="bg1">
+                          <a:lumMod val="75000"/>
+                        </a:schemeClr>
+                      </a:solidFill>
+                      <a:prstDash val="solid"/>
+                      <a:round/>
+                      <a:headEnd type="none" w="med" len="med"/>
+                      <a:tailEnd type="none" w="med" len="med"/>
+                    </a:lnR>
+                    <a:lnT w="12700" cap="flat" cmpd="sng" algn="ctr">
+                      <a:solidFill>
+                        <a:schemeClr val="bg1">
+                          <a:lumMod val="75000"/>
+                        </a:schemeClr>
+                      </a:solidFill>
+                      <a:prstDash val="solid"/>
+                      <a:round/>
+                      <a:headEnd type="none" w="med" len="med"/>
+                      <a:tailEnd type="none" w="med" len="med"/>
+                    </a:lnT>
+                    <a:lnB w="12700" cap="flat" cmpd="sng" algn="ctr">
+                      <a:solidFill>
+                        <a:schemeClr val="bg1">
+                          <a:lumMod val="75000"/>
+                        </a:schemeClr>
+                      </a:solidFill>
+                      <a:prstDash val="solid"/>
+                      <a:round/>
+                      <a:headEnd type="none" w="med" len="med"/>
+                      <a:tailEnd type="none" w="med" len="med"/>
+                    </a:lnB>
+                  </a:tcPr>
+                </a:tc>
+                <a:tc>
+                  <a:txBody>
+                    <a:bodyPr/>
+                    <a:lstStyle/>
+                    <a:p>
+                      <a:endParaRPr lang="ru-RU" sz="800" b="0" i="0" baseline="0" dirty="0">
+                        <a:latin typeface="Times New Roman" panose="02020603050405020304" pitchFamily="18" charset="0"/>
+                      </a:endParaRPr>
+                    </a:p>
+                  </a:txBody>
+                  <a:tcPr marL="9525" marR="72000" marT="9525" marB="0" anchor="ctr">
+                    <a:lnL w="12700" cap="flat" cmpd="sng" algn="ctr">
+                      <a:solidFill>
+                        <a:schemeClr val="bg1">
+                          <a:lumMod val="75000"/>
+                        </a:schemeClr>
+                      </a:solidFill>
+                      <a:prstDash val="solid"/>
+                      <a:round/>
+                      <a:headEnd type="none" w="med" len="med"/>
+                      <a:tailEnd type="none" w="med" len="med"/>
+                    </a:lnL>
+                    <a:lnR w="12700" cap="flat" cmpd="sng" algn="ctr">
+                      <a:solidFill>
+                        <a:schemeClr val="bg1">
+                          <a:lumMod val="75000"/>
+                        </a:schemeClr>
+                      </a:solidFill>
+                      <a:prstDash val="solid"/>
+                      <a:round/>
+                      <a:headEnd type="none" w="med" len="med"/>
+                      <a:tailEnd type="none" w="med" len="med"/>
+                    </a:lnR>
+                    <a:lnT w="12700" cap="flat" cmpd="sng" algn="ctr">
+                      <a:solidFill>
+                        <a:schemeClr val="bg1">
+                          <a:lumMod val="75000"/>
+                        </a:schemeClr>
+                      </a:solidFill>
+                      <a:prstDash val="solid"/>
+                      <a:round/>
+                      <a:headEnd type="none" w="med" len="med"/>
+                      <a:tailEnd type="none" w="med" len="med"/>
+                    </a:lnT>
+                    <a:lnB w="12700" cap="flat" cmpd="sng" algn="ctr">
+                      <a:solidFill>
+                        <a:schemeClr val="bg1">
+                          <a:lumMod val="75000"/>
+                        </a:schemeClr>
+                      </a:solidFill>
+                      <a:prstDash val="solid"/>
+                      <a:round/>
+                      <a:headEnd type="none" w="med" len="med"/>
+                      <a:tailEnd type="none" w="med" len="med"/>
+                    </a:lnB>
+                  </a:tcPr>
+                </a:tc>
+                <a:tc>
+                  <a:txBody>
+                    <a:bodyPr/>
+                    <a:lstStyle/>
+                    <a:p>
+                      <a:endParaRPr lang="ru-RU" sz="800" b="0" i="0" baseline="0" dirty="0">
+                        <a:latin typeface="Times New Roman" panose="02020603050405020304" pitchFamily="18" charset="0"/>
+                      </a:endParaRPr>
+                    </a:p>
+                  </a:txBody>
+                  <a:tcPr marL="9525" marR="72000" marT="9525" marB="0" anchor="ctr">
+                    <a:lnL w="12700" cap="flat" cmpd="sng" algn="ctr">
+                      <a:solidFill>
+                        <a:schemeClr val="bg1">
+                          <a:lumMod val="75000"/>
+                        </a:schemeClr>
+                      </a:solidFill>
+                      <a:prstDash val="solid"/>
+                      <a:round/>
+                      <a:headEnd type="none" w="med" len="med"/>
+                      <a:tailEnd type="none" w="med" len="med"/>
+                    </a:lnL>
+                    <a:lnR w="12700" cap="flat" cmpd="sng" algn="ctr">
+                      <a:solidFill>
+                        <a:schemeClr val="bg1">
+                          <a:lumMod val="75000"/>
+                        </a:schemeClr>
+                      </a:solidFill>
+                      <a:prstDash val="solid"/>
+                      <a:round/>
+                      <a:headEnd type="none" w="med" len="med"/>
+                      <a:tailEnd type="none" w="med" len="med"/>
+                    </a:lnR>
+                    <a:lnT w="12700" cap="flat" cmpd="sng" algn="ctr">
+                      <a:solidFill>
+                        <a:schemeClr val="bg1">
+                          <a:lumMod val="75000"/>
+                        </a:schemeClr>
+                      </a:solidFill>
+                      <a:prstDash val="solid"/>
+                      <a:round/>
+                      <a:headEnd type="none" w="med" len="med"/>
+                      <a:tailEnd type="none" w="med" len="med"/>
+                    </a:lnT>
+                    <a:lnB w="12700" cap="flat" cmpd="sng" algn="ctr">
+                      <a:solidFill>
+                        <a:schemeClr val="bg1">
+                          <a:lumMod val="75000"/>
+                        </a:schemeClr>
+                      </a:solidFill>
+                      <a:prstDash val="solid"/>
+                      <a:round/>
+                      <a:headEnd type="none" w="med" len="med"/>
+                      <a:tailEnd type="none" w="med" len="med"/>
+                    </a:lnB>
+                  </a:tcPr>
+                </a:tc>
+                <a:tc>
+                  <a:txBody>
+                    <a:bodyPr/>
+                    <a:lstStyle/>
+                    <a:p>
+                      <a:endParaRPr lang="ru-RU" sz="800" b="0" i="0" baseline="0" dirty="0">
+                        <a:latin typeface="Times New Roman" panose="02020603050405020304" pitchFamily="18" charset="0"/>
+                      </a:endParaRPr>
+                    </a:p>
+                  </a:txBody>
+                  <a:tcPr marL="9525" marR="72000" marT="9525" marB="0" anchor="ctr">
+                    <a:lnL w="12700" cap="flat" cmpd="sng" algn="ctr">
+                      <a:solidFill>
+                        <a:schemeClr val="bg1">
+                          <a:lumMod val="75000"/>
+                        </a:schemeClr>
+                      </a:solidFill>
+                      <a:prstDash val="solid"/>
+                      <a:round/>
+                      <a:headEnd type="none" w="med" len="med"/>
+                      <a:tailEnd type="none" w="med" len="med"/>
+                    </a:lnL>
+                    <a:lnR w="12700" cap="flat" cmpd="sng" algn="ctr">
+                      <a:solidFill>
+                        <a:schemeClr val="bg1">
+                          <a:lumMod val="75000"/>
+                        </a:schemeClr>
+                      </a:solidFill>
+                      <a:prstDash val="solid"/>
+                      <a:round/>
+                      <a:headEnd type="none" w="med" len="med"/>
+                      <a:tailEnd type="none" w="med" len="med"/>
+                    </a:lnR>
+                    <a:lnT w="12700" cap="flat" cmpd="sng" algn="ctr">
+                      <a:solidFill>
+                        <a:schemeClr val="bg1">
+                          <a:lumMod val="75000"/>
+                        </a:schemeClr>
+                      </a:solidFill>
+                      <a:prstDash val="solid"/>
+                      <a:round/>
+                      <a:headEnd type="none" w="med" len="med"/>
+                      <a:tailEnd type="none" w="med" len="med"/>
+                    </a:lnT>
+                    <a:lnB w="12700" cap="flat" cmpd="sng" algn="ctr">
+                      <a:solidFill>
+                        <a:schemeClr val="bg1">
+                          <a:lumMod val="75000"/>
+                        </a:schemeClr>
+                      </a:solidFill>
+                      <a:prstDash val="solid"/>
+                      <a:round/>
+                      <a:headEnd type="none" w="med" len="med"/>
+                      <a:tailEnd type="none" w="med" len="med"/>
+                    </a:lnB>
+                  </a:tcPr>
+                </a:tc>
+                <a:tc>
+                  <a:txBody>
+                    <a:bodyPr/>
+                    <a:lstStyle/>
+                    <a:p>
+                      <a:pPr algn="ctr" fontAlgn="ctr"/>
+                      <a:endParaRPr lang="ru-RU" sz="800" b="0" i="0" u="none" strike="noStrike" baseline="0" dirty="0">
+                        <a:solidFill>
+                          <a:srgbClr val="000000"/>
+                        </a:solidFill>
+                        <a:effectLst/>
+                        <a:latin typeface="Times New Roman" panose="02020603050405020304" pitchFamily="18" charset="0"/>
+                        <a:cs typeface="Times New Roman" panose="02020603050405020304" pitchFamily="18" charset="0"/>
+                      </a:endParaRPr>
+                    </a:p>
+                  </a:txBody>
+                  <a:tcPr marL="9525" marR="9525" marT="9525" marB="0" anchor="ctr">
+                    <a:lnL w="12700" cap="flat" cmpd="sng" algn="ctr">
+                      <a:solidFill>
+                        <a:schemeClr val="bg1">
+                          <a:lumMod val="75000"/>
+                        </a:schemeClr>
+                      </a:solidFill>
+                      <a:prstDash val="solid"/>
+                      <a:round/>
+                      <a:headEnd type="none" w="med" len="med"/>
+                      <a:tailEnd type="none" w="med" len="med"/>
+                    </a:lnL>
+                    <a:lnR w="19050" cap="flat" cmpd="sng" algn="ctr">
+                      <a:solidFill>
+                        <a:schemeClr val="bg1">
+                          <a:lumMod val="75000"/>
+                        </a:schemeClr>
+                      </a:solidFill>
+                      <a:prstDash val="solid"/>
+                      <a:round/>
+                      <a:headEnd type="none" w="med" len="med"/>
+                      <a:tailEnd type="none" w="med" len="med"/>
+                    </a:lnR>
+                    <a:lnT w="12700" cap="flat" cmpd="sng" algn="ctr">
+                      <a:solidFill>
+                        <a:schemeClr val="bg1">
+                          <a:lumMod val="75000"/>
+                        </a:schemeClr>
+                      </a:solidFill>
+                      <a:prstDash val="solid"/>
+                      <a:round/>
+                      <a:headEnd type="none" w="med" len="med"/>
+                      <a:tailEnd type="none" w="med" len="med"/>
+                    </a:lnT>
+                    <a:lnB w="12700" cap="flat" cmpd="sng" algn="ctr">
+                      <a:solidFill>
+                        <a:schemeClr val="bg1">
+                          <a:lumMod val="75000"/>
+                        </a:schemeClr>
+                      </a:solidFill>
+                      <a:prstDash val="solid"/>
+                      <a:round/>
+                      <a:headEnd type="none" w="med" len="med"/>
+                      <a:tailEnd type="none" w="med" len="med"/>
+                    </a:lnB>
+                  </a:tcPr>
+                </a:tc>
               </a:tr>
             </a:tbl>
           </a:graphicData>
@@ -10545,7 +11800,7 @@
         </p:nvSpPr>
         <p:spPr>
           <a:xfrm>
-            <a:off x="6599231" y="6429842"/>
+            <a:off x="6878854" y="7328340"/>
             <a:ext cx="5867087" cy="487569"/>
           </a:xfrm>
           <a:prstGeom prst="rect">
@@ -10618,14 +11873,14 @@
           <p:nvPr>
             <p:extLst>
               <p:ext uri="{D42A27DB-BD31-4B8C-83A1-F6EECF244321}">
-                <p14:modId xmlns:p14="http://schemas.microsoft.com/office/powerpoint/2010/main" val="3229703072"/>
+                <p14:modId xmlns:p14="http://schemas.microsoft.com/office/powerpoint/2010/main" val="962302302"/>
               </p:ext>
             </p:extLst>
           </p:nvPr>
         </p:nvGraphicFramePr>
         <p:xfrm>
-          <a:off x="6671885" y="7013207"/>
-          <a:ext cx="5867087" cy="1008638"/>
+          <a:off x="6749248" y="7815909"/>
+          <a:ext cx="5867087" cy="745739"/>
         </p:xfrm>
         <a:graphic>
           <a:graphicData uri="http://schemas.openxmlformats.org/drawingml/2006/table">
@@ -10635,33 +11890,33 @@
                 <a:gridCol w="387083">
                   <a:extLst>
                     <a:ext uri="{9D8B030D-6E8A-4147-A177-3AD203B41FA5}">
-                      <a16:colId xmlns="" xmlns:a16="http://schemas.microsoft.com/office/drawing/2014/main" val="20000"/>
+                      <a16:colId xmlns:a16="http://schemas.microsoft.com/office/drawing/2014/main" xmlns="" val="20000"/>
                     </a:ext>
                   </a:extLst>
                 </a:gridCol>
                 <a:gridCol w="2335128">
                   <a:extLst>
                     <a:ext uri="{9D8B030D-6E8A-4147-A177-3AD203B41FA5}">
-                      <a16:colId xmlns="" xmlns:a16="http://schemas.microsoft.com/office/drawing/2014/main" val="20001"/>
+                      <a16:colId xmlns:a16="http://schemas.microsoft.com/office/drawing/2014/main" xmlns="" val="20001"/>
                     </a:ext>
                   </a:extLst>
                 </a:gridCol>
                 <a:gridCol w="1974290">
                   <a:extLst>
                     <a:ext uri="{9D8B030D-6E8A-4147-A177-3AD203B41FA5}">
-                      <a16:colId xmlns="" xmlns:a16="http://schemas.microsoft.com/office/drawing/2014/main" val="20002"/>
+                      <a16:colId xmlns:a16="http://schemas.microsoft.com/office/drawing/2014/main" xmlns="" val="20002"/>
                     </a:ext>
                   </a:extLst>
                 </a:gridCol>
                 <a:gridCol w="1170586">
                   <a:extLst>
                     <a:ext uri="{9D8B030D-6E8A-4147-A177-3AD203B41FA5}">
-                      <a16:colId xmlns="" xmlns:a16="http://schemas.microsoft.com/office/drawing/2014/main" val="20003"/>
+                      <a16:colId xmlns:a16="http://schemas.microsoft.com/office/drawing/2014/main" xmlns="" val="20003"/>
                     </a:ext>
                   </a:extLst>
                 </a:gridCol>
               </a:tblGrid>
-              <a:tr h="336597">
+              <a:tr h="214529">
                 <a:tc>
                   <a:txBody>
                     <a:bodyPr/>
@@ -10669,12 +11924,12 @@
                     <a:p>
                       <a:pPr algn="ctr" fontAlgn="ctr"/>
                       <a:r>
-                        <a:rPr lang="ru-RU" sz="900" b="1" i="0" u="none" strike="noStrike" dirty="0" smtClean="0">
+                        <a:rPr lang="ru-RU" sz="800" b="1" i="0" u="none" strike="noStrike" baseline="0" dirty="0" smtClean="0">
                           <a:solidFill>
                             <a:srgbClr val="000000"/>
                           </a:solidFill>
                           <a:effectLst/>
-                          <a:latin typeface="+mn-lt"/>
+                          <a:latin typeface="Times New Roman" panose="02020603050405020304" pitchFamily="18" charset="0"/>
                         </a:rPr>
                         <a:t>№</a:t>
                       </a:r>
@@ -10682,21 +11937,21 @@
                     <a:p>
                       <a:pPr algn="ctr" fontAlgn="ctr"/>
                       <a:r>
-                        <a:rPr lang="ru-RU" sz="900" b="1" i="0" u="none" strike="noStrike" dirty="0" smtClean="0">
+                        <a:rPr lang="ru-RU" sz="800" b="1" i="0" u="none" strike="noStrike" baseline="0" dirty="0" smtClean="0">
                           <a:solidFill>
                             <a:srgbClr val="000000"/>
                           </a:solidFill>
                           <a:effectLst/>
-                          <a:latin typeface="+mn-lt"/>
+                          <a:latin typeface="Times New Roman" panose="02020603050405020304" pitchFamily="18" charset="0"/>
                         </a:rPr>
                         <a:t>п/п</a:t>
                       </a:r>
-                      <a:endParaRPr lang="ru-RU" sz="900" b="1" i="0" u="none" strike="noStrike" dirty="0">
+                      <a:endParaRPr lang="ru-RU" sz="800" b="1" i="0" u="none" strike="noStrike" baseline="0" dirty="0">
                         <a:solidFill>
                           <a:srgbClr val="000000"/>
                         </a:solidFill>
                         <a:effectLst/>
-                        <a:latin typeface="+mn-lt"/>
+                        <a:latin typeface="Times New Roman" panose="02020603050405020304" pitchFamily="18" charset="0"/>
                       </a:endParaRPr>
                     </a:p>
                   </a:txBody>
@@ -10759,12 +12014,12 @@
                     <a:p>
                       <a:pPr algn="ctr" fontAlgn="ctr"/>
                       <a:r>
-                        <a:rPr lang="ru-RU" sz="900" b="1" i="0" u="none" strike="noStrike" dirty="0">
+                        <a:rPr lang="ru-RU" sz="800" b="1" i="0" u="none" strike="noStrike" baseline="0" dirty="0">
                           <a:solidFill>
                             <a:srgbClr val="000000"/>
                           </a:solidFill>
                           <a:effectLst/>
-                          <a:latin typeface="+mn-lt"/>
+                          <a:latin typeface="Times New Roman" panose="02020603050405020304" pitchFamily="18" charset="0"/>
                         </a:rPr>
                         <a:t>Адрес</a:t>
                       </a:r>
@@ -10829,21 +12084,21 @@
                     <a:p>
                       <a:pPr algn="ctr" fontAlgn="ctr"/>
                       <a:r>
-                        <a:rPr lang="ru-RU" sz="900" b="1" i="0" u="none" strike="noStrike" dirty="0" smtClean="0">
+                        <a:rPr lang="ru-RU" sz="800" b="1" i="0" u="none" strike="noStrike" baseline="0" dirty="0" smtClean="0">
                           <a:solidFill>
                             <a:srgbClr val="000000"/>
                           </a:solidFill>
                           <a:effectLst/>
-                          <a:latin typeface="+mn-lt"/>
+                          <a:latin typeface="Times New Roman" panose="02020603050405020304" pitchFamily="18" charset="0"/>
                         </a:rPr>
                         <a:t>Правообладатель</a:t>
                       </a:r>
-                      <a:endParaRPr lang="ru-RU" sz="900" b="1" i="0" u="none" strike="noStrike" dirty="0">
+                      <a:endParaRPr lang="ru-RU" sz="800" b="1" i="0" u="none" strike="noStrike" baseline="0" dirty="0">
                         <a:solidFill>
                           <a:srgbClr val="000000"/>
                         </a:solidFill>
                         <a:effectLst/>
-                        <a:latin typeface="+mn-lt"/>
+                        <a:latin typeface="Times New Roman" panose="02020603050405020304" pitchFamily="18" charset="0"/>
                       </a:endParaRPr>
                     </a:p>
                   </a:txBody>
@@ -10906,21 +12161,21 @@
                     <a:p>
                       <a:pPr algn="ctr" fontAlgn="ctr"/>
                       <a:r>
-                        <a:rPr lang="ru-RU" sz="900" b="1" i="0" u="none" strike="noStrike" dirty="0" smtClean="0">
+                        <a:rPr lang="ru-RU" sz="800" b="1" i="0" u="none" strike="noStrike" baseline="0" dirty="0" smtClean="0">
                           <a:solidFill>
                             <a:srgbClr val="000000"/>
                           </a:solidFill>
                           <a:effectLst/>
-                          <a:latin typeface="+mn-lt"/>
+                          <a:latin typeface="Times New Roman" panose="02020603050405020304" pitchFamily="18" charset="0"/>
                         </a:rPr>
                         <a:t>Площадь помещений, кв. м.</a:t>
                       </a:r>
-                      <a:endParaRPr lang="ru-RU" sz="900" b="1" i="0" u="none" strike="noStrike" dirty="0">
+                      <a:endParaRPr lang="ru-RU" sz="800" b="1" i="0" u="none" strike="noStrike" baseline="0" dirty="0">
                         <a:solidFill>
                           <a:srgbClr val="000000"/>
                         </a:solidFill>
                         <a:effectLst/>
-                        <a:latin typeface="+mn-lt"/>
+                        <a:latin typeface="Times New Roman" panose="02020603050405020304" pitchFamily="18" charset="0"/>
                       </a:endParaRPr>
                     </a:p>
                   </a:txBody>
@@ -10978,11 +12233,11 @@
                 </a:tc>
                 <a:extLst>
                   <a:ext uri="{0D108BD9-81ED-4DB2-BD59-A6C34878D82A}">
-                    <a16:rowId xmlns="" xmlns:a16="http://schemas.microsoft.com/office/drawing/2014/main" val="10000"/>
+                    <a16:rowId xmlns:a16="http://schemas.microsoft.com/office/drawing/2014/main" xmlns="" val="10000"/>
                   </a:ext>
                 </a:extLst>
               </a:tr>
-              <a:tr h="195984">
+              <a:tr h="159946">
                 <a:tc>
                   <a:txBody>
                     <a:bodyPr/>
@@ -10990,7 +12245,7 @@
                     <a:p>
                       <a:pPr algn="ctr" fontAlgn="ctr"/>
                       <a:r>
-                        <a:rPr lang="en-US" sz="1000" b="0" i="0" u="none" strike="noStrike" dirty="0" smtClean="0">
+                        <a:rPr lang="en-US" sz="800" b="0" i="0" u="none" strike="noStrike" baseline="0" dirty="0" smtClean="0">
                           <a:solidFill>
                             <a:srgbClr val="000000"/>
                           </a:solidFill>
@@ -11000,7 +12255,7 @@
                         </a:rPr>
                         <a:t>1</a:t>
                       </a:r>
-                      <a:endParaRPr lang="ru-RU" sz="1000" b="0" i="0" u="none" strike="noStrike" dirty="0">
+                      <a:endParaRPr lang="ru-RU" sz="800" b="0" i="0" u="none" strike="noStrike" baseline="0" dirty="0">
                         <a:solidFill>
                           <a:srgbClr val="000000"/>
                         </a:solidFill>
@@ -11071,7 +12326,7 @@
                         </a:spcAft>
                       </a:pPr>
                       <a:r>
-                        <a:rPr lang="ru-RU" sz="1000" dirty="0" smtClean="0">
+                        <a:rPr lang="ru-RU" sz="800" baseline="0" dirty="0" smtClean="0">
                           <a:solidFill>
                             <a:schemeClr val="tx1"/>
                           </a:solidFill>
@@ -11082,7 +12337,7 @@
                         </a:rPr>
                         <a:t>тест</a:t>
                       </a:r>
-                      <a:endParaRPr lang="ru-RU" sz="1000" dirty="0">
+                      <a:endParaRPr lang="ru-RU" sz="800" baseline="0" dirty="0">
                         <a:solidFill>
                           <a:schemeClr val="tx1"/>
                         </a:solidFill>
@@ -11147,7 +12402,7 @@
                     <a:p>
                       <a:pPr algn="ctr" fontAlgn="ctr"/>
                       <a:r>
-                        <a:rPr lang="ru-RU" sz="1000" b="0" i="0" u="none" strike="noStrike" dirty="0" smtClean="0">
+                        <a:rPr lang="ru-RU" sz="800" b="0" i="0" u="none" strike="noStrike" baseline="0" dirty="0" smtClean="0">
                           <a:solidFill>
                             <a:srgbClr val="000000"/>
                           </a:solidFill>
@@ -11157,7 +12412,7 @@
                         </a:rPr>
                         <a:t>тест</a:t>
                       </a:r>
-                      <a:endParaRPr lang="ru-RU" sz="1000" b="0" i="0" u="none" strike="noStrike" dirty="0">
+                      <a:endParaRPr lang="ru-RU" sz="800" b="0" i="0" u="none" strike="noStrike" baseline="0" dirty="0">
                         <a:solidFill>
                           <a:srgbClr val="000000"/>
                         </a:solidFill>
@@ -11221,7 +12476,7 @@
                     <a:p>
                       <a:pPr algn="ctr" fontAlgn="ctr"/>
                       <a:r>
-                        <a:rPr lang="ru-RU" sz="1000" b="0" i="0" u="none" strike="noStrike" dirty="0" smtClean="0">
+                        <a:rPr lang="ru-RU" sz="800" b="0" i="0" u="none" strike="noStrike" baseline="0" dirty="0" smtClean="0">
                           <a:solidFill>
                             <a:srgbClr val="000000"/>
                           </a:solidFill>
@@ -11231,7 +12486,7 @@
                         </a:rPr>
                         <a:t>0.00</a:t>
                       </a:r>
-                      <a:endParaRPr lang="ru-RU" sz="1000" b="0" i="0" u="none" strike="noStrike" dirty="0">
+                      <a:endParaRPr lang="ru-RU" sz="800" b="0" i="0" u="none" strike="noStrike" baseline="0" dirty="0">
                         <a:solidFill>
                           <a:srgbClr val="000000"/>
                         </a:solidFill>
@@ -11290,11 +12545,11 @@
                 </a:tc>
                 <a:extLst>
                   <a:ext uri="{0D108BD9-81ED-4DB2-BD59-A6C34878D82A}">
-                    <a16:rowId xmlns="" xmlns:a16="http://schemas.microsoft.com/office/drawing/2014/main" val="10001"/>
+                    <a16:rowId xmlns:a16="http://schemas.microsoft.com/office/drawing/2014/main" xmlns="" val="10001"/>
                   </a:ext>
                 </a:extLst>
               </a:tr>
-              <a:tr h="216212">
+              <a:tr h="135172">
                 <a:tc gridSpan="4">
                   <a:txBody>
                     <a:bodyPr/>
@@ -11302,7 +12557,7 @@
                     <a:p>
                       <a:pPr algn="ctr" fontAlgn="ctr"/>
                       <a:r>
-                        <a:rPr lang="ru-RU" sz="1000" b="0" i="0" u="none" strike="noStrike" dirty="0" smtClean="0">
+                        <a:rPr lang="ru-RU" sz="800" b="0" i="0" u="none" strike="noStrike" dirty="0" smtClean="0">
                           <a:solidFill>
                             <a:srgbClr val="000000"/>
                           </a:solidFill>
@@ -11312,7 +12567,7 @@
                         </a:rPr>
                         <a:t>тест</a:t>
                       </a:r>
-                      <a:endParaRPr lang="ru-RU" sz="1000" b="0" i="0" u="none" strike="noStrike" dirty="0">
+                      <a:endParaRPr lang="ru-RU" sz="800" b="0" i="0" u="none" strike="noStrike" dirty="0">
                         <a:solidFill>
                           <a:srgbClr val="000000"/>
                         </a:solidFill>
@@ -11566,11 +12821,11 @@
                 </a:tc>
                 <a:extLst>
                   <a:ext uri="{0D108BD9-81ED-4DB2-BD59-A6C34878D82A}">
-                    <a16:rowId xmlns="" xmlns:a16="http://schemas.microsoft.com/office/drawing/2014/main" val="10002"/>
+                    <a16:rowId xmlns:a16="http://schemas.microsoft.com/office/drawing/2014/main" xmlns="" val="10002"/>
                   </a:ext>
                 </a:extLst>
               </a:tr>
-              <a:tr h="259845">
+              <a:tr h="197256">
                 <a:tc gridSpan="3">
                   <a:txBody>
                     <a:bodyPr/>
@@ -11594,12 +12849,12 @@
                         <a:defRPr/>
                       </a:pPr>
                       <a:r>
-                        <a:rPr lang="ru-RU" sz="1000" b="1" kern="1200" dirty="0" smtClean="0">
+                        <a:rPr lang="ru-RU" sz="800" b="1" kern="1200" baseline="0" dirty="0" smtClean="0">
                           <a:solidFill>
                             <a:srgbClr val="000000"/>
                           </a:solidFill>
                           <a:effectLst/>
-                          <a:latin typeface="+mn-lt"/>
+                          <a:latin typeface="Times New Roman" panose="02020603050405020304" pitchFamily="18" charset="0"/>
                           <a:ea typeface="Times New Roman" panose="02020603050405020304" pitchFamily="18" charset="0"/>
                           <a:cs typeface="Times New Roman" panose="02020603050405020304" pitchFamily="18" charset="0"/>
                         </a:rPr>
@@ -11749,7 +13004,7 @@
                         </a:spcAft>
                       </a:pPr>
                       <a:r>
-                        <a:rPr lang="ru-RU" sz="1000" b="1" kern="1200" dirty="0" smtClean="0">
+                        <a:rPr lang="ru-RU" sz="800" b="1" kern="1200" baseline="0" dirty="0" smtClean="0">
                           <a:solidFill>
                             <a:srgbClr val="000000"/>
                           </a:solidFill>
@@ -11760,7 +13015,7 @@
                         </a:rPr>
                         <a:t>0.00</a:t>
                       </a:r>
-                      <a:endParaRPr lang="ru-RU" sz="1000" b="1" kern="1200" dirty="0">
+                      <a:endParaRPr lang="ru-RU" sz="800" b="1" kern="1200" baseline="0" dirty="0">
                         <a:solidFill>
                           <a:srgbClr val="000000"/>
                         </a:solidFill>
@@ -11820,7 +13075,7 @@
                 </a:tc>
                 <a:extLst>
                   <a:ext uri="{0D108BD9-81ED-4DB2-BD59-A6C34878D82A}">
-                    <a16:rowId xmlns="" xmlns:a16="http://schemas.microsoft.com/office/drawing/2014/main" val="10003"/>
+                    <a16:rowId xmlns:a16="http://schemas.microsoft.com/office/drawing/2014/main" xmlns="" val="10003"/>
                   </a:ext>
                 </a:extLst>
               </a:tr>
@@ -12100,4 +13355,265 @@
     </a:ext>
   </a:extLst>
 </a:theme>
+</file>
+
+<file path=ppt/theme/theme2.xml><?xml version="1.0" encoding="utf-8"?>
+<a:theme xmlns:a="http://schemas.openxmlformats.org/drawingml/2006/main" name="Тема Office">
+  <a:themeElements>
+    <a:clrScheme name="Стандартная">
+      <a:dk1>
+        <a:sysClr val="windowText" lastClr="000000"/>
+      </a:dk1>
+      <a:lt1>
+        <a:sysClr val="window" lastClr="FFFFFF"/>
+      </a:lt1>
+      <a:dk2>
+        <a:srgbClr val="44546A"/>
+      </a:dk2>
+      <a:lt2>
+        <a:srgbClr val="E7E6E6"/>
+      </a:lt2>
+      <a:accent1>
+        <a:srgbClr val="5B9BD5"/>
+      </a:accent1>
+      <a:accent2>
+        <a:srgbClr val="ED7D31"/>
+      </a:accent2>
+      <a:accent3>
+        <a:srgbClr val="A5A5A5"/>
+      </a:accent3>
+      <a:accent4>
+        <a:srgbClr val="FFC000"/>
+      </a:accent4>
+      <a:accent5>
+        <a:srgbClr val="4472C4"/>
+      </a:accent5>
+      <a:accent6>
+        <a:srgbClr val="70AD47"/>
+      </a:accent6>
+      <a:hlink>
+        <a:srgbClr val="0563C1"/>
+      </a:hlink>
+      <a:folHlink>
+        <a:srgbClr val="954F72"/>
+      </a:folHlink>
+    </a:clrScheme>
+    <a:fontScheme name="Стандартная">
+      <a:majorFont>
+        <a:latin typeface="Calibri Light" panose="020F0302020204030204"/>
+        <a:ea typeface=""/>
+        <a:cs typeface=""/>
+        <a:font script="Jpan" typeface="ＭＳ Ｐゴシック"/>
+        <a:font script="Hang" typeface="맑은 고딕"/>
+        <a:font script="Hans" typeface="宋体"/>
+        <a:font script="Hant" typeface="新細明體"/>
+        <a:font script="Arab" typeface="Times New Roman"/>
+        <a:font script="Hebr" typeface="Times New Roman"/>
+        <a:font script="Thai" typeface="Angsana New"/>
+        <a:font script="Ethi" typeface="Nyala"/>
+        <a:font script="Beng" typeface="Vrinda"/>
+        <a:font script="Gujr" typeface="Shruti"/>
+        <a:font script="Khmr" typeface="MoolBoran"/>
+        <a:font script="Knda" typeface="Tunga"/>
+        <a:font script="Guru" typeface="Raavi"/>
+        <a:font script="Cans" typeface="Euphemia"/>
+        <a:font script="Cher" typeface="Plantagenet Cherokee"/>
+        <a:font script="Yiii" typeface="Microsoft Yi Baiti"/>
+        <a:font script="Tibt" typeface="Microsoft Himalaya"/>
+        <a:font script="Thaa" typeface="MV Boli"/>
+        <a:font script="Deva" typeface="Mangal"/>
+        <a:font script="Telu" typeface="Gautami"/>
+        <a:font script="Taml" typeface="Latha"/>
+        <a:font script="Syrc" typeface="Estrangelo Edessa"/>
+        <a:font script="Orya" typeface="Kalinga"/>
+        <a:font script="Mlym" typeface="Kartika"/>
+        <a:font script="Laoo" typeface="DokChampa"/>
+        <a:font script="Sinh" typeface="Iskoola Pota"/>
+        <a:font script="Mong" typeface="Mongolian Baiti"/>
+        <a:font script="Viet" typeface="Times New Roman"/>
+        <a:font script="Uigh" typeface="Microsoft Uighur"/>
+        <a:font script="Geor" typeface="Sylfaen"/>
+      </a:majorFont>
+      <a:minorFont>
+        <a:latin typeface="Calibri" panose="020F0502020204030204"/>
+        <a:ea typeface=""/>
+        <a:cs typeface=""/>
+        <a:font script="Jpan" typeface="ＭＳ Ｐゴシック"/>
+        <a:font script="Hang" typeface="맑은 고딕"/>
+        <a:font script="Hans" typeface="宋体"/>
+        <a:font script="Hant" typeface="新細明體"/>
+        <a:font script="Arab" typeface="Arial"/>
+        <a:font script="Hebr" typeface="Arial"/>
+        <a:font script="Thai" typeface="Cordia New"/>
+        <a:font script="Ethi" typeface="Nyala"/>
+        <a:font script="Beng" typeface="Vrinda"/>
+        <a:font script="Gujr" typeface="Shruti"/>
+        <a:font script="Khmr" typeface="DaunPenh"/>
+        <a:font script="Knda" typeface="Tunga"/>
+        <a:font script="Guru" typeface="Raavi"/>
+        <a:font script="Cans" typeface="Euphemia"/>
+        <a:font script="Cher" typeface="Plantagenet Cherokee"/>
+        <a:font script="Yiii" typeface="Microsoft Yi Baiti"/>
+        <a:font script="Tibt" typeface="Microsoft Himalaya"/>
+        <a:font script="Thaa" typeface="MV Boli"/>
+        <a:font script="Deva" typeface="Mangal"/>
+        <a:font script="Telu" typeface="Gautami"/>
+        <a:font script="Taml" typeface="Latha"/>
+        <a:font script="Syrc" typeface="Estrangelo Edessa"/>
+        <a:font script="Orya" typeface="Kalinga"/>
+        <a:font script="Mlym" typeface="Kartika"/>
+        <a:font script="Laoo" typeface="DokChampa"/>
+        <a:font script="Sinh" typeface="Iskoola Pota"/>
+        <a:font script="Mong" typeface="Mongolian Baiti"/>
+        <a:font script="Viet" typeface="Arial"/>
+        <a:font script="Uigh" typeface="Microsoft Uighur"/>
+        <a:font script="Geor" typeface="Sylfaen"/>
+      </a:minorFont>
+    </a:fontScheme>
+    <a:fmtScheme name="Стандартная">
+      <a:fillStyleLst>
+        <a:solidFill>
+          <a:schemeClr val="phClr"/>
+        </a:solidFill>
+        <a:gradFill rotWithShape="1">
+          <a:gsLst>
+            <a:gs pos="0">
+              <a:schemeClr val="phClr">
+                <a:lumMod val="110000"/>
+                <a:satMod val="105000"/>
+                <a:tint val="67000"/>
+              </a:schemeClr>
+            </a:gs>
+            <a:gs pos="50000">
+              <a:schemeClr val="phClr">
+                <a:lumMod val="105000"/>
+                <a:satMod val="103000"/>
+                <a:tint val="73000"/>
+              </a:schemeClr>
+            </a:gs>
+            <a:gs pos="100000">
+              <a:schemeClr val="phClr">
+                <a:lumMod val="105000"/>
+                <a:satMod val="109000"/>
+                <a:tint val="81000"/>
+              </a:schemeClr>
+            </a:gs>
+          </a:gsLst>
+          <a:lin ang="5400000" scaled="0"/>
+        </a:gradFill>
+        <a:gradFill rotWithShape="1">
+          <a:gsLst>
+            <a:gs pos="0">
+              <a:schemeClr val="phClr">
+                <a:satMod val="103000"/>
+                <a:lumMod val="102000"/>
+                <a:tint val="94000"/>
+              </a:schemeClr>
+            </a:gs>
+            <a:gs pos="50000">
+              <a:schemeClr val="phClr">
+                <a:satMod val="110000"/>
+                <a:lumMod val="100000"/>
+                <a:shade val="100000"/>
+              </a:schemeClr>
+            </a:gs>
+            <a:gs pos="100000">
+              <a:schemeClr val="phClr">
+                <a:lumMod val="99000"/>
+                <a:satMod val="120000"/>
+                <a:shade val="78000"/>
+              </a:schemeClr>
+            </a:gs>
+          </a:gsLst>
+          <a:lin ang="5400000" scaled="0"/>
+        </a:gradFill>
+      </a:fillStyleLst>
+      <a:lnStyleLst>
+        <a:ln w="6350" cap="flat" cmpd="sng" algn="ctr">
+          <a:solidFill>
+            <a:schemeClr val="phClr"/>
+          </a:solidFill>
+          <a:prstDash val="solid"/>
+          <a:miter lim="800000"/>
+        </a:ln>
+        <a:ln w="12700" cap="flat" cmpd="sng" algn="ctr">
+          <a:solidFill>
+            <a:schemeClr val="phClr"/>
+          </a:solidFill>
+          <a:prstDash val="solid"/>
+          <a:miter lim="800000"/>
+        </a:ln>
+        <a:ln w="19050" cap="flat" cmpd="sng" algn="ctr">
+          <a:solidFill>
+            <a:schemeClr val="phClr"/>
+          </a:solidFill>
+          <a:prstDash val="solid"/>
+          <a:miter lim="800000"/>
+        </a:ln>
+      </a:lnStyleLst>
+      <a:effectStyleLst>
+        <a:effectStyle>
+          <a:effectLst/>
+        </a:effectStyle>
+        <a:effectStyle>
+          <a:effectLst/>
+        </a:effectStyle>
+        <a:effectStyle>
+          <a:effectLst>
+            <a:outerShdw blurRad="57150" dist="19050" dir="5400000" algn="ctr" rotWithShape="0">
+              <a:srgbClr val="000000">
+                <a:alpha val="63000"/>
+              </a:srgbClr>
+            </a:outerShdw>
+          </a:effectLst>
+        </a:effectStyle>
+      </a:effectStyleLst>
+      <a:bgFillStyleLst>
+        <a:solidFill>
+          <a:schemeClr val="phClr"/>
+        </a:solidFill>
+        <a:solidFill>
+          <a:schemeClr val="phClr">
+            <a:tint val="95000"/>
+            <a:satMod val="170000"/>
+          </a:schemeClr>
+        </a:solidFill>
+        <a:gradFill rotWithShape="1">
+          <a:gsLst>
+            <a:gs pos="0">
+              <a:schemeClr val="phClr">
+                <a:tint val="93000"/>
+                <a:satMod val="150000"/>
+                <a:shade val="98000"/>
+                <a:lumMod val="102000"/>
+              </a:schemeClr>
+            </a:gs>
+            <a:gs pos="50000">
+              <a:schemeClr val="phClr">
+                <a:tint val="98000"/>
+                <a:satMod val="130000"/>
+                <a:shade val="90000"/>
+                <a:lumMod val="103000"/>
+              </a:schemeClr>
+            </a:gs>
+            <a:gs pos="100000">
+              <a:schemeClr val="phClr">
+                <a:shade val="63000"/>
+                <a:satMod val="120000"/>
+              </a:schemeClr>
+            </a:gs>
+          </a:gsLst>
+          <a:lin ang="5400000" scaled="0"/>
+        </a:gradFill>
+      </a:bgFillStyleLst>
+    </a:fmtScheme>
+  </a:themeElements>
+  <a:objectDefaults/>
+  <a:extraClrSchemeLst/>
+  <a:extLst>
+    <a:ext uri="{05A4C25C-085E-4340-85A3-A5531E510DB2}">
+      <thm15:themeFamily xmlns:thm15="http://schemas.microsoft.com/office/thememl/2012/main" name="Office Theme" id="{62F939B6-93AF-4DB8-9C6B-D6C7DFDC589F}" vid="{4A3C46E8-61CC-4603-A589-7422A47A8E4A}"/>
+    </a:ext>
+  </a:extLst>
+</a:theme>
 </file>
</xml_diff>

<commit_message>
update StartController add button set visible
</commit_message>
<xml_diff>
--- a/src/main/resources/templates/report.pptx
+++ b/src/main/resources/templates/report.pptx
@@ -197,7 +197,7 @@
           <a:p>
             <a:fld id="{8C51F99D-5886-4972-8F28-1BFBC160FA28}" type="datetimeFigureOut">
               <a:rPr lang="ru-RU" smtClean="0"/>
-              <a:t>12.04.2018</a:t>
+              <a:t>18.04.2018</a:t>
             </a:fld>
             <a:endParaRPr lang="ru-RU"/>
           </a:p>
@@ -682,7 +682,7 @@
           <a:p>
             <a:fld id="{7F4954BA-B241-4C48-A9A9-A8072D854C54}" type="datetimeFigureOut">
               <a:rPr lang="ru-RU" smtClean="0"/>
-              <a:t>12.04.2018</a:t>
+              <a:t>18.04.2018</a:t>
             </a:fld>
             <a:endParaRPr lang="ru-RU"/>
           </a:p>
@@ -852,7 +852,7 @@
           <a:p>
             <a:fld id="{7F4954BA-B241-4C48-A9A9-A8072D854C54}" type="datetimeFigureOut">
               <a:rPr lang="ru-RU" smtClean="0"/>
-              <a:t>12.04.2018</a:t>
+              <a:t>18.04.2018</a:t>
             </a:fld>
             <a:endParaRPr lang="ru-RU"/>
           </a:p>
@@ -1032,7 +1032,7 @@
           <a:p>
             <a:fld id="{7F4954BA-B241-4C48-A9A9-A8072D854C54}" type="datetimeFigureOut">
               <a:rPr lang="ru-RU" smtClean="0"/>
-              <a:t>12.04.2018</a:t>
+              <a:t>18.04.2018</a:t>
             </a:fld>
             <a:endParaRPr lang="ru-RU"/>
           </a:p>
@@ -1202,7 +1202,7 @@
           <a:p>
             <a:fld id="{7F4954BA-B241-4C48-A9A9-A8072D854C54}" type="datetimeFigureOut">
               <a:rPr lang="ru-RU" smtClean="0"/>
-              <a:t>12.04.2018</a:t>
+              <a:t>18.04.2018</a:t>
             </a:fld>
             <a:endParaRPr lang="ru-RU"/>
           </a:p>
@@ -1446,7 +1446,7 @@
           <a:p>
             <a:fld id="{7F4954BA-B241-4C48-A9A9-A8072D854C54}" type="datetimeFigureOut">
               <a:rPr lang="ru-RU" smtClean="0"/>
-              <a:t>12.04.2018</a:t>
+              <a:t>18.04.2018</a:t>
             </a:fld>
             <a:endParaRPr lang="ru-RU"/>
           </a:p>
@@ -1678,7 +1678,7 @@
           <a:p>
             <a:fld id="{7F4954BA-B241-4C48-A9A9-A8072D854C54}" type="datetimeFigureOut">
               <a:rPr lang="ru-RU" smtClean="0"/>
-              <a:t>12.04.2018</a:t>
+              <a:t>18.04.2018</a:t>
             </a:fld>
             <a:endParaRPr lang="ru-RU"/>
           </a:p>
@@ -2045,7 +2045,7 @@
           <a:p>
             <a:fld id="{7F4954BA-B241-4C48-A9A9-A8072D854C54}" type="datetimeFigureOut">
               <a:rPr lang="ru-RU" smtClean="0"/>
-              <a:t>12.04.2018</a:t>
+              <a:t>18.04.2018</a:t>
             </a:fld>
             <a:endParaRPr lang="ru-RU"/>
           </a:p>
@@ -2163,7 +2163,7 @@
           <a:p>
             <a:fld id="{7F4954BA-B241-4C48-A9A9-A8072D854C54}" type="datetimeFigureOut">
               <a:rPr lang="ru-RU" smtClean="0"/>
-              <a:t>12.04.2018</a:t>
+              <a:t>18.04.2018</a:t>
             </a:fld>
             <a:endParaRPr lang="ru-RU"/>
           </a:p>
@@ -2258,7 +2258,7 @@
           <a:p>
             <a:fld id="{7F4954BA-B241-4C48-A9A9-A8072D854C54}" type="datetimeFigureOut">
               <a:rPr lang="ru-RU" smtClean="0"/>
-              <a:t>12.04.2018</a:t>
+              <a:t>18.04.2018</a:t>
             </a:fld>
             <a:endParaRPr lang="ru-RU"/>
           </a:p>
@@ -2535,7 +2535,7 @@
           <a:p>
             <a:fld id="{7F4954BA-B241-4C48-A9A9-A8072D854C54}" type="datetimeFigureOut">
               <a:rPr lang="ru-RU" smtClean="0"/>
-              <a:t>12.04.2018</a:t>
+              <a:t>18.04.2018</a:t>
             </a:fld>
             <a:endParaRPr lang="ru-RU"/>
           </a:p>
@@ -2792,7 +2792,7 @@
           <a:p>
             <a:fld id="{7F4954BA-B241-4C48-A9A9-A8072D854C54}" type="datetimeFigureOut">
               <a:rPr lang="ru-RU" smtClean="0"/>
-              <a:t>12.04.2018</a:t>
+              <a:t>18.04.2018</a:t>
             </a:fld>
             <a:endParaRPr lang="ru-RU"/>
           </a:p>
@@ -3005,7 +3005,7 @@
           <a:p>
             <a:fld id="{7F4954BA-B241-4C48-A9A9-A8072D854C54}" type="datetimeFigureOut">
               <a:rPr lang="ru-RU" smtClean="0"/>
-              <a:t>12.04.2018</a:t>
+              <a:t>18.04.2018</a:t>
             </a:fld>
             <a:endParaRPr lang="ru-RU"/>
           </a:p>
@@ -3572,14 +3572,14 @@
           <p:nvPr>
             <p:extLst>
               <p:ext uri="{D42A27DB-BD31-4B8C-83A1-F6EECF244321}">
-                <p14:modId xmlns:p14="http://schemas.microsoft.com/office/powerpoint/2010/main" val="3502014995"/>
+                <p14:modId xmlns:p14="http://schemas.microsoft.com/office/powerpoint/2010/main" val="2100044030"/>
               </p:ext>
             </p:extLst>
           </p:nvPr>
         </p:nvGraphicFramePr>
         <p:xfrm>
-          <a:off x="66789" y="255347"/>
-          <a:ext cx="5768330" cy="1348327"/>
+          <a:off x="590840" y="255347"/>
+          <a:ext cx="5768330" cy="1582213"/>
         </p:xfrm>
         <a:graphic>
           <a:graphicData uri="http://schemas.openxmlformats.org/drawingml/2006/table">
@@ -3632,23 +3632,24 @@
                         </a:spcAft>
                       </a:pPr>
                       <a:r>
-                        <a:rPr lang="ru-RU" sz="800" kern="1200" dirty="0">
+                        <a:rPr lang="ru-RU" sz="900" kern="1200" dirty="0">
                           <a:solidFill>
                             <a:schemeClr val="tx1"/>
                           </a:solidFill>
                           <a:effectLst/>
-                          <a:latin typeface="Times New Roman" panose="02020603050405020304" pitchFamily="18" charset="0"/>
+                          <a:latin typeface="Calibri" panose="020F0502020204030204" pitchFamily="34" charset="0"/>
+                          <a:cs typeface="Calibri" panose="020F0502020204030204" pitchFamily="34" charset="0"/>
                         </a:rPr>
                         <a:t>№ п/п</a:t>
                       </a:r>
-                      <a:endParaRPr lang="ru-RU" sz="800" dirty="0">
+                      <a:endParaRPr lang="ru-RU" sz="900" dirty="0">
                         <a:solidFill>
                           <a:schemeClr val="tx1"/>
                         </a:solidFill>
                         <a:effectLst/>
-                        <a:latin typeface="Times New Roman" panose="02020603050405020304" pitchFamily="18" charset="0"/>
+                        <a:latin typeface="Calibri" panose="020F0502020204030204" pitchFamily="34" charset="0"/>
                         <a:ea typeface="Times New Roman" panose="02020603050405020304" pitchFamily="18" charset="0"/>
-                        <a:cs typeface="Times New Roman" panose="02020603050405020304" pitchFamily="18" charset="0"/>
+                        <a:cs typeface="Calibri" panose="020F0502020204030204" pitchFamily="34" charset="0"/>
                       </a:endParaRPr>
                     </a:p>
                   </a:txBody>
@@ -3718,37 +3719,37 @@
                         </a:spcAft>
                       </a:pPr>
                       <a:r>
-                        <a:rPr lang="ru-RU" sz="800" kern="1200" dirty="0" smtClean="0">
+                        <a:rPr lang="ru-RU" sz="900" kern="1200" dirty="0" smtClean="0">
                           <a:solidFill>
                             <a:schemeClr val="tx1"/>
                           </a:solidFill>
                           <a:effectLst/>
-                          <a:latin typeface="Times New Roman" panose="02020603050405020304" pitchFamily="18" charset="0"/>
+                          <a:latin typeface="Calibri" panose="020F0502020204030204" pitchFamily="34" charset="0"/>
                           <a:ea typeface="+mn-ea"/>
-                          <a:cs typeface="+mn-cs"/>
+                          <a:cs typeface="Calibri" panose="020F0502020204030204" pitchFamily="34" charset="0"/>
                         </a:rPr>
                         <a:t>Адрес</a:t>
                       </a:r>
                       <a:r>
-                        <a:rPr lang="ru-RU" sz="800" kern="1200" baseline="0" dirty="0" smtClean="0">
+                        <a:rPr lang="ru-RU" sz="900" kern="1200" baseline="0" dirty="0" smtClean="0">
                           <a:solidFill>
                             <a:schemeClr val="tx1"/>
                           </a:solidFill>
                           <a:effectLst/>
-                          <a:latin typeface="Times New Roman" panose="02020603050405020304" pitchFamily="18" charset="0"/>
+                          <a:latin typeface="Calibri" panose="020F0502020204030204" pitchFamily="34" charset="0"/>
                           <a:ea typeface="+mn-ea"/>
-                          <a:cs typeface="+mn-cs"/>
+                          <a:cs typeface="Calibri" panose="020F0502020204030204" pitchFamily="34" charset="0"/>
                         </a:rPr>
                         <a:t> по списку</a:t>
                       </a:r>
-                      <a:endParaRPr lang="ru-RU" sz="800" dirty="0">
+                      <a:endParaRPr lang="ru-RU" sz="900" dirty="0">
                         <a:solidFill>
                           <a:schemeClr val="tx1"/>
                         </a:solidFill>
                         <a:effectLst/>
-                        <a:latin typeface="Times New Roman" panose="02020603050405020304" pitchFamily="18" charset="0"/>
+                        <a:latin typeface="Calibri" panose="020F0502020204030204" pitchFamily="34" charset="0"/>
                         <a:ea typeface="Times New Roman" panose="02020603050405020304" pitchFamily="18" charset="0"/>
-                        <a:cs typeface="Times New Roman" panose="02020603050405020304" pitchFamily="18" charset="0"/>
+                        <a:cs typeface="Calibri" panose="020F0502020204030204" pitchFamily="34" charset="0"/>
                       </a:endParaRPr>
                     </a:p>
                   </a:txBody>
@@ -3818,23 +3819,24 @@
                         </a:spcAft>
                       </a:pPr>
                       <a:r>
-                        <a:rPr lang="ru-RU" sz="800" kern="1200" dirty="0" smtClean="0">
+                        <a:rPr lang="ru-RU" sz="900" kern="1200" dirty="0" smtClean="0">
                           <a:solidFill>
                             <a:schemeClr val="tx1"/>
                           </a:solidFill>
                           <a:effectLst/>
-                          <a:latin typeface="Times New Roman" panose="02020603050405020304" pitchFamily="18" charset="0"/>
+                          <a:latin typeface="Calibri" panose="020F0502020204030204" pitchFamily="34" charset="0"/>
+                          <a:cs typeface="Calibri" panose="020F0502020204030204" pitchFamily="34" charset="0"/>
                         </a:rPr>
                         <a:t>Собственник</a:t>
                       </a:r>
-                      <a:endParaRPr lang="ru-RU" sz="800" dirty="0">
+                      <a:endParaRPr lang="ru-RU" sz="900" dirty="0">
                         <a:solidFill>
                           <a:schemeClr val="tx1"/>
                         </a:solidFill>
                         <a:effectLst/>
-                        <a:latin typeface="Times New Roman" panose="02020603050405020304" pitchFamily="18" charset="0"/>
+                        <a:latin typeface="Calibri" panose="020F0502020204030204" pitchFamily="34" charset="0"/>
                         <a:ea typeface="Times New Roman" panose="02020603050405020304" pitchFamily="18" charset="0"/>
-                        <a:cs typeface="Times New Roman" panose="02020603050405020304" pitchFamily="18" charset="0"/>
+                        <a:cs typeface="Calibri" panose="020F0502020204030204" pitchFamily="34" charset="0"/>
                       </a:endParaRPr>
                     </a:p>
                   </a:txBody>
@@ -3904,46 +3906,46 @@
                         </a:spcAft>
                       </a:pPr>
                       <a:r>
-                        <a:rPr lang="ru-RU" sz="800" kern="1200" dirty="0" smtClean="0">
+                        <a:rPr lang="ru-RU" sz="900" kern="1200" dirty="0" smtClean="0">
                           <a:solidFill>
                             <a:schemeClr val="tx1"/>
                           </a:solidFill>
                           <a:effectLst/>
-                          <a:latin typeface="Times New Roman" panose="02020603050405020304" pitchFamily="18" charset="0"/>
-                          <a:cs typeface="Times New Roman" panose="02020603050405020304" pitchFamily="18" charset="0"/>
+                          <a:latin typeface="Calibri" panose="020F0502020204030204" pitchFamily="34" charset="0"/>
+                          <a:cs typeface="Calibri" panose="020F0502020204030204" pitchFamily="34" charset="0"/>
                         </a:rPr>
                         <a:t>Площадь помещения, кв.</a:t>
                       </a:r>
                       <a:r>
-                        <a:rPr lang="en-US" sz="800" kern="1200" dirty="0" smtClean="0">
+                        <a:rPr lang="en-US" sz="900" kern="1200" dirty="0" smtClean="0">
                           <a:solidFill>
                             <a:schemeClr val="tx1"/>
                           </a:solidFill>
                           <a:effectLst/>
-                          <a:latin typeface="Times New Roman" panose="02020603050405020304" pitchFamily="18" charset="0"/>
-                          <a:cs typeface="Times New Roman" panose="02020603050405020304" pitchFamily="18" charset="0"/>
+                          <a:latin typeface="Calibri" panose="020F0502020204030204" pitchFamily="34" charset="0"/>
+                          <a:cs typeface="Calibri" panose="020F0502020204030204" pitchFamily="34" charset="0"/>
                         </a:rPr>
                         <a:t> </a:t>
                       </a:r>
                       <a:r>
-                        <a:rPr lang="ru-RU" sz="800" kern="1200" dirty="0" smtClean="0">
+                        <a:rPr lang="ru-RU" sz="900" kern="1200" dirty="0" smtClean="0">
                           <a:solidFill>
                             <a:schemeClr val="tx1"/>
                           </a:solidFill>
                           <a:effectLst/>
-                          <a:latin typeface="Times New Roman" panose="02020603050405020304" pitchFamily="18" charset="0"/>
-                          <a:cs typeface="Times New Roman" panose="02020603050405020304" pitchFamily="18" charset="0"/>
+                          <a:latin typeface="Calibri" panose="020F0502020204030204" pitchFamily="34" charset="0"/>
+                          <a:cs typeface="Calibri" panose="020F0502020204030204" pitchFamily="34" charset="0"/>
                         </a:rPr>
                         <a:t>м.</a:t>
                       </a:r>
-                      <a:endParaRPr lang="ru-RU" sz="800" dirty="0">
+                      <a:endParaRPr lang="ru-RU" sz="900" dirty="0">
                         <a:solidFill>
                           <a:schemeClr val="tx1"/>
                         </a:solidFill>
                         <a:effectLst/>
-                        <a:latin typeface="Times New Roman" panose="02020603050405020304" pitchFamily="18" charset="0"/>
+                        <a:latin typeface="Calibri" panose="020F0502020204030204" pitchFamily="34" charset="0"/>
                         <a:ea typeface="Times New Roman" panose="02020603050405020304" pitchFamily="18" charset="0"/>
-                        <a:cs typeface="Times New Roman" panose="02020603050405020304" pitchFamily="18" charset="0"/>
+                        <a:cs typeface="Calibri" panose="020F0502020204030204" pitchFamily="34" charset="0"/>
                       </a:endParaRPr>
                     </a:p>
                   </a:txBody>
@@ -4020,25 +4022,25 @@
                         </a:spcAft>
                       </a:pPr>
                       <a:r>
-                        <a:rPr lang="en-US" sz="800" baseline="0" dirty="0" smtClean="0">
+                        <a:rPr lang="en-US" sz="900" baseline="0" dirty="0" smtClean="0">
                           <a:solidFill>
                             <a:schemeClr val="tx1"/>
                           </a:solidFill>
                           <a:effectLst/>
-                          <a:latin typeface="Times New Roman" panose="02020603050405020304" pitchFamily="18" charset="0"/>
+                          <a:latin typeface="Calibri" panose="020F0502020204030204" pitchFamily="34" charset="0"/>
                           <a:ea typeface="Times New Roman" panose="02020603050405020304" pitchFamily="18" charset="0"/>
-                          <a:cs typeface="Times New Roman" panose="02020603050405020304" pitchFamily="18" charset="0"/>
+                          <a:cs typeface="Calibri" panose="020F0502020204030204" pitchFamily="34" charset="0"/>
                         </a:rPr>
                         <a:t>1</a:t>
                       </a:r>
-                      <a:endParaRPr lang="ru-RU" sz="800" baseline="0" dirty="0">
+                      <a:endParaRPr lang="ru-RU" sz="900" baseline="0" dirty="0">
                         <a:solidFill>
                           <a:schemeClr val="tx1"/>
                         </a:solidFill>
                         <a:effectLst/>
-                        <a:latin typeface="Times New Roman" panose="02020603050405020304" pitchFamily="18" charset="0"/>
+                        <a:latin typeface="Calibri" panose="020F0502020204030204" pitchFamily="34" charset="0"/>
                         <a:ea typeface="Times New Roman" panose="02020603050405020304" pitchFamily="18" charset="0"/>
-                        <a:cs typeface="Times New Roman" panose="02020603050405020304" pitchFamily="18" charset="0"/>
+                        <a:cs typeface="Calibri" panose="020F0502020204030204" pitchFamily="34" charset="0"/>
                       </a:endParaRPr>
                     </a:p>
                   </a:txBody>
@@ -4106,19 +4108,19 @@
                         </a:spcAft>
                       </a:pPr>
                       <a:r>
-                        <a:rPr lang="ru-RU" sz="800" baseline="0" dirty="0" smtClean="0">
+                        <a:rPr lang="ru-RU" sz="900" baseline="0" dirty="0" smtClean="0">
                           <a:effectLst/>
-                          <a:latin typeface="Times New Roman" panose="02020603050405020304" pitchFamily="18" charset="0"/>
+                          <a:latin typeface="Calibri" panose="020F0502020204030204" pitchFamily="34" charset="0"/>
                           <a:ea typeface="Calibri" panose="020F0502020204030204" pitchFamily="34" charset="0"/>
-                          <a:cs typeface="Times New Roman" panose="02020603050405020304" pitchFamily="18" charset="0"/>
+                          <a:cs typeface="Calibri" panose="020F0502020204030204" pitchFamily="34" charset="0"/>
                         </a:rPr>
                         <a:t>тест</a:t>
                       </a:r>
-                      <a:endParaRPr lang="ru-RU" sz="800" baseline="0" dirty="0">
+                      <a:endParaRPr lang="ru-RU" sz="900" baseline="0" dirty="0">
                         <a:effectLst/>
-                        <a:latin typeface="Times New Roman" panose="02020603050405020304" pitchFamily="18" charset="0"/>
+                        <a:latin typeface="Calibri" panose="020F0502020204030204" pitchFamily="34" charset="0"/>
                         <a:ea typeface="Calibri" panose="020F0502020204030204" pitchFamily="34" charset="0"/>
-                        <a:cs typeface="Times New Roman" panose="02020603050405020304" pitchFamily="18" charset="0"/>
+                        <a:cs typeface="Calibri" panose="020F0502020204030204" pitchFamily="34" charset="0"/>
                       </a:endParaRPr>
                     </a:p>
                   </a:txBody>
@@ -4183,25 +4185,25 @@
                         </a:lnSpc>
                       </a:pPr>
                       <a:r>
-                        <a:rPr lang="ru-RU" sz="800" kern="1200" baseline="0" dirty="0" smtClean="0">
+                        <a:rPr lang="ru-RU" sz="900" kern="1200" baseline="0" dirty="0" smtClean="0">
                           <a:solidFill>
                             <a:schemeClr val="dk1"/>
                           </a:solidFill>
                           <a:effectLst/>
-                          <a:latin typeface="Times New Roman" panose="02020603050405020304" pitchFamily="18" charset="0"/>
+                          <a:latin typeface="Calibri" panose="020F0502020204030204" pitchFamily="34" charset="0"/>
                           <a:ea typeface="Calibri" panose="020F0502020204030204" pitchFamily="34" charset="0"/>
-                          <a:cs typeface="Times New Roman" panose="02020603050405020304" pitchFamily="18" charset="0"/>
+                          <a:cs typeface="Calibri" panose="020F0502020204030204" pitchFamily="34" charset="0"/>
                         </a:rPr>
                         <a:t>тест</a:t>
                       </a:r>
-                      <a:endParaRPr lang="ru-RU" sz="800" kern="1200" baseline="0" dirty="0">
+                      <a:endParaRPr lang="ru-RU" sz="900" kern="1200" baseline="0" dirty="0">
                         <a:solidFill>
                           <a:schemeClr val="dk1"/>
                         </a:solidFill>
                         <a:effectLst/>
-                        <a:latin typeface="Times New Roman" panose="02020603050405020304" pitchFamily="18" charset="0"/>
+                        <a:latin typeface="Calibri" panose="020F0502020204030204" pitchFamily="34" charset="0"/>
                         <a:ea typeface="Calibri" panose="020F0502020204030204" pitchFamily="34" charset="0"/>
-                        <a:cs typeface="Times New Roman" panose="02020603050405020304" pitchFamily="18" charset="0"/>
+                        <a:cs typeface="Calibri" panose="020F0502020204030204" pitchFamily="34" charset="0"/>
                       </a:endParaRPr>
                     </a:p>
                   </a:txBody>
@@ -4266,25 +4268,25 @@
                         </a:lnSpc>
                       </a:pPr>
                       <a:r>
-                        <a:rPr lang="ru-RU" sz="800" kern="1200" baseline="0" smtClean="0">
+                        <a:rPr lang="ru-RU" sz="900" kern="1200" baseline="0" dirty="0" smtClean="0">
                           <a:solidFill>
                             <a:schemeClr val="dk1"/>
                           </a:solidFill>
                           <a:effectLst/>
-                          <a:latin typeface="Times New Roman" panose="02020603050405020304" pitchFamily="18" charset="0"/>
+                          <a:latin typeface="Calibri" panose="020F0502020204030204" pitchFamily="34" charset="0"/>
                           <a:ea typeface="Calibri" panose="020F0502020204030204" pitchFamily="34" charset="0"/>
-                          <a:cs typeface="Times New Roman" panose="02020603050405020304" pitchFamily="18" charset="0"/>
+                          <a:cs typeface="Calibri" panose="020F0502020204030204" pitchFamily="34" charset="0"/>
                         </a:rPr>
                         <a:t>1-1</a:t>
                       </a:r>
-                      <a:endParaRPr lang="ru-RU" sz="800" kern="1200" baseline="0" dirty="0">
+                      <a:endParaRPr lang="ru-RU" sz="900" kern="1200" baseline="0" dirty="0">
                         <a:solidFill>
                           <a:schemeClr val="dk1"/>
                         </a:solidFill>
                         <a:effectLst/>
-                        <a:latin typeface="Times New Roman" panose="02020603050405020304" pitchFamily="18" charset="0"/>
+                        <a:latin typeface="Calibri" panose="020F0502020204030204" pitchFamily="34" charset="0"/>
                         <a:ea typeface="Calibri" panose="020F0502020204030204" pitchFamily="34" charset="0"/>
-                        <a:cs typeface="Times New Roman" panose="02020603050405020304" pitchFamily="18" charset="0"/>
+                        <a:cs typeface="Calibri" panose="020F0502020204030204" pitchFamily="34" charset="0"/>
                       </a:endParaRPr>
                     </a:p>
                   </a:txBody>
@@ -4359,25 +4361,25 @@
                         </a:spcAft>
                       </a:pPr>
                       <a:r>
-                        <a:rPr lang="ru-RU" sz="800" b="0" i="0" baseline="0" dirty="0" smtClean="0">
+                        <a:rPr lang="ru-RU" sz="900" b="0" i="0" baseline="0" dirty="0" smtClean="0">
                           <a:solidFill>
                             <a:schemeClr val="tx1"/>
                           </a:solidFill>
                           <a:effectLst/>
-                          <a:latin typeface="Times New Roman" panose="02020603050405020304" pitchFamily="18" charset="0"/>
+                          <a:latin typeface="Calibri" panose="020F0502020204030204" pitchFamily="34" charset="0"/>
                           <a:ea typeface="Times New Roman" panose="02020603050405020304" pitchFamily="18" charset="0"/>
-                          <a:cs typeface="Times New Roman" panose="02020603050405020304" pitchFamily="18" charset="0"/>
+                          <a:cs typeface="Calibri" panose="020F0502020204030204" pitchFamily="34" charset="0"/>
                         </a:rPr>
                         <a:t>2</a:t>
                       </a:r>
-                      <a:endParaRPr lang="ru-RU" sz="800" b="0" i="0" baseline="0" dirty="0">
+                      <a:endParaRPr lang="ru-RU" sz="900" b="0" i="0" baseline="0" dirty="0">
                         <a:solidFill>
                           <a:schemeClr val="tx1"/>
                         </a:solidFill>
                         <a:effectLst/>
-                        <a:latin typeface="Times New Roman" panose="02020603050405020304" pitchFamily="18" charset="0"/>
+                        <a:latin typeface="Calibri" panose="020F0502020204030204" pitchFamily="34" charset="0"/>
                         <a:ea typeface="Times New Roman" panose="02020603050405020304" pitchFamily="18" charset="0"/>
-                        <a:cs typeface="Times New Roman" panose="02020603050405020304" pitchFamily="18" charset="0"/>
+                        <a:cs typeface="Calibri" panose="020F0502020204030204" pitchFamily="34" charset="0"/>
                       </a:endParaRPr>
                     </a:p>
                   </a:txBody>
@@ -4445,19 +4447,19 @@
                         </a:spcAft>
                       </a:pPr>
                       <a:r>
-                        <a:rPr lang="ru-RU" sz="800" b="0" i="0" baseline="0" dirty="0" smtClean="0">
+                        <a:rPr lang="ru-RU" sz="900" b="0" i="0" baseline="0" dirty="0" smtClean="0">
                           <a:effectLst/>
-                          <a:latin typeface="Times New Roman" panose="02020603050405020304" pitchFamily="18" charset="0"/>
+                          <a:latin typeface="Calibri" panose="020F0502020204030204" pitchFamily="34" charset="0"/>
                           <a:ea typeface="Calibri" panose="020F0502020204030204" pitchFamily="34" charset="0"/>
-                          <a:cs typeface="Times New Roman" panose="02020603050405020304" pitchFamily="18" charset="0"/>
+                          <a:cs typeface="Calibri" panose="020F0502020204030204" pitchFamily="34" charset="0"/>
                         </a:rPr>
                         <a:t>тест2</a:t>
                       </a:r>
-                      <a:endParaRPr lang="ru-RU" sz="800" b="0" i="0" baseline="0" dirty="0">
+                      <a:endParaRPr lang="ru-RU" sz="900" b="0" i="0" baseline="0" dirty="0">
                         <a:effectLst/>
-                        <a:latin typeface="Times New Roman" panose="02020603050405020304" pitchFamily="18" charset="0"/>
+                        <a:latin typeface="Calibri" panose="020F0502020204030204" pitchFamily="34" charset="0"/>
                         <a:ea typeface="Calibri" panose="020F0502020204030204" pitchFamily="34" charset="0"/>
-                        <a:cs typeface="Times New Roman" panose="02020603050405020304" pitchFamily="18" charset="0"/>
+                        <a:cs typeface="Calibri" panose="020F0502020204030204" pitchFamily="34" charset="0"/>
                       </a:endParaRPr>
                     </a:p>
                   </a:txBody>
@@ -4522,25 +4524,25 @@
                         </a:lnSpc>
                       </a:pPr>
                       <a:r>
-                        <a:rPr lang="ru-RU" sz="800" b="0" i="0" kern="1200" baseline="0" dirty="0" smtClean="0">
+                        <a:rPr lang="ru-RU" sz="900" b="0" i="0" kern="1200" baseline="0" dirty="0" smtClean="0">
                           <a:solidFill>
                             <a:srgbClr val="FF0000"/>
                           </a:solidFill>
                           <a:effectLst/>
-                          <a:latin typeface="Times New Roman" panose="02020603050405020304" pitchFamily="18" charset="0"/>
+                          <a:latin typeface="Calibri" panose="020F0502020204030204" pitchFamily="34" charset="0"/>
                           <a:ea typeface="Calibri" panose="020F0502020204030204" pitchFamily="34" charset="0"/>
-                          <a:cs typeface="Times New Roman" panose="02020603050405020304" pitchFamily="18" charset="0"/>
+                          <a:cs typeface="Calibri" panose="020F0502020204030204" pitchFamily="34" charset="0"/>
                         </a:rPr>
                         <a:t>тест2</a:t>
                       </a:r>
-                      <a:endParaRPr lang="ru-RU" sz="800" b="0" i="0" kern="1200" baseline="0" dirty="0">
+                      <a:endParaRPr lang="ru-RU" sz="900" b="0" i="0" kern="1200" baseline="0" dirty="0">
                         <a:solidFill>
                           <a:srgbClr val="FF0000"/>
                         </a:solidFill>
                         <a:effectLst/>
-                        <a:latin typeface="Times New Roman" panose="02020603050405020304" pitchFamily="18" charset="0"/>
+                        <a:latin typeface="Calibri" panose="020F0502020204030204" pitchFamily="34" charset="0"/>
                         <a:ea typeface="Calibri" panose="020F0502020204030204" pitchFamily="34" charset="0"/>
-                        <a:cs typeface="Times New Roman" panose="02020603050405020304" pitchFamily="18" charset="0"/>
+                        <a:cs typeface="Calibri" panose="020F0502020204030204" pitchFamily="34" charset="0"/>
                       </a:endParaRPr>
                     </a:p>
                   </a:txBody>
@@ -4605,25 +4607,25 @@
                         </a:lnSpc>
                       </a:pPr>
                       <a:r>
-                        <a:rPr lang="en-US" sz="800" b="0" i="0" kern="1200" baseline="0" dirty="0" smtClean="0">
+                        <a:rPr lang="en-US" sz="900" b="0" i="0" kern="1200" baseline="0" dirty="0" smtClean="0">
                           <a:solidFill>
                             <a:schemeClr val="dk1"/>
                           </a:solidFill>
                           <a:effectLst/>
-                          <a:latin typeface="Times New Roman" panose="02020603050405020304" pitchFamily="18" charset="0"/>
+                          <a:latin typeface="Calibri" panose="020F0502020204030204" pitchFamily="34" charset="0"/>
                           <a:ea typeface="Calibri" panose="020F0502020204030204" pitchFamily="34" charset="0"/>
-                          <a:cs typeface="Times New Roman" panose="02020603050405020304" pitchFamily="18" charset="0"/>
+                          <a:cs typeface="Calibri" panose="020F0502020204030204" pitchFamily="34" charset="0"/>
                         </a:rPr>
                         <a:t>2-2</a:t>
                       </a:r>
-                      <a:endParaRPr lang="ru-RU" sz="800" b="0" i="0" kern="1200" baseline="0" dirty="0">
+                      <a:endParaRPr lang="ru-RU" sz="900" b="0" i="0" kern="1200" baseline="0" dirty="0">
                         <a:solidFill>
                           <a:schemeClr val="dk1"/>
                         </a:solidFill>
                         <a:effectLst/>
-                        <a:latin typeface="Times New Roman" panose="02020603050405020304" pitchFamily="18" charset="0"/>
+                        <a:latin typeface="Calibri" panose="020F0502020204030204" pitchFamily="34" charset="0"/>
                         <a:ea typeface="Calibri" panose="020F0502020204030204" pitchFamily="34" charset="0"/>
-                        <a:cs typeface="Times New Roman" panose="02020603050405020304" pitchFamily="18" charset="0"/>
+                        <a:cs typeface="Calibri" panose="020F0502020204030204" pitchFamily="34" charset="0"/>
                       </a:endParaRPr>
                     </a:p>
                   </a:txBody>
@@ -4698,25 +4700,25 @@
                         </a:spcAft>
                       </a:pPr>
                       <a:r>
-                        <a:rPr lang="ru-RU" sz="800" b="0" dirty="0" smtClean="0">
+                        <a:rPr lang="ru-RU" sz="900" b="0" dirty="0" smtClean="0">
                           <a:solidFill>
                             <a:schemeClr val="tx1"/>
                           </a:solidFill>
                           <a:effectLst/>
-                          <a:latin typeface="Times New Roman" panose="02020603050405020304" pitchFamily="18" charset="0"/>
+                          <a:latin typeface="Calibri" panose="020F0502020204030204" pitchFamily="34" charset="0"/>
                           <a:ea typeface="Times New Roman" panose="02020603050405020304" pitchFamily="18" charset="0"/>
-                          <a:cs typeface="Times New Roman" panose="02020603050405020304" pitchFamily="18" charset="0"/>
+                          <a:cs typeface="Calibri" panose="020F0502020204030204" pitchFamily="34" charset="0"/>
                         </a:rPr>
                         <a:t>тест3</a:t>
                       </a:r>
-                      <a:endParaRPr lang="ru-RU" sz="800" b="0" dirty="0">
+                      <a:endParaRPr lang="ru-RU" sz="900" b="0" dirty="0">
                         <a:solidFill>
                           <a:schemeClr val="tx1"/>
                         </a:solidFill>
                         <a:effectLst/>
-                        <a:latin typeface="Times New Roman" panose="02020603050405020304" pitchFamily="18" charset="0"/>
+                        <a:latin typeface="Calibri" panose="020F0502020204030204" pitchFamily="34" charset="0"/>
                         <a:ea typeface="Times New Roman" panose="02020603050405020304" pitchFamily="18" charset="0"/>
-                        <a:cs typeface="Times New Roman" panose="02020603050405020304" pitchFamily="18" charset="0"/>
+                        <a:cs typeface="Calibri" panose="020F0502020204030204" pitchFamily="34" charset="0"/>
                       </a:endParaRPr>
                     </a:p>
                   </a:txBody>
@@ -5009,25 +5011,25 @@
                         <a:defRPr/>
                       </a:pPr>
                       <a:r>
-                        <a:rPr lang="ru-RU" sz="800" b="1" baseline="0" dirty="0" smtClean="0">
+                        <a:rPr lang="ru-RU" sz="900" b="1" baseline="0" dirty="0" smtClean="0">
                           <a:solidFill>
                             <a:schemeClr val="tx1"/>
                           </a:solidFill>
                           <a:effectLst/>
-                          <a:latin typeface="Times New Roman" panose="02020603050405020304" pitchFamily="18" charset="0"/>
+                          <a:latin typeface="Calibri" panose="020F0502020204030204" pitchFamily="34" charset="0"/>
                           <a:ea typeface="Times New Roman" panose="02020603050405020304" pitchFamily="18" charset="0"/>
-                          <a:cs typeface="Times New Roman" panose="02020603050405020304" pitchFamily="18" charset="0"/>
+                          <a:cs typeface="Calibri" panose="020F0502020204030204" pitchFamily="34" charset="0"/>
                         </a:rPr>
                         <a:t>ИТОГО:</a:t>
                       </a:r>
-                      <a:endParaRPr lang="ru-RU" sz="800" baseline="0" dirty="0">
+                      <a:endParaRPr lang="ru-RU" sz="900" baseline="0" dirty="0">
                         <a:solidFill>
                           <a:schemeClr val="tx1"/>
                         </a:solidFill>
                         <a:effectLst/>
-                        <a:latin typeface="Times New Roman" panose="02020603050405020304" pitchFamily="18" charset="0"/>
+                        <a:latin typeface="Calibri" panose="020F0502020204030204" pitchFamily="34" charset="0"/>
                         <a:ea typeface="Times New Roman" panose="02020603050405020304" pitchFamily="18" charset="0"/>
-                        <a:cs typeface="Times New Roman" panose="02020603050405020304" pitchFamily="18" charset="0"/>
+                        <a:cs typeface="Calibri" panose="020F0502020204030204" pitchFamily="34" charset="0"/>
                       </a:endParaRPr>
                     </a:p>
                   </a:txBody>
@@ -5237,25 +5239,25 @@
                         </a:lnSpc>
                       </a:pPr>
                       <a:r>
-                        <a:rPr lang="en-US" sz="800" b="1" kern="1200" baseline="0" dirty="0" smtClean="0">
+                        <a:rPr lang="en-US" sz="900" b="1" kern="1200" baseline="0" dirty="0" smtClean="0">
                           <a:solidFill>
                             <a:schemeClr val="dk1"/>
                           </a:solidFill>
                           <a:effectLst/>
-                          <a:latin typeface="Times New Roman" panose="02020603050405020304" pitchFamily="18" charset="0"/>
+                          <a:latin typeface="Calibri" panose="020F0502020204030204" pitchFamily="34" charset="0"/>
                           <a:ea typeface="Calibri" panose="020F0502020204030204" pitchFamily="34" charset="0"/>
-                          <a:cs typeface="Times New Roman" panose="02020603050405020304" pitchFamily="18" charset="0"/>
+                          <a:cs typeface="Calibri" panose="020F0502020204030204" pitchFamily="34" charset="0"/>
                         </a:rPr>
                         <a:t>1</a:t>
                       </a:r>
-                      <a:endParaRPr lang="ru-RU" sz="800" b="1" kern="1200" baseline="0" dirty="0">
+                      <a:endParaRPr lang="ru-RU" sz="900" b="1" kern="1200" baseline="0" dirty="0">
                         <a:solidFill>
                           <a:schemeClr val="dk1"/>
                         </a:solidFill>
                         <a:effectLst/>
-                        <a:latin typeface="Times New Roman" panose="02020603050405020304" pitchFamily="18" charset="0"/>
+                        <a:latin typeface="Calibri" panose="020F0502020204030204" pitchFamily="34" charset="0"/>
                         <a:ea typeface="Calibri" panose="020F0502020204030204" pitchFamily="34" charset="0"/>
-                        <a:cs typeface="Times New Roman" panose="02020603050405020304" pitchFamily="18" charset="0"/>
+                        <a:cs typeface="Calibri" panose="020F0502020204030204" pitchFamily="34" charset="0"/>
                       </a:endParaRPr>
                     </a:p>
                   </a:txBody>
@@ -5339,49 +5341,49 @@
                         <a:defRPr/>
                       </a:pPr>
                       <a:r>
-                        <a:rPr lang="ru-RU" sz="800" b="1" dirty="0" smtClean="0">
+                        <a:rPr lang="ru-RU" sz="900" b="1" dirty="0" smtClean="0">
                           <a:solidFill>
                             <a:schemeClr val="tx1"/>
                           </a:solidFill>
                           <a:effectLst/>
-                          <a:latin typeface="Times New Roman" panose="02020603050405020304" pitchFamily="18" charset="0"/>
+                          <a:latin typeface="Calibri" panose="020F0502020204030204" pitchFamily="34" charset="0"/>
                           <a:ea typeface="Times New Roman" panose="02020603050405020304" pitchFamily="18" charset="0"/>
-                          <a:cs typeface="Times New Roman" panose="02020603050405020304" pitchFamily="18" charset="0"/>
+                          <a:cs typeface="Calibri" panose="020F0502020204030204" pitchFamily="34" charset="0"/>
                         </a:rPr>
                         <a:t>Собственность</a:t>
                       </a:r>
                       <a:r>
-                        <a:rPr lang="ru-RU" sz="800" b="1" baseline="0" dirty="0" smtClean="0">
+                        <a:rPr lang="ru-RU" sz="900" b="1" baseline="0" dirty="0" smtClean="0">
                           <a:solidFill>
                             <a:schemeClr val="tx1"/>
                           </a:solidFill>
                           <a:effectLst/>
-                          <a:latin typeface="Times New Roman" panose="02020603050405020304" pitchFamily="18" charset="0"/>
+                          <a:latin typeface="Calibri" panose="020F0502020204030204" pitchFamily="34" charset="0"/>
                           <a:ea typeface="Times New Roman" panose="02020603050405020304" pitchFamily="18" charset="0"/>
-                          <a:cs typeface="Times New Roman" panose="02020603050405020304" pitchFamily="18" charset="0"/>
+                          <a:cs typeface="Calibri" panose="020F0502020204030204" pitchFamily="34" charset="0"/>
                         </a:rPr>
                         <a:t> РФ ИТОГО</a:t>
                       </a:r>
                       <a:r>
-                        <a:rPr lang="en-US" sz="800" b="1" baseline="0" dirty="0" smtClean="0">
+                        <a:rPr lang="en-US" sz="900" b="1" baseline="0" dirty="0" smtClean="0">
                           <a:solidFill>
                             <a:schemeClr val="tx1"/>
                           </a:solidFill>
                           <a:effectLst/>
-                          <a:latin typeface="Times New Roman" panose="02020603050405020304" pitchFamily="18" charset="0"/>
+                          <a:latin typeface="Calibri" panose="020F0502020204030204" pitchFamily="34" charset="0"/>
                           <a:ea typeface="Times New Roman" panose="02020603050405020304" pitchFamily="18" charset="0"/>
-                          <a:cs typeface="Times New Roman" panose="02020603050405020304" pitchFamily="18" charset="0"/>
+                          <a:cs typeface="Calibri" panose="020F0502020204030204" pitchFamily="34" charset="0"/>
                         </a:rPr>
                         <a:t>:</a:t>
                       </a:r>
-                      <a:endParaRPr lang="ru-RU" sz="800" b="1" dirty="0" smtClean="0">
+                      <a:endParaRPr lang="ru-RU" sz="900" b="1" dirty="0" smtClean="0">
                         <a:solidFill>
                           <a:schemeClr val="tx1"/>
                         </a:solidFill>
                         <a:effectLst/>
-                        <a:latin typeface="Times New Roman" panose="02020603050405020304" pitchFamily="18" charset="0"/>
+                        <a:latin typeface="Calibri" panose="020F0502020204030204" pitchFamily="34" charset="0"/>
                         <a:ea typeface="Times New Roman" panose="02020603050405020304" pitchFamily="18" charset="0"/>
-                        <a:cs typeface="Times New Roman" panose="02020603050405020304" pitchFamily="18" charset="0"/>
+                        <a:cs typeface="Calibri" panose="020F0502020204030204" pitchFamily="34" charset="0"/>
                       </a:endParaRPr>
                     </a:p>
                   </a:txBody>
@@ -5589,25 +5591,25 @@
                         </a:lnSpc>
                       </a:pPr>
                       <a:r>
-                        <a:rPr lang="en-US" sz="800" b="1" i="0" u="none" strike="noStrike" kern="1200" dirty="0" smtClean="0">
+                        <a:rPr lang="en-US" sz="900" b="1" i="0" u="none" strike="noStrike" kern="1200" dirty="0" smtClean="0">
                           <a:solidFill>
                             <a:schemeClr val="tx1"/>
                           </a:solidFill>
                           <a:effectLst/>
-                          <a:latin typeface="Times New Roman" panose="02020603050405020304" pitchFamily="18" charset="0"/>
+                          <a:latin typeface="Calibri" panose="020F0502020204030204" pitchFamily="34" charset="0"/>
                           <a:ea typeface="+mn-ea"/>
-                          <a:cs typeface="Times New Roman" panose="02020603050405020304" pitchFamily="18" charset="0"/>
+                          <a:cs typeface="Calibri" panose="020F0502020204030204" pitchFamily="34" charset="0"/>
                         </a:rPr>
                         <a:t>2</a:t>
                       </a:r>
-                      <a:endParaRPr lang="ru-RU" sz="800" b="1" i="0" u="none" strike="noStrike" kern="1200" dirty="0">
+                      <a:endParaRPr lang="ru-RU" sz="900" b="1" i="0" u="none" strike="noStrike" kern="1200" dirty="0">
                         <a:solidFill>
                           <a:schemeClr val="tx1"/>
                         </a:solidFill>
                         <a:effectLst/>
-                        <a:latin typeface="Times New Roman" panose="02020603050405020304" pitchFamily="18" charset="0"/>
+                        <a:latin typeface="Calibri" panose="020F0502020204030204" pitchFamily="34" charset="0"/>
                         <a:ea typeface="+mn-ea"/>
-                        <a:cs typeface="Times New Roman" panose="02020603050405020304" pitchFamily="18" charset="0"/>
+                        <a:cs typeface="Calibri" panose="020F0502020204030204" pitchFamily="34" charset="0"/>
                       </a:endParaRPr>
                     </a:p>
                   </a:txBody>
@@ -5691,85 +5693,85 @@
                         <a:defRPr/>
                       </a:pPr>
                       <a:r>
-                        <a:rPr lang="ru-RU" sz="800" b="1" dirty="0" smtClean="0">
+                        <a:rPr lang="ru-RU" sz="900" b="1" dirty="0" smtClean="0">
                           <a:solidFill>
                             <a:schemeClr val="tx1"/>
                           </a:solidFill>
                           <a:effectLst/>
-                          <a:latin typeface="Times New Roman" panose="02020603050405020304" pitchFamily="18" charset="0"/>
+                          <a:latin typeface="Calibri" panose="020F0502020204030204" pitchFamily="34" charset="0"/>
                           <a:ea typeface="Times New Roman" panose="02020603050405020304" pitchFamily="18" charset="0"/>
-                          <a:cs typeface="Times New Roman" panose="02020603050405020304" pitchFamily="18" charset="0"/>
+                          <a:cs typeface="Calibri" panose="020F0502020204030204" pitchFamily="34" charset="0"/>
                         </a:rPr>
                         <a:t>Собственность</a:t>
                       </a:r>
                       <a:r>
-                        <a:rPr lang="en-US" sz="800" b="1" dirty="0" smtClean="0">
+                        <a:rPr lang="en-US" sz="900" b="1" dirty="0" smtClean="0">
                           <a:solidFill>
                             <a:schemeClr val="tx1"/>
                           </a:solidFill>
                           <a:effectLst/>
-                          <a:latin typeface="Times New Roman" panose="02020603050405020304" pitchFamily="18" charset="0"/>
+                          <a:latin typeface="Calibri" panose="020F0502020204030204" pitchFamily="34" charset="0"/>
                           <a:ea typeface="Times New Roman" panose="02020603050405020304" pitchFamily="18" charset="0"/>
-                          <a:cs typeface="Times New Roman" panose="02020603050405020304" pitchFamily="18" charset="0"/>
+                          <a:cs typeface="Calibri" panose="020F0502020204030204" pitchFamily="34" charset="0"/>
                         </a:rPr>
                         <a:t> </a:t>
                       </a:r>
                       <a:r>
-                        <a:rPr lang="ru-RU" sz="800" b="1" smtClean="0">
+                        <a:rPr lang="ru-RU" sz="900" b="1" smtClean="0">
                           <a:solidFill>
                             <a:schemeClr val="tx1"/>
                           </a:solidFill>
                           <a:effectLst/>
-                          <a:latin typeface="Times New Roman" panose="02020603050405020304" pitchFamily="18" charset="0"/>
+                          <a:latin typeface="Calibri" panose="020F0502020204030204" pitchFamily="34" charset="0"/>
                           <a:ea typeface="Times New Roman" panose="02020603050405020304" pitchFamily="18" charset="0"/>
-                          <a:cs typeface="Times New Roman" panose="02020603050405020304" pitchFamily="18" charset="0"/>
+                          <a:cs typeface="Calibri" panose="020F0502020204030204" pitchFamily="34" charset="0"/>
                         </a:rPr>
                         <a:t>г.</a:t>
                       </a:r>
                       <a:r>
-                        <a:rPr lang="ru-RU" sz="800" b="1" baseline="0" smtClean="0">
+                        <a:rPr lang="ru-RU" sz="900" b="1" baseline="0" smtClean="0">
                           <a:solidFill>
                             <a:schemeClr val="tx1"/>
                           </a:solidFill>
                           <a:effectLst/>
-                          <a:latin typeface="Times New Roman" panose="02020603050405020304" pitchFamily="18" charset="0"/>
+                          <a:latin typeface="Calibri" panose="020F0502020204030204" pitchFamily="34" charset="0"/>
                           <a:ea typeface="Times New Roman" panose="02020603050405020304" pitchFamily="18" charset="0"/>
-                          <a:cs typeface="Times New Roman" panose="02020603050405020304" pitchFamily="18" charset="0"/>
+                          <a:cs typeface="Calibri" panose="020F0502020204030204" pitchFamily="34" charset="0"/>
                         </a:rPr>
                         <a:t> </a:t>
                       </a:r>
                       <a:r>
-                        <a:rPr lang="ru-RU" sz="800" b="1" baseline="0" dirty="0" smtClean="0">
+                        <a:rPr lang="ru-RU" sz="900" b="1" baseline="0" dirty="0" smtClean="0">
                           <a:solidFill>
                             <a:schemeClr val="tx1"/>
                           </a:solidFill>
                           <a:effectLst/>
-                          <a:latin typeface="Times New Roman" panose="02020603050405020304" pitchFamily="18" charset="0"/>
+                          <a:latin typeface="Calibri" panose="020F0502020204030204" pitchFamily="34" charset="0"/>
                           <a:ea typeface="Times New Roman" panose="02020603050405020304" pitchFamily="18" charset="0"/>
-                          <a:cs typeface="Times New Roman" panose="02020603050405020304" pitchFamily="18" charset="0"/>
+                          <a:cs typeface="Calibri" panose="020F0502020204030204" pitchFamily="34" charset="0"/>
                         </a:rPr>
                         <a:t>Москвы ИТОГО</a:t>
                       </a:r>
                       <a:r>
-                        <a:rPr lang="en-US" sz="800" b="1" baseline="0" dirty="0" smtClean="0">
+                        <a:rPr lang="en-US" sz="900" b="1" baseline="0" dirty="0" smtClean="0">
                           <a:solidFill>
                             <a:schemeClr val="tx1"/>
                           </a:solidFill>
                           <a:effectLst/>
-                          <a:latin typeface="Times New Roman" panose="02020603050405020304" pitchFamily="18" charset="0"/>
+                          <a:latin typeface="Calibri" panose="020F0502020204030204" pitchFamily="34" charset="0"/>
                           <a:ea typeface="Times New Roman" panose="02020603050405020304" pitchFamily="18" charset="0"/>
-                          <a:cs typeface="Times New Roman" panose="02020603050405020304" pitchFamily="18" charset="0"/>
+                          <a:cs typeface="Calibri" panose="020F0502020204030204" pitchFamily="34" charset="0"/>
                         </a:rPr>
                         <a:t>:</a:t>
                       </a:r>
-                      <a:endParaRPr lang="ru-RU" sz="800" b="1" dirty="0" smtClean="0">
+                      <a:endParaRPr lang="ru-RU" sz="900" b="1" dirty="0" smtClean="0">
                         <a:solidFill>
                           <a:schemeClr val="tx1"/>
                         </a:solidFill>
                         <a:effectLst/>
-                        <a:latin typeface="Times New Roman" panose="02020603050405020304" pitchFamily="18" charset="0"/>
+                        <a:latin typeface="Calibri" panose="020F0502020204030204" pitchFamily="34" charset="0"/>
                         <a:ea typeface="Times New Roman" panose="02020603050405020304" pitchFamily="18" charset="0"/>
-                        <a:cs typeface="Times New Roman" panose="02020603050405020304" pitchFamily="18" charset="0"/>
+                        <a:cs typeface="Calibri" panose="020F0502020204030204" pitchFamily="34" charset="0"/>
                       </a:endParaRPr>
                     </a:p>
                   </a:txBody>
@@ -5854,25 +5856,25 @@
                         </a:lnSpc>
                       </a:pPr>
                       <a:r>
-                        <a:rPr lang="en-US" sz="800" b="1" i="0" u="none" strike="noStrike" kern="1200" dirty="0" smtClean="0">
+                        <a:rPr lang="en-US" sz="900" b="1" i="0" u="none" strike="noStrike" kern="1200" dirty="0" smtClean="0">
                           <a:solidFill>
                             <a:schemeClr val="tx1"/>
                           </a:solidFill>
                           <a:effectLst/>
-                          <a:latin typeface="Times New Roman" panose="02020603050405020304" pitchFamily="18" charset="0"/>
+                          <a:latin typeface="Calibri" panose="020F0502020204030204" pitchFamily="34" charset="0"/>
                           <a:ea typeface="+mn-ea"/>
-                          <a:cs typeface="Times New Roman" panose="02020603050405020304" pitchFamily="18" charset="0"/>
+                          <a:cs typeface="Calibri" panose="020F0502020204030204" pitchFamily="34" charset="0"/>
                         </a:rPr>
                         <a:t>3</a:t>
                       </a:r>
-                      <a:endParaRPr lang="ru-RU" sz="800" b="1" i="0" u="none" strike="noStrike" kern="1200" dirty="0">
+                      <a:endParaRPr lang="ru-RU" sz="900" b="1" i="0" u="none" strike="noStrike" kern="1200" dirty="0">
                         <a:solidFill>
                           <a:schemeClr val="tx1"/>
                         </a:solidFill>
                         <a:effectLst/>
-                        <a:latin typeface="Times New Roman" panose="02020603050405020304" pitchFamily="18" charset="0"/>
+                        <a:latin typeface="Calibri" panose="020F0502020204030204" pitchFamily="34" charset="0"/>
                         <a:ea typeface="+mn-ea"/>
-                        <a:cs typeface="Times New Roman" panose="02020603050405020304" pitchFamily="18" charset="0"/>
+                        <a:cs typeface="Calibri" panose="020F0502020204030204" pitchFamily="34" charset="0"/>
                       </a:endParaRPr>
                     </a:p>
                   </a:txBody>
@@ -5947,37 +5949,37 @@
                         </a:spcAft>
                       </a:pPr>
                       <a:r>
-                        <a:rPr lang="ru-RU" sz="800" b="1" baseline="0" dirty="0" smtClean="0">
+                        <a:rPr lang="ru-RU" sz="900" b="1" baseline="0" dirty="0" smtClean="0">
                           <a:solidFill>
                             <a:schemeClr val="tx1"/>
                           </a:solidFill>
                           <a:effectLst/>
-                          <a:latin typeface="Times New Roman" panose="02020603050405020304" pitchFamily="18" charset="0"/>
+                          <a:latin typeface="Calibri" panose="020F0502020204030204" pitchFamily="34" charset="0"/>
                           <a:ea typeface="Times New Roman" panose="02020603050405020304" pitchFamily="18" charset="0"/>
-                          <a:cs typeface="Times New Roman" panose="02020603050405020304" pitchFamily="18" charset="0"/>
+                          <a:cs typeface="Calibri" panose="020F0502020204030204" pitchFamily="34" charset="0"/>
                         </a:rPr>
                         <a:t>Собственность физических/юридических лиц ИТОГО</a:t>
                       </a:r>
                       <a:r>
-                        <a:rPr lang="en-US" sz="800" b="1" baseline="0" dirty="0" smtClean="0">
+                        <a:rPr lang="en-US" sz="900" b="1" baseline="0" dirty="0" smtClean="0">
                           <a:solidFill>
                             <a:schemeClr val="tx1"/>
                           </a:solidFill>
                           <a:effectLst/>
-                          <a:latin typeface="Times New Roman" panose="02020603050405020304" pitchFamily="18" charset="0"/>
+                          <a:latin typeface="Calibri" panose="020F0502020204030204" pitchFamily="34" charset="0"/>
                           <a:ea typeface="Times New Roman" panose="02020603050405020304" pitchFamily="18" charset="0"/>
-                          <a:cs typeface="Times New Roman" panose="02020603050405020304" pitchFamily="18" charset="0"/>
+                          <a:cs typeface="Calibri" panose="020F0502020204030204" pitchFamily="34" charset="0"/>
                         </a:rPr>
                         <a:t>:</a:t>
                       </a:r>
-                      <a:endParaRPr lang="ru-RU" sz="800" b="1" baseline="0" dirty="0">
+                      <a:endParaRPr lang="ru-RU" sz="900" b="1" baseline="0" dirty="0">
                         <a:solidFill>
                           <a:schemeClr val="tx1"/>
                         </a:solidFill>
                         <a:effectLst/>
-                        <a:latin typeface="Times New Roman" panose="02020603050405020304" pitchFamily="18" charset="0"/>
+                        <a:latin typeface="Calibri" panose="020F0502020204030204" pitchFamily="34" charset="0"/>
                         <a:ea typeface="Times New Roman" panose="02020603050405020304" pitchFamily="18" charset="0"/>
-                        <a:cs typeface="Times New Roman" panose="02020603050405020304" pitchFamily="18" charset="0"/>
+                        <a:cs typeface="Calibri" panose="020F0502020204030204" pitchFamily="34" charset="0"/>
                       </a:endParaRPr>
                     </a:p>
                   </a:txBody>
@@ -6185,25 +6187,25 @@
                         </a:lnSpc>
                       </a:pPr>
                       <a:r>
-                        <a:rPr lang="en-US" sz="800" b="1" i="0" u="none" strike="noStrike" kern="1200" baseline="0" dirty="0" smtClean="0">
+                        <a:rPr lang="en-US" sz="900" b="1" i="0" u="none" strike="noStrike" kern="1200" baseline="0" dirty="0" smtClean="0">
                           <a:solidFill>
                             <a:schemeClr val="tx1"/>
                           </a:solidFill>
                           <a:effectLst/>
-                          <a:latin typeface="Times New Roman" panose="02020603050405020304" pitchFamily="18" charset="0"/>
+                          <a:latin typeface="Calibri" panose="020F0502020204030204" pitchFamily="34" charset="0"/>
                           <a:ea typeface="+mn-ea"/>
-                          <a:cs typeface="Times New Roman" panose="02020603050405020304" pitchFamily="18" charset="0"/>
+                          <a:cs typeface="Calibri" panose="020F0502020204030204" pitchFamily="34" charset="0"/>
                         </a:rPr>
                         <a:t>4</a:t>
                       </a:r>
-                      <a:endParaRPr lang="ru-RU" sz="800" b="1" i="0" u="none" strike="noStrike" kern="1200" baseline="0" dirty="0">
+                      <a:endParaRPr lang="ru-RU" sz="900" b="1" i="0" u="none" strike="noStrike" kern="1200" baseline="0" dirty="0">
                         <a:solidFill>
                           <a:schemeClr val="tx1"/>
                         </a:solidFill>
                         <a:effectLst/>
-                        <a:latin typeface="Times New Roman" panose="02020603050405020304" pitchFamily="18" charset="0"/>
+                        <a:latin typeface="Calibri" panose="020F0502020204030204" pitchFamily="34" charset="0"/>
                         <a:ea typeface="+mn-ea"/>
-                        <a:cs typeface="Times New Roman" panose="02020603050405020304" pitchFamily="18" charset="0"/>
+                        <a:cs typeface="Calibri" panose="020F0502020204030204" pitchFamily="34" charset="0"/>
                       </a:endParaRPr>
                     </a:p>
                   </a:txBody>
@@ -6287,25 +6289,25 @@
                         <a:defRPr/>
                       </a:pPr>
                       <a:r>
-                        <a:rPr lang="ru-RU" sz="800" b="1" baseline="0" dirty="0" smtClean="0">
+                        <a:rPr lang="ru-RU" sz="900" b="1" baseline="0" dirty="0" smtClean="0">
                           <a:solidFill>
                             <a:schemeClr val="tx1"/>
                           </a:solidFill>
                           <a:effectLst/>
-                          <a:latin typeface="Times New Roman" panose="02020603050405020304" pitchFamily="18" charset="0"/>
+                          <a:latin typeface="Calibri" panose="020F0502020204030204" pitchFamily="34" charset="0"/>
                           <a:ea typeface="Times New Roman" panose="02020603050405020304" pitchFamily="18" charset="0"/>
-                          <a:cs typeface="Times New Roman" panose="02020603050405020304" pitchFamily="18" charset="0"/>
+                          <a:cs typeface="Calibri" panose="020F0502020204030204" pitchFamily="34" charset="0"/>
                         </a:rPr>
                         <a:t>ОБЩИЙ ИТОГ:</a:t>
                       </a:r>
-                      <a:endParaRPr lang="ru-RU" sz="800" b="1" baseline="0" dirty="0">
+                      <a:endParaRPr lang="ru-RU" sz="900" b="1" baseline="0" dirty="0">
                         <a:solidFill>
                           <a:schemeClr val="tx1"/>
                         </a:solidFill>
                         <a:effectLst/>
-                        <a:latin typeface="Times New Roman" panose="02020603050405020304" pitchFamily="18" charset="0"/>
+                        <a:latin typeface="Calibri" panose="020F0502020204030204" pitchFamily="34" charset="0"/>
                         <a:ea typeface="Times New Roman" panose="02020603050405020304" pitchFamily="18" charset="0"/>
-                        <a:cs typeface="Times New Roman" panose="02020603050405020304" pitchFamily="18" charset="0"/>
+                        <a:cs typeface="Calibri" panose="020F0502020204030204" pitchFamily="34" charset="0"/>
                       </a:endParaRPr>
                     </a:p>
                   </a:txBody>
@@ -6513,25 +6515,25 @@
                         </a:lnSpc>
                       </a:pPr>
                       <a:r>
-                        <a:rPr lang="en-US" sz="800" b="1" i="0" u="none" strike="noStrike" kern="1200" baseline="0" dirty="0" smtClean="0">
+                        <a:rPr lang="en-US" sz="900" b="1" i="0" u="none" strike="noStrike" kern="1200" baseline="0" dirty="0" smtClean="0">
                           <a:solidFill>
                             <a:schemeClr val="tx1"/>
                           </a:solidFill>
                           <a:effectLst/>
-                          <a:latin typeface="Times New Roman" panose="02020603050405020304" pitchFamily="18" charset="0"/>
+                          <a:latin typeface="Calibri" panose="020F0502020204030204" pitchFamily="34" charset="0"/>
                           <a:ea typeface="+mn-ea"/>
-                          <a:cs typeface="Times New Roman" panose="02020603050405020304" pitchFamily="18" charset="0"/>
+                          <a:cs typeface="Calibri" panose="020F0502020204030204" pitchFamily="34" charset="0"/>
                         </a:rPr>
                         <a:t>5</a:t>
                       </a:r>
-                      <a:endParaRPr lang="ru-RU" sz="800" b="1" i="0" u="none" strike="noStrike" kern="1200" baseline="0" dirty="0">
+                      <a:endParaRPr lang="ru-RU" sz="900" b="1" i="0" u="none" strike="noStrike" kern="1200" baseline="0" dirty="0">
                         <a:solidFill>
                           <a:schemeClr val="tx1"/>
                         </a:solidFill>
                         <a:effectLst/>
-                        <a:latin typeface="Times New Roman" panose="02020603050405020304" pitchFamily="18" charset="0"/>
+                        <a:latin typeface="Calibri" panose="020F0502020204030204" pitchFamily="34" charset="0"/>
                         <a:ea typeface="+mn-ea"/>
-                        <a:cs typeface="Times New Roman" panose="02020603050405020304" pitchFamily="18" charset="0"/>
+                        <a:cs typeface="Calibri" panose="020F0502020204030204" pitchFamily="34" charset="0"/>
                       </a:endParaRPr>
                     </a:p>
                   </a:txBody>
@@ -6950,63 +6952,63 @@
           <p:nvPr>
             <p:extLst>
               <p:ext uri="{D42A27DB-BD31-4B8C-83A1-F6EECF244321}">
-                <p14:modId xmlns:p14="http://schemas.microsoft.com/office/powerpoint/2010/main" val="802130524"/>
+                <p14:modId xmlns:p14="http://schemas.microsoft.com/office/powerpoint/2010/main" val="1797861411"/>
               </p:ext>
             </p:extLst>
           </p:nvPr>
         </p:nvGraphicFramePr>
         <p:xfrm>
-          <a:off x="6034054" y="255347"/>
-          <a:ext cx="6582281" cy="1340294"/>
+          <a:off x="6619396" y="255349"/>
+          <a:ext cx="5768329" cy="1495096"/>
         </p:xfrm>
         <a:graphic>
           <a:graphicData uri="http://schemas.openxmlformats.org/drawingml/2006/table">
             <a:tbl>
               <a:tblPr/>
               <a:tblGrid>
-                <a:gridCol w="275144">
+                <a:gridCol w="241120">
                   <a:extLst>
                     <a:ext uri="{9D8B030D-6E8A-4147-A177-3AD203B41FA5}">
                       <a16:colId xmlns="" xmlns:a16="http://schemas.microsoft.com/office/drawing/2014/main" val="20000"/>
                     </a:ext>
                   </a:extLst>
                 </a:gridCol>
-                <a:gridCol w="1681863">
+                <a:gridCol w="1473887">
                   <a:extLst>
                     <a:ext uri="{9D8B030D-6E8A-4147-A177-3AD203B41FA5}">
                       <a16:colId xmlns="" xmlns:a16="http://schemas.microsoft.com/office/drawing/2014/main" val="20001"/>
                     </a:ext>
                   </a:extLst>
                 </a:gridCol>
-                <a:gridCol w="842838">
+                <a:gridCol w="738614">
                   <a:extLst>
                     <a:ext uri="{9D8B030D-6E8A-4147-A177-3AD203B41FA5}">
                       <a16:colId xmlns="" xmlns:a16="http://schemas.microsoft.com/office/drawing/2014/main" val="20002"/>
                     </a:ext>
                   </a:extLst>
                 </a:gridCol>
-                <a:gridCol w="1343771">
+                <a:gridCol w="1072847">
                   <a:extLst>
                     <a:ext uri="{9D8B030D-6E8A-4147-A177-3AD203B41FA5}">
                       <a16:colId xmlns="" xmlns:a16="http://schemas.microsoft.com/office/drawing/2014/main" val="20003"/>
                     </a:ext>
                   </a:extLst>
                 </a:gridCol>
-                <a:gridCol w="723568">
+                <a:gridCol w="652007">
                   <a:extLst>
                     <a:ext uri="{9D8B030D-6E8A-4147-A177-3AD203B41FA5}">
                       <a16:colId xmlns="" xmlns:a16="http://schemas.microsoft.com/office/drawing/2014/main" val="20004"/>
                     </a:ext>
                   </a:extLst>
                 </a:gridCol>
-                <a:gridCol w="935597">
+                <a:gridCol w="906745">
                   <a:extLst>
                     <a:ext uri="{9D8B030D-6E8A-4147-A177-3AD203B41FA5}">
                       <a16:colId xmlns="" xmlns:a16="http://schemas.microsoft.com/office/drawing/2014/main" val="20006"/>
                     </a:ext>
                   </a:extLst>
                 </a:gridCol>
-                <a:gridCol w="779500">
+                <a:gridCol w="683109">
                   <a:extLst>
                     <a:ext uri="{9D8B030D-6E8A-4147-A177-3AD203B41FA5}">
                       <a16:colId xmlns="" xmlns:a16="http://schemas.microsoft.com/office/drawing/2014/main" val="20007"/>
@@ -7014,7 +7016,7 @@
                   </a:extLst>
                 </a:gridCol>
               </a:tblGrid>
-              <a:tr h="197877">
+              <a:tr h="415506">
                 <a:tc>
                   <a:txBody>
                     <a:bodyPr/>
@@ -7022,41 +7024,45 @@
                     <a:p>
                       <a:pPr algn="ctr" fontAlgn="ctr"/>
                       <a:r>
-                        <a:rPr lang="ru-RU" sz="800" b="1" i="0" u="none" strike="noStrike" dirty="0" smtClean="0">
+                        <a:rPr lang="ru-RU" sz="900" b="1" i="0" u="none" strike="noStrike" dirty="0" smtClean="0">
                           <a:solidFill>
                             <a:srgbClr val="000000"/>
                           </a:solidFill>
                           <a:effectLst/>
-                          <a:latin typeface="Times New Roman" panose="02020603050405020304" pitchFamily="18" charset="0"/>
+                          <a:latin typeface="Calibri" panose="020F0502020204030204" pitchFamily="34" charset="0"/>
+                          <a:cs typeface="Calibri" panose="020F0502020204030204" pitchFamily="34" charset="0"/>
                         </a:rPr>
                         <a:t>№</a:t>
                       </a:r>
-                      <a:endParaRPr lang="en-US" sz="800" b="1" i="0" u="none" strike="noStrike" dirty="0" smtClean="0">
+                      <a:endParaRPr lang="en-US" sz="900" b="1" i="0" u="none" strike="noStrike" dirty="0" smtClean="0">
                         <a:solidFill>
                           <a:srgbClr val="000000"/>
                         </a:solidFill>
                         <a:effectLst/>
-                        <a:latin typeface="Times New Roman" panose="02020603050405020304" pitchFamily="18" charset="0"/>
+                        <a:latin typeface="Calibri" panose="020F0502020204030204" pitchFamily="34" charset="0"/>
+                        <a:cs typeface="Calibri" panose="020F0502020204030204" pitchFamily="34" charset="0"/>
                       </a:endParaRPr>
                     </a:p>
                     <a:p>
                       <a:pPr algn="ctr" fontAlgn="ctr"/>
                       <a:r>
-                        <a:rPr lang="ru-RU" sz="800" b="1" i="0" u="none" strike="noStrike" dirty="0" smtClean="0">
+                        <a:rPr lang="ru-RU" sz="900" b="1" i="0" u="none" strike="noStrike" dirty="0" smtClean="0">
                           <a:solidFill>
                             <a:srgbClr val="000000"/>
                           </a:solidFill>
                           <a:effectLst/>
-                          <a:latin typeface="Times New Roman" panose="02020603050405020304" pitchFamily="18" charset="0"/>
+                          <a:latin typeface="Calibri" panose="020F0502020204030204" pitchFamily="34" charset="0"/>
+                          <a:cs typeface="Calibri" panose="020F0502020204030204" pitchFamily="34" charset="0"/>
                         </a:rPr>
                         <a:t>п/п</a:t>
                       </a:r>
-                      <a:endParaRPr lang="ru-RU" sz="800" b="1" i="0" u="none" strike="noStrike" dirty="0">
+                      <a:endParaRPr lang="ru-RU" sz="900" b="1" i="0" u="none" strike="noStrike" dirty="0">
                         <a:solidFill>
                           <a:srgbClr val="000000"/>
                         </a:solidFill>
                         <a:effectLst/>
-                        <a:latin typeface="Times New Roman" panose="02020603050405020304" pitchFamily="18" charset="0"/>
+                        <a:latin typeface="Calibri" panose="020F0502020204030204" pitchFamily="34" charset="0"/>
+                        <a:cs typeface="Calibri" panose="020F0502020204030204" pitchFamily="34" charset="0"/>
                       </a:endParaRPr>
                     </a:p>
                   </a:txBody>
@@ -7119,12 +7125,13 @@
                     <a:p>
                       <a:pPr algn="ctr" fontAlgn="ctr"/>
                       <a:r>
-                        <a:rPr lang="ru-RU" sz="800" b="1" i="0" u="none" strike="noStrike" dirty="0">
+                        <a:rPr lang="ru-RU" sz="900" b="1" i="0" u="none" strike="noStrike" dirty="0">
                           <a:solidFill>
                             <a:srgbClr val="000000"/>
                           </a:solidFill>
                           <a:effectLst/>
-                          <a:latin typeface="Times New Roman" panose="02020603050405020304" pitchFamily="18" charset="0"/>
+                          <a:latin typeface="Calibri" panose="020F0502020204030204" pitchFamily="34" charset="0"/>
+                          <a:cs typeface="Calibri" panose="020F0502020204030204" pitchFamily="34" charset="0"/>
                         </a:rPr>
                         <a:t>Адрес</a:t>
                       </a:r>
@@ -7189,12 +7196,13 @@
                     <a:p>
                       <a:pPr algn="ctr" fontAlgn="ctr"/>
                       <a:r>
-                        <a:rPr lang="ru-RU" sz="800" b="1" i="0" u="none" strike="noStrike" dirty="0">
+                        <a:rPr lang="ru-RU" sz="900" b="1" i="0" u="none" strike="noStrike" dirty="0">
                           <a:solidFill>
                             <a:srgbClr val="000000"/>
                           </a:solidFill>
                           <a:effectLst/>
-                          <a:latin typeface="Times New Roman" panose="02020603050405020304" pitchFamily="18" charset="0"/>
+                          <a:latin typeface="Calibri" panose="020F0502020204030204" pitchFamily="34" charset="0"/>
+                          <a:cs typeface="Calibri" panose="020F0502020204030204" pitchFamily="34" charset="0"/>
                         </a:rPr>
                         <a:t>Группа инвалидности</a:t>
                       </a:r>
@@ -7259,40 +7267,44 @@
                     <a:p>
                       <a:pPr algn="ctr" fontAlgn="ctr"/>
                       <a:r>
-                        <a:rPr lang="ru-RU" sz="800" b="1" i="0" u="none" strike="noStrike" dirty="0">
+                        <a:rPr lang="ru-RU" sz="900" b="1" i="0" u="none" strike="noStrike" dirty="0">
                           <a:solidFill>
                             <a:srgbClr val="000000"/>
                           </a:solidFill>
                           <a:effectLst/>
-                          <a:latin typeface="Times New Roman" panose="02020603050405020304" pitchFamily="18" charset="0"/>
+                          <a:latin typeface="Calibri" panose="020F0502020204030204" pitchFamily="34" charset="0"/>
+                          <a:cs typeface="Calibri" panose="020F0502020204030204" pitchFamily="34" charset="0"/>
                         </a:rPr>
                         <a:t>Необходимость пользования </a:t>
                       </a:r>
                       <a:br>
-                        <a:rPr lang="ru-RU" sz="800" b="1" i="0" u="none" strike="noStrike" dirty="0">
+                        <a:rPr lang="ru-RU" sz="900" b="1" i="0" u="none" strike="noStrike" dirty="0">
                           <a:solidFill>
                             <a:srgbClr val="000000"/>
                           </a:solidFill>
                           <a:effectLst/>
-                          <a:latin typeface="Times New Roman" panose="02020603050405020304" pitchFamily="18" charset="0"/>
+                          <a:latin typeface="Calibri" panose="020F0502020204030204" pitchFamily="34" charset="0"/>
+                          <a:cs typeface="Calibri" panose="020F0502020204030204" pitchFamily="34" charset="0"/>
                         </a:rPr>
                       </a:br>
                       <a:r>
-                        <a:rPr lang="ru-RU" sz="800" b="1" i="0" u="none" strike="noStrike" dirty="0" smtClean="0">
+                        <a:rPr lang="ru-RU" sz="900" b="1" i="0" u="none" strike="noStrike" dirty="0" smtClean="0">
                           <a:solidFill>
                             <a:srgbClr val="000000"/>
                           </a:solidFill>
                           <a:effectLst/>
-                          <a:latin typeface="Times New Roman" panose="02020603050405020304" pitchFamily="18" charset="0"/>
+                          <a:latin typeface="Calibri" panose="020F0502020204030204" pitchFamily="34" charset="0"/>
+                          <a:cs typeface="Calibri" panose="020F0502020204030204" pitchFamily="34" charset="0"/>
                         </a:rPr>
                         <a:t>кресло-коляской</a:t>
                       </a:r>
-                      <a:endParaRPr lang="ru-RU" sz="800" b="1" i="0" u="none" strike="noStrike" dirty="0">
+                      <a:endParaRPr lang="ru-RU" sz="900" b="1" i="0" u="none" strike="noStrike" dirty="0">
                         <a:solidFill>
                           <a:srgbClr val="000000"/>
                         </a:solidFill>
                         <a:effectLst/>
-                        <a:latin typeface="Times New Roman" panose="02020603050405020304" pitchFamily="18" charset="0"/>
+                        <a:latin typeface="Calibri" panose="020F0502020204030204" pitchFamily="34" charset="0"/>
+                        <a:cs typeface="Calibri" panose="020F0502020204030204" pitchFamily="34" charset="0"/>
                       </a:endParaRPr>
                     </a:p>
                   </a:txBody>
@@ -7355,31 +7367,34 @@
                     <a:p>
                       <a:pPr algn="ctr" fontAlgn="ctr"/>
                       <a:r>
-                        <a:rPr lang="ru-RU" sz="800" b="1" i="0" u="none" strike="noStrike" dirty="0" smtClean="0">
+                        <a:rPr lang="ru-RU" sz="900" b="1" i="0" u="none" strike="noStrike" dirty="0" smtClean="0">
                           <a:solidFill>
                             <a:srgbClr val="000000"/>
                           </a:solidFill>
                           <a:effectLst/>
-                          <a:latin typeface="Times New Roman" panose="02020603050405020304" pitchFamily="18" charset="0"/>
+                          <a:latin typeface="Calibri" panose="020F0502020204030204" pitchFamily="34" charset="0"/>
+                          <a:cs typeface="Calibri" panose="020F0502020204030204" pitchFamily="34" charset="0"/>
                         </a:rPr>
                         <a:t>Улучшение</a:t>
                       </a:r>
                       <a:r>
-                        <a:rPr lang="ru-RU" sz="800" b="1" i="0" u="none" strike="noStrike" baseline="0" dirty="0" smtClean="0">
+                        <a:rPr lang="ru-RU" sz="900" b="1" i="0" u="none" strike="noStrike" baseline="0" dirty="0" smtClean="0">
                           <a:solidFill>
                             <a:srgbClr val="000000"/>
                           </a:solidFill>
                           <a:effectLst/>
-                          <a:latin typeface="Times New Roman" panose="02020603050405020304" pitchFamily="18" charset="0"/>
+                          <a:latin typeface="Calibri" panose="020F0502020204030204" pitchFamily="34" charset="0"/>
+                          <a:cs typeface="Calibri" panose="020F0502020204030204" pitchFamily="34" charset="0"/>
                         </a:rPr>
                         <a:t> условий</a:t>
                       </a:r>
-                      <a:endParaRPr lang="ru-RU" sz="800" b="1" i="0" u="none" strike="noStrike" dirty="0">
+                      <a:endParaRPr lang="ru-RU" sz="900" b="1" i="0" u="none" strike="noStrike" dirty="0">
                         <a:solidFill>
                           <a:srgbClr val="000000"/>
                         </a:solidFill>
                         <a:effectLst/>
-                        <a:latin typeface="Times New Roman" panose="02020603050405020304" pitchFamily="18" charset="0"/>
+                        <a:latin typeface="Calibri" panose="020F0502020204030204" pitchFamily="34" charset="0"/>
+                        <a:cs typeface="Calibri" panose="020F0502020204030204" pitchFamily="34" charset="0"/>
                       </a:endParaRPr>
                     </a:p>
                   </a:txBody>
@@ -7442,21 +7457,23 @@
                     <a:p>
                       <a:pPr algn="ctr" fontAlgn="ctr"/>
                       <a:r>
-                        <a:rPr lang="ru-RU" sz="800" b="1" i="0" u="none" strike="noStrike" dirty="0" smtClean="0">
+                        <a:rPr lang="ru-RU" sz="900" b="1" i="0" u="none" strike="noStrike" dirty="0" smtClean="0">
                           <a:solidFill>
                             <a:srgbClr val="000000"/>
                           </a:solidFill>
                           <a:effectLst/>
-                          <a:latin typeface="Times New Roman" panose="02020603050405020304" pitchFamily="18" charset="0"/>
+                          <a:latin typeface="Calibri" panose="020F0502020204030204" pitchFamily="34" charset="0"/>
+                          <a:cs typeface="Calibri" panose="020F0502020204030204" pitchFamily="34" charset="0"/>
                         </a:rPr>
                         <a:t>Приспособление</a:t>
                       </a:r>
-                      <a:endParaRPr lang="ru-RU" sz="800" b="1" i="0" u="none" strike="noStrike" dirty="0">
+                      <a:endParaRPr lang="ru-RU" sz="900" b="1" i="0" u="none" strike="noStrike" dirty="0">
                         <a:solidFill>
                           <a:srgbClr val="000000"/>
                         </a:solidFill>
                         <a:effectLst/>
-                        <a:latin typeface="Times New Roman" panose="02020603050405020304" pitchFamily="18" charset="0"/>
+                        <a:latin typeface="Calibri" panose="020F0502020204030204" pitchFamily="34" charset="0"/>
+                        <a:cs typeface="Calibri" panose="020F0502020204030204" pitchFamily="34" charset="0"/>
                       </a:endParaRPr>
                     </a:p>
                   </a:txBody>
@@ -7519,34 +7536,37 @@
                     <a:p>
                       <a:pPr algn="ctr" fontAlgn="ctr"/>
                       <a:r>
-                        <a:rPr lang="ru-RU" sz="800" b="1" i="0" u="none" strike="noStrike" dirty="0" smtClean="0">
+                        <a:rPr lang="ru-RU" sz="900" b="1" i="0" u="none" strike="noStrike" dirty="0" smtClean="0">
                           <a:solidFill>
                             <a:srgbClr val="000000"/>
                           </a:solidFill>
                           <a:effectLst/>
-                          <a:latin typeface="Times New Roman" panose="02020603050405020304" pitchFamily="18" charset="0"/>
+                          <a:latin typeface="Calibri" panose="020F0502020204030204" pitchFamily="34" charset="0"/>
+                          <a:cs typeface="Calibri" panose="020F0502020204030204" pitchFamily="34" charset="0"/>
                         </a:rPr>
-                        <a:t>Всего Кол-во,</a:t>
+                        <a:t>Всего кол-во,</a:t>
                       </a:r>
                     </a:p>
                     <a:p>
                       <a:pPr algn="ctr" fontAlgn="ctr"/>
                       <a:r>
-                        <a:rPr lang="ru-RU" sz="800" b="1" i="0" u="none" strike="noStrike" baseline="0" dirty="0" smtClean="0">
+                        <a:rPr lang="ru-RU" sz="900" b="1" i="0" u="none" strike="noStrike" baseline="0" dirty="0" smtClean="0">
                           <a:solidFill>
                             <a:srgbClr val="000000"/>
                           </a:solidFill>
                           <a:effectLst/>
-                          <a:latin typeface="Times New Roman" panose="02020603050405020304" pitchFamily="18" charset="0"/>
+                          <a:latin typeface="Calibri" panose="020F0502020204030204" pitchFamily="34" charset="0"/>
+                          <a:cs typeface="Calibri" panose="020F0502020204030204" pitchFamily="34" charset="0"/>
                         </a:rPr>
                         <a:t> чел.</a:t>
                       </a:r>
-                      <a:endParaRPr lang="ru-RU" sz="800" b="1" i="0" u="none" strike="noStrike" dirty="0">
+                      <a:endParaRPr lang="ru-RU" sz="900" b="1" i="0" u="none" strike="noStrike" dirty="0">
                         <a:solidFill>
                           <a:srgbClr val="000000"/>
                         </a:solidFill>
                         <a:effectLst/>
-                        <a:latin typeface="Times New Roman" panose="02020603050405020304" pitchFamily="18" charset="0"/>
+                        <a:latin typeface="Calibri" panose="020F0502020204030204" pitchFamily="34" charset="0"/>
+                        <a:cs typeface="Calibri" panose="020F0502020204030204" pitchFamily="34" charset="0"/>
                       </a:endParaRPr>
                     </a:p>
                   </a:txBody>
@@ -7608,7 +7628,7 @@
                   </a:ext>
                 </a:extLst>
               </a:tr>
-              <a:tr h="145655">
+              <a:tr h="144769">
                 <a:tc>
                   <a:txBody>
                     <a:bodyPr/>
@@ -7616,23 +7636,23 @@
                     <a:p>
                       <a:pPr algn="ctr" fontAlgn="ctr"/>
                       <a:r>
-                        <a:rPr lang="ru-RU" sz="800" b="0" i="0" u="none" strike="noStrike" baseline="0" dirty="0" smtClean="0">
+                        <a:rPr lang="ru-RU" sz="900" b="0" i="0" u="none" strike="noStrike" baseline="0" dirty="0" smtClean="0">
                           <a:solidFill>
                             <a:srgbClr val="000000"/>
                           </a:solidFill>
                           <a:effectLst/>
-                          <a:latin typeface="Times New Roman" panose="02020603050405020304" pitchFamily="18" charset="0"/>
-                          <a:cs typeface="Times New Roman" panose="02020603050405020304" pitchFamily="18" charset="0"/>
+                          <a:latin typeface="Calibri" panose="020F0502020204030204" pitchFamily="34" charset="0"/>
+                          <a:cs typeface="Calibri" panose="020F0502020204030204" pitchFamily="34" charset="0"/>
                         </a:rPr>
                         <a:t>1</a:t>
                       </a:r>
-                      <a:endParaRPr lang="ru-RU" sz="800" b="0" i="0" u="none" strike="noStrike" baseline="0" dirty="0">
+                      <a:endParaRPr lang="ru-RU" sz="900" b="0" i="0" u="none" strike="noStrike" baseline="0" dirty="0">
                         <a:solidFill>
                           <a:srgbClr val="000000"/>
                         </a:solidFill>
                         <a:effectLst/>
-                        <a:latin typeface="Times New Roman" panose="02020603050405020304" pitchFamily="18" charset="0"/>
-                        <a:cs typeface="Times New Roman" panose="02020603050405020304" pitchFamily="18" charset="0"/>
+                        <a:latin typeface="Calibri" panose="020F0502020204030204" pitchFamily="34" charset="0"/>
+                        <a:cs typeface="Calibri" panose="020F0502020204030204" pitchFamily="34" charset="0"/>
                       </a:endParaRPr>
                     </a:p>
                   </a:txBody>
@@ -7697,25 +7717,25 @@
                         </a:spcAft>
                       </a:pPr>
                       <a:r>
-                        <a:rPr lang="ru-RU" sz="800" baseline="0" dirty="0" smtClean="0">
+                        <a:rPr lang="ru-RU" sz="900" baseline="0" dirty="0" smtClean="0">
                           <a:solidFill>
                             <a:schemeClr val="tx1"/>
                           </a:solidFill>
                           <a:effectLst/>
-                          <a:latin typeface="Times New Roman" panose="02020603050405020304" pitchFamily="18" charset="0"/>
+                          <a:latin typeface="Calibri" panose="020F0502020204030204" pitchFamily="34" charset="0"/>
                           <a:ea typeface="Calibri" panose="020F0502020204030204" pitchFamily="34" charset="0"/>
-                          <a:cs typeface="Times New Roman" panose="02020603050405020304" pitchFamily="18" charset="0"/>
+                          <a:cs typeface="Calibri" panose="020F0502020204030204" pitchFamily="34" charset="0"/>
                         </a:rPr>
                         <a:t>тест</a:t>
                       </a:r>
-                      <a:endParaRPr lang="ru-RU" sz="800" baseline="0" dirty="0">
+                      <a:endParaRPr lang="ru-RU" sz="900" baseline="0" dirty="0">
                         <a:solidFill>
                           <a:schemeClr val="tx1"/>
                         </a:solidFill>
                         <a:effectLst/>
-                        <a:latin typeface="Times New Roman" panose="02020603050405020304" pitchFamily="18" charset="0"/>
+                        <a:latin typeface="Calibri" panose="020F0502020204030204" pitchFamily="34" charset="0"/>
                         <a:ea typeface="Calibri" panose="020F0502020204030204" pitchFamily="34" charset="0"/>
-                        <a:cs typeface="Times New Roman" panose="02020603050405020304" pitchFamily="18" charset="0"/>
+                        <a:cs typeface="Calibri" panose="020F0502020204030204" pitchFamily="34" charset="0"/>
                       </a:endParaRPr>
                     </a:p>
                   </a:txBody>
@@ -7773,23 +7793,23 @@
                     <a:p>
                       <a:pPr algn="ctr" fontAlgn="ctr"/>
                       <a:r>
-                        <a:rPr lang="ru-RU" sz="800" b="0" i="0" u="none" strike="noStrike" baseline="0" dirty="0" smtClean="0">
+                        <a:rPr lang="ru-RU" sz="900" b="0" i="0" u="none" strike="noStrike" baseline="0" dirty="0" smtClean="0">
                           <a:solidFill>
                             <a:schemeClr val="tx1"/>
                           </a:solidFill>
                           <a:effectLst/>
-                          <a:latin typeface="Times New Roman" panose="02020603050405020304" pitchFamily="18" charset="0"/>
-                          <a:cs typeface="Times New Roman" panose="02020603050405020304" pitchFamily="18" charset="0"/>
+                          <a:latin typeface="Calibri" panose="020F0502020204030204" pitchFamily="34" charset="0"/>
+                          <a:cs typeface="Calibri" panose="020F0502020204030204" pitchFamily="34" charset="0"/>
                         </a:rPr>
                         <a:t>тест</a:t>
                       </a:r>
-                      <a:endParaRPr lang="ru-RU" sz="800" b="0" i="0" u="none" strike="noStrike" baseline="0" dirty="0">
+                      <a:endParaRPr lang="ru-RU" sz="900" b="0" i="0" u="none" strike="noStrike" baseline="0" dirty="0">
                         <a:solidFill>
                           <a:schemeClr val="tx1"/>
                         </a:solidFill>
                         <a:effectLst/>
-                        <a:latin typeface="Times New Roman" panose="02020603050405020304" pitchFamily="18" charset="0"/>
-                        <a:cs typeface="Times New Roman" panose="02020603050405020304" pitchFamily="18" charset="0"/>
+                        <a:latin typeface="Calibri" panose="020F0502020204030204" pitchFamily="34" charset="0"/>
+                        <a:cs typeface="Calibri" panose="020F0502020204030204" pitchFamily="34" charset="0"/>
                       </a:endParaRPr>
                     </a:p>
                   </a:txBody>
@@ -7847,23 +7867,23 @@
                     <a:p>
                       <a:pPr algn="ctr" fontAlgn="ctr"/>
                       <a:r>
-                        <a:rPr lang="ru-RU" sz="800" b="0" i="0" u="none" strike="noStrike" baseline="0" dirty="0" smtClean="0">
+                        <a:rPr lang="ru-RU" sz="900" b="0" i="0" u="none" strike="noStrike" baseline="0" dirty="0" smtClean="0">
                           <a:solidFill>
                             <a:schemeClr val="tx1"/>
                           </a:solidFill>
                           <a:effectLst/>
-                          <a:latin typeface="Times New Roman" panose="02020603050405020304" pitchFamily="18" charset="0"/>
-                          <a:cs typeface="Times New Roman" panose="02020603050405020304" pitchFamily="18" charset="0"/>
+                          <a:latin typeface="Calibri" panose="020F0502020204030204" pitchFamily="34" charset="0"/>
+                          <a:cs typeface="Calibri" panose="020F0502020204030204" pitchFamily="34" charset="0"/>
                         </a:rPr>
                         <a:t>тест</a:t>
                       </a:r>
-                      <a:endParaRPr lang="ru-RU" sz="800" b="0" i="0" u="none" strike="noStrike" baseline="0" dirty="0">
+                      <a:endParaRPr lang="ru-RU" sz="900" b="0" i="0" u="none" strike="noStrike" baseline="0" dirty="0">
                         <a:solidFill>
                           <a:schemeClr val="tx1"/>
                         </a:solidFill>
                         <a:effectLst/>
-                        <a:latin typeface="Times New Roman" panose="02020603050405020304" pitchFamily="18" charset="0"/>
-                        <a:cs typeface="Times New Roman" panose="02020603050405020304" pitchFamily="18" charset="0"/>
+                        <a:latin typeface="Calibri" panose="020F0502020204030204" pitchFamily="34" charset="0"/>
+                        <a:cs typeface="Calibri" panose="020F0502020204030204" pitchFamily="34" charset="0"/>
                       </a:endParaRPr>
                     </a:p>
                   </a:txBody>
@@ -7921,23 +7941,23 @@
                     <a:p>
                       <a:pPr algn="ctr" fontAlgn="ctr"/>
                       <a:r>
-                        <a:rPr lang="ru-RU" sz="800" b="0" i="0" u="none" strike="noStrike" baseline="0" dirty="0" smtClean="0">
+                        <a:rPr lang="ru-RU" sz="900" b="0" i="0" u="none" strike="noStrike" baseline="0" dirty="0" smtClean="0">
                           <a:solidFill>
                             <a:schemeClr val="tx1"/>
                           </a:solidFill>
                           <a:effectLst/>
-                          <a:latin typeface="Times New Roman" panose="02020603050405020304" pitchFamily="18" charset="0"/>
-                          <a:cs typeface="Times New Roman" panose="02020603050405020304" pitchFamily="18" charset="0"/>
+                          <a:latin typeface="Calibri" panose="020F0502020204030204" pitchFamily="34" charset="0"/>
+                          <a:cs typeface="Calibri" panose="020F0502020204030204" pitchFamily="34" charset="0"/>
                         </a:rPr>
                         <a:t>тест</a:t>
                       </a:r>
-                      <a:endParaRPr lang="ru-RU" sz="800" b="0" i="0" u="none" strike="noStrike" baseline="0" dirty="0">
+                      <a:endParaRPr lang="ru-RU" sz="900" b="0" i="0" u="none" strike="noStrike" baseline="0" dirty="0">
                         <a:solidFill>
                           <a:schemeClr val="tx1"/>
                         </a:solidFill>
                         <a:effectLst/>
-                        <a:latin typeface="Times New Roman" panose="02020603050405020304" pitchFamily="18" charset="0"/>
-                        <a:cs typeface="Times New Roman" panose="02020603050405020304" pitchFamily="18" charset="0"/>
+                        <a:latin typeface="Calibri" panose="020F0502020204030204" pitchFamily="34" charset="0"/>
+                        <a:cs typeface="Calibri" panose="020F0502020204030204" pitchFamily="34" charset="0"/>
                       </a:endParaRPr>
                     </a:p>
                   </a:txBody>
@@ -7995,23 +8015,23 @@
                     <a:p>
                       <a:pPr algn="ctr" fontAlgn="ctr"/>
                       <a:r>
-                        <a:rPr lang="ru-RU" sz="800" b="0" i="0" u="none" strike="noStrike" baseline="0" dirty="0" smtClean="0">
+                        <a:rPr lang="ru-RU" sz="900" b="0" i="0" u="none" strike="noStrike" baseline="0" dirty="0" smtClean="0">
                           <a:solidFill>
                             <a:schemeClr val="tx1"/>
                           </a:solidFill>
                           <a:effectLst/>
-                          <a:latin typeface="Times New Roman" panose="02020603050405020304" pitchFamily="18" charset="0"/>
-                          <a:cs typeface="Times New Roman" panose="02020603050405020304" pitchFamily="18" charset="0"/>
+                          <a:latin typeface="Calibri" panose="020F0502020204030204" pitchFamily="34" charset="0"/>
+                          <a:cs typeface="Calibri" panose="020F0502020204030204" pitchFamily="34" charset="0"/>
                         </a:rPr>
                         <a:t>тест</a:t>
                       </a:r>
-                      <a:endParaRPr lang="ru-RU" sz="800" b="0" i="0" u="none" strike="noStrike" baseline="0" dirty="0">
+                      <a:endParaRPr lang="ru-RU" sz="900" b="0" i="0" u="none" strike="noStrike" baseline="0" dirty="0">
                         <a:solidFill>
                           <a:schemeClr val="tx1"/>
                         </a:solidFill>
                         <a:effectLst/>
-                        <a:latin typeface="Times New Roman" panose="02020603050405020304" pitchFamily="18" charset="0"/>
-                        <a:cs typeface="Times New Roman" panose="02020603050405020304" pitchFamily="18" charset="0"/>
+                        <a:latin typeface="Calibri" panose="020F0502020204030204" pitchFamily="34" charset="0"/>
+                        <a:cs typeface="Calibri" panose="020F0502020204030204" pitchFamily="34" charset="0"/>
                       </a:endParaRPr>
                     </a:p>
                   </a:txBody>
@@ -8069,23 +8089,23 @@
                     <a:p>
                       <a:pPr algn="ctr" fontAlgn="ctr"/>
                       <a:r>
-                        <a:rPr lang="ru-RU" sz="800" b="0" i="0" u="none" strike="noStrike" baseline="0" dirty="0" smtClean="0">
+                        <a:rPr lang="ru-RU" sz="900" b="0" i="0" u="none" strike="noStrike" baseline="0" dirty="0" smtClean="0">
                           <a:solidFill>
                             <a:schemeClr val="tx1"/>
                           </a:solidFill>
                           <a:effectLst/>
-                          <a:latin typeface="Times New Roman" panose="02020603050405020304" pitchFamily="18" charset="0"/>
-                          <a:cs typeface="Times New Roman" panose="02020603050405020304" pitchFamily="18" charset="0"/>
+                          <a:latin typeface="Calibri" panose="020F0502020204030204" pitchFamily="34" charset="0"/>
+                          <a:cs typeface="Calibri" panose="020F0502020204030204" pitchFamily="34" charset="0"/>
                         </a:rPr>
                         <a:t>тест</a:t>
                       </a:r>
-                      <a:endParaRPr lang="ru-RU" sz="800" b="0" i="0" u="none" strike="noStrike" baseline="0" dirty="0">
+                      <a:endParaRPr lang="ru-RU" sz="900" b="0" i="0" u="none" strike="noStrike" baseline="0" dirty="0">
                         <a:solidFill>
                           <a:schemeClr val="tx1"/>
                         </a:solidFill>
                         <a:effectLst/>
-                        <a:latin typeface="Times New Roman" panose="02020603050405020304" pitchFamily="18" charset="0"/>
-                        <a:cs typeface="Times New Roman" panose="02020603050405020304" pitchFamily="18" charset="0"/>
+                        <a:latin typeface="Calibri" panose="020F0502020204030204" pitchFamily="34" charset="0"/>
+                        <a:cs typeface="Calibri" panose="020F0502020204030204" pitchFamily="34" charset="0"/>
                       </a:endParaRPr>
                     </a:p>
                   </a:txBody>
@@ -8142,7 +8162,7 @@
                   </a:ext>
                 </a:extLst>
               </a:tr>
-              <a:tr h="145655">
+              <a:tr h="144769">
                 <a:tc gridSpan="7">
                   <a:txBody>
                     <a:bodyPr/>
@@ -8150,23 +8170,23 @@
                     <a:p>
                       <a:pPr algn="ctr" fontAlgn="ctr"/>
                       <a:r>
-                        <a:rPr lang="ru-RU" sz="800" b="0" i="0" u="none" strike="noStrike" dirty="0" smtClean="0">
+                        <a:rPr lang="ru-RU" sz="900" b="0" i="0" u="none" strike="noStrike" dirty="0" smtClean="0">
                           <a:solidFill>
                             <a:srgbClr val="000000"/>
                           </a:solidFill>
                           <a:effectLst/>
-                          <a:latin typeface="Times New Roman" panose="02020603050405020304" pitchFamily="18" charset="0"/>
-                          <a:cs typeface="Times New Roman" panose="02020603050405020304" pitchFamily="18" charset="0"/>
+                          <a:latin typeface="Calibri" panose="020F0502020204030204" pitchFamily="34" charset="0"/>
+                          <a:cs typeface="Calibri" panose="020F0502020204030204" pitchFamily="34" charset="0"/>
                         </a:rPr>
                         <a:t>тест</a:t>
                       </a:r>
-                      <a:endParaRPr lang="ru-RU" sz="800" b="0" i="0" u="none" strike="noStrike" dirty="0">
+                      <a:endParaRPr lang="ru-RU" sz="900" b="0" i="0" u="none" strike="noStrike" dirty="0">
                         <a:solidFill>
                           <a:srgbClr val="000000"/>
                         </a:solidFill>
                         <a:effectLst/>
-                        <a:latin typeface="Times New Roman" panose="02020603050405020304" pitchFamily="18" charset="0"/>
-                        <a:cs typeface="Times New Roman" panose="02020603050405020304" pitchFamily="18" charset="0"/>
+                        <a:latin typeface="Calibri" panose="020F0502020204030204" pitchFamily="34" charset="0"/>
+                        <a:cs typeface="Calibri" panose="020F0502020204030204" pitchFamily="34" charset="0"/>
                       </a:endParaRPr>
                     </a:p>
                   </a:txBody>
@@ -8604,7 +8624,7 @@
                   </a:ext>
                 </a:extLst>
               </a:tr>
-              <a:tr h="145655">
+              <a:tr h="144769">
                 <a:tc gridSpan="6">
                   <a:txBody>
                     <a:bodyPr/>
@@ -8628,37 +8648,37 @@
                         <a:defRPr/>
                       </a:pPr>
                       <a:r>
-                        <a:rPr lang="ru-RU" sz="800" b="1" i="0" u="none" strike="noStrike" kern="1200" baseline="0" dirty="0" smtClean="0">
+                        <a:rPr lang="ru-RU" sz="900" b="1" i="0" u="none" strike="noStrike" kern="1200" baseline="0" dirty="0" smtClean="0">
                           <a:solidFill>
                             <a:srgbClr val="000000"/>
                           </a:solidFill>
                           <a:effectLst/>
-                          <a:latin typeface="Times New Roman" panose="02020603050405020304" pitchFamily="18" charset="0"/>
+                          <a:latin typeface="Calibri" panose="020F0502020204030204" pitchFamily="34" charset="0"/>
                           <a:ea typeface="+mn-ea"/>
-                          <a:cs typeface="+mn-cs"/>
+                          <a:cs typeface="Calibri" panose="020F0502020204030204" pitchFamily="34" charset="0"/>
                         </a:rPr>
                         <a:t>Итого</a:t>
                       </a:r>
                       <a:r>
-                        <a:rPr lang="en-US" sz="800" b="1" i="0" u="none" strike="noStrike" kern="1200" baseline="0" dirty="0" smtClean="0">
+                        <a:rPr lang="en-US" sz="900" b="1" i="0" u="none" strike="noStrike" kern="1200" baseline="0" dirty="0" smtClean="0">
                           <a:solidFill>
                             <a:srgbClr val="000000"/>
                           </a:solidFill>
                           <a:effectLst/>
-                          <a:latin typeface="Times New Roman" panose="02020603050405020304" pitchFamily="18" charset="0"/>
+                          <a:latin typeface="Calibri" panose="020F0502020204030204" pitchFamily="34" charset="0"/>
                           <a:ea typeface="+mn-ea"/>
-                          <a:cs typeface="+mn-cs"/>
+                          <a:cs typeface="Calibri" panose="020F0502020204030204" pitchFamily="34" charset="0"/>
                         </a:rPr>
                         <a:t>:</a:t>
                       </a:r>
-                      <a:endParaRPr lang="ru-RU" sz="800" b="1" i="0" u="none" strike="noStrike" kern="1200" baseline="0" dirty="0">
+                      <a:endParaRPr lang="ru-RU" sz="900" b="1" i="0" u="none" strike="noStrike" kern="1200" baseline="0" dirty="0">
                         <a:solidFill>
                           <a:srgbClr val="000000"/>
                         </a:solidFill>
                         <a:effectLst/>
-                        <a:latin typeface="Times New Roman" panose="02020603050405020304" pitchFamily="18" charset="0"/>
+                        <a:latin typeface="Calibri" panose="020F0502020204030204" pitchFamily="34" charset="0"/>
                         <a:ea typeface="+mn-ea"/>
-                        <a:cs typeface="+mn-cs"/>
+                        <a:cs typeface="Calibri" panose="020F0502020204030204" pitchFamily="34" charset="0"/>
                       </a:endParaRPr>
                     </a:p>
                   </a:txBody>
@@ -8992,13 +9012,13 @@
                     <a:p>
                       <a:pPr algn="ctr" fontAlgn="ctr"/>
                       <a:r>
-                        <a:rPr lang="ru-RU" sz="800" b="1" i="0" u="none" strike="noStrike" baseline="0" dirty="0" smtClean="0">
+                        <a:rPr lang="ru-RU" sz="900" b="1" i="0" u="none" strike="noStrike" baseline="0" dirty="0" smtClean="0">
                           <a:solidFill>
                             <a:srgbClr val="000000"/>
                           </a:solidFill>
                           <a:effectLst/>
-                          <a:latin typeface="Times New Roman" panose="02020603050405020304" pitchFamily="18" charset="0"/>
-                          <a:cs typeface="Times New Roman" panose="02020603050405020304" pitchFamily="18" charset="0"/>
+                          <a:latin typeface="Calibri" panose="020F0502020204030204" pitchFamily="34" charset="0"/>
+                          <a:cs typeface="Calibri" panose="020F0502020204030204" pitchFamily="34" charset="0"/>
                         </a:rPr>
                         <a:t>0</a:t>
                       </a:r>
@@ -9062,7 +9082,7 @@
                   </a:ext>
                 </a:extLst>
               </a:tr>
-              <a:tr h="145655">
+              <a:tr h="144769">
                 <a:tc gridSpan="6">
                   <a:txBody>
                     <a:bodyPr/>
@@ -9086,12 +9106,13 @@
                         <a:defRPr/>
                       </a:pPr>
                       <a:r>
-                        <a:rPr lang="ru-RU" sz="800" b="1" i="0" u="none" strike="noStrike" baseline="0" dirty="0" smtClean="0">
+                        <a:rPr lang="ru-RU" sz="900" b="1" i="0" u="none" strike="noStrike" baseline="0" dirty="0" smtClean="0">
                           <a:solidFill>
                             <a:srgbClr val="000000"/>
                           </a:solidFill>
                           <a:effectLst/>
-                          <a:latin typeface="Times New Roman" panose="02020603050405020304" pitchFamily="18" charset="0"/>
+                          <a:latin typeface="Calibri" panose="020F0502020204030204" pitchFamily="34" charset="0"/>
+                          <a:cs typeface="Calibri" panose="020F0502020204030204" pitchFamily="34" charset="0"/>
                         </a:rPr>
                         <a:t>Итого 1-й группы инвалидности:</a:t>
                       </a:r>
@@ -9359,13 +9380,13 @@
                     <a:p>
                       <a:pPr algn="ctr" fontAlgn="ctr"/>
                       <a:r>
-                        <a:rPr lang="ru-RU" sz="800" b="1" i="0" u="none" strike="noStrike" baseline="0" dirty="0" smtClean="0">
+                        <a:rPr lang="ru-RU" sz="900" b="1" i="0" u="none" strike="noStrike" baseline="0" dirty="0" smtClean="0">
                           <a:solidFill>
                             <a:srgbClr val="000000"/>
                           </a:solidFill>
                           <a:effectLst/>
-                          <a:latin typeface="Times New Roman" panose="02020603050405020304" pitchFamily="18" charset="0"/>
-                          <a:cs typeface="Times New Roman" panose="02020603050405020304" pitchFamily="18" charset="0"/>
+                          <a:latin typeface="Calibri" panose="020F0502020204030204" pitchFamily="34" charset="0"/>
+                          <a:cs typeface="Calibri" panose="020F0502020204030204" pitchFamily="34" charset="0"/>
                         </a:rPr>
                         <a:t>0</a:t>
                       </a:r>
@@ -9424,7 +9445,7 @@
                   </a:ext>
                 </a:extLst>
               </a:tr>
-              <a:tr h="145655">
+              <a:tr h="144769">
                 <a:tc gridSpan="6">
                   <a:txBody>
                     <a:bodyPr/>
@@ -9448,12 +9469,13 @@
                         <a:defRPr/>
                       </a:pPr>
                       <a:r>
-                        <a:rPr lang="ru-RU" sz="800" b="1" i="0" u="none" strike="noStrike" baseline="0" dirty="0" smtClean="0">
+                        <a:rPr lang="ru-RU" sz="900" b="1" i="0" u="none" strike="noStrike" baseline="0" dirty="0" smtClean="0">
                           <a:solidFill>
                             <a:srgbClr val="000000"/>
                           </a:solidFill>
                           <a:effectLst/>
-                          <a:latin typeface="Times New Roman" panose="02020603050405020304" pitchFamily="18" charset="0"/>
+                          <a:latin typeface="Calibri" panose="020F0502020204030204" pitchFamily="34" charset="0"/>
+                          <a:cs typeface="Calibri" panose="020F0502020204030204" pitchFamily="34" charset="0"/>
                         </a:rPr>
                         <a:t>Итого 2-й группы инвалидности:</a:t>
                       </a:r>
@@ -9766,23 +9788,23 @@
                     <a:p>
                       <a:pPr algn="ctr" fontAlgn="ctr"/>
                       <a:r>
-                        <a:rPr lang="ru-RU" sz="800" b="1" i="0" u="none" strike="noStrike" baseline="0" dirty="0" smtClean="0">
+                        <a:rPr lang="ru-RU" sz="900" b="1" i="0" u="none" strike="noStrike" baseline="0" dirty="0" smtClean="0">
                           <a:solidFill>
                             <a:srgbClr val="000000"/>
                           </a:solidFill>
                           <a:effectLst/>
-                          <a:latin typeface="Times New Roman" panose="02020603050405020304" pitchFamily="18" charset="0"/>
-                          <a:cs typeface="Times New Roman" panose="02020603050405020304" pitchFamily="18" charset="0"/>
+                          <a:latin typeface="Calibri" panose="020F0502020204030204" pitchFamily="34" charset="0"/>
+                          <a:cs typeface="Calibri" panose="020F0502020204030204" pitchFamily="34" charset="0"/>
                         </a:rPr>
                         <a:t>0</a:t>
                       </a:r>
-                      <a:endParaRPr lang="ru-RU" sz="800" b="1" i="0" u="none" strike="noStrike" baseline="0" dirty="0">
+                      <a:endParaRPr lang="ru-RU" sz="900" b="1" i="0" u="none" strike="noStrike" baseline="0" dirty="0">
                         <a:solidFill>
                           <a:srgbClr val="000000"/>
                         </a:solidFill>
                         <a:effectLst/>
-                        <a:latin typeface="Times New Roman" panose="02020603050405020304" pitchFamily="18" charset="0"/>
-                        <a:cs typeface="Times New Roman" panose="02020603050405020304" pitchFamily="18" charset="0"/>
+                        <a:latin typeface="Calibri" panose="020F0502020204030204" pitchFamily="34" charset="0"/>
+                        <a:cs typeface="Calibri" panose="020F0502020204030204" pitchFamily="34" charset="0"/>
                       </a:endParaRPr>
                     </a:p>
                   </a:txBody>
@@ -9839,7 +9861,7 @@
                   </a:ext>
                 </a:extLst>
               </a:tr>
-              <a:tr h="145655">
+              <a:tr h="144769">
                 <a:tc gridSpan="6">
                   <a:txBody>
                     <a:bodyPr/>
@@ -9863,32 +9885,35 @@
                         <a:defRPr/>
                       </a:pPr>
                       <a:r>
-                        <a:rPr lang="ru-RU" sz="800" b="1" i="0" u="none" strike="noStrike" baseline="0" dirty="0" smtClean="0">
+                        <a:rPr lang="ru-RU" sz="900" b="1" i="0" u="none" strike="noStrike" baseline="0" dirty="0" smtClean="0">
                           <a:solidFill>
                             <a:srgbClr val="000000"/>
                           </a:solidFill>
                           <a:effectLst/>
-                          <a:latin typeface="Times New Roman" panose="02020603050405020304" pitchFamily="18" charset="0"/>
+                          <a:latin typeface="Calibri" panose="020F0502020204030204" pitchFamily="34" charset="0"/>
+                          <a:cs typeface="Calibri" panose="020F0502020204030204" pitchFamily="34" charset="0"/>
                         </a:rPr>
                         <a:t>Итого </a:t>
                       </a:r>
                       <a:r>
-                        <a:rPr lang="en-US" sz="800" b="1" i="0" u="none" strike="noStrike" baseline="0" dirty="0" smtClean="0">
+                        <a:rPr lang="en-US" sz="900" b="1" i="0" u="none" strike="noStrike" baseline="0" dirty="0" smtClean="0">
                           <a:solidFill>
                             <a:srgbClr val="000000"/>
                           </a:solidFill>
                           <a:effectLst/>
-                          <a:latin typeface="Times New Roman" panose="02020603050405020304" pitchFamily="18" charset="0"/>
+                          <a:latin typeface="Calibri" panose="020F0502020204030204" pitchFamily="34" charset="0"/>
+                          <a:cs typeface="Calibri" panose="020F0502020204030204" pitchFamily="34" charset="0"/>
                         </a:rPr>
                         <a:t>3</a:t>
                       </a:r>
                       <a:r>
-                        <a:rPr lang="ru-RU" sz="800" b="1" i="0" u="none" strike="noStrike" baseline="0" dirty="0" smtClean="0">
+                        <a:rPr lang="ru-RU" sz="900" b="1" i="0" u="none" strike="noStrike" baseline="0" dirty="0" smtClean="0">
                           <a:solidFill>
                             <a:srgbClr val="000000"/>
                           </a:solidFill>
                           <a:effectLst/>
-                          <a:latin typeface="Times New Roman" panose="02020603050405020304" pitchFamily="18" charset="0"/>
+                          <a:latin typeface="Calibri" panose="020F0502020204030204" pitchFamily="34" charset="0"/>
+                          <a:cs typeface="Calibri" panose="020F0502020204030204" pitchFamily="34" charset="0"/>
                         </a:rPr>
                         <a:t>-й группы инвалидности:</a:t>
                       </a:r>
@@ -10201,23 +10226,23 @@
                     <a:p>
                       <a:pPr algn="ctr" fontAlgn="ctr"/>
                       <a:r>
-                        <a:rPr lang="ru-RU" sz="800" b="1" i="0" u="none" strike="noStrike" baseline="0" dirty="0" smtClean="0">
+                        <a:rPr lang="ru-RU" sz="900" b="1" i="0" u="none" strike="noStrike" baseline="0" dirty="0" smtClean="0">
                           <a:solidFill>
                             <a:srgbClr val="000000"/>
                           </a:solidFill>
                           <a:effectLst/>
-                          <a:latin typeface="Times New Roman" panose="02020603050405020304" pitchFamily="18" charset="0"/>
-                          <a:cs typeface="Times New Roman" panose="02020603050405020304" pitchFamily="18" charset="0"/>
+                          <a:latin typeface="Calibri" panose="020F0502020204030204" pitchFamily="34" charset="0"/>
+                          <a:cs typeface="Calibri" panose="020F0502020204030204" pitchFamily="34" charset="0"/>
                         </a:rPr>
                         <a:t>0</a:t>
                       </a:r>
-                      <a:endParaRPr lang="ru-RU" sz="800" b="1" i="0" u="none" strike="noStrike" baseline="0" dirty="0">
+                      <a:endParaRPr lang="ru-RU" sz="900" b="1" i="0" u="none" strike="noStrike" baseline="0" dirty="0">
                         <a:solidFill>
                           <a:srgbClr val="000000"/>
                         </a:solidFill>
                         <a:effectLst/>
-                        <a:latin typeface="Times New Roman" panose="02020603050405020304" pitchFamily="18" charset="0"/>
-                        <a:cs typeface="Times New Roman" panose="02020603050405020304" pitchFamily="18" charset="0"/>
+                        <a:latin typeface="Calibri" panose="020F0502020204030204" pitchFamily="34" charset="0"/>
+                        <a:cs typeface="Calibri" panose="020F0502020204030204" pitchFamily="34" charset="0"/>
                       </a:endParaRPr>
                     </a:p>
                   </a:txBody>
@@ -10274,7 +10299,7 @@
                   </a:ext>
                 </a:extLst>
               </a:tr>
-              <a:tr h="212999">
+              <a:tr h="193917">
                 <a:tc gridSpan="6">
                   <a:txBody>
                     <a:bodyPr/>
@@ -10298,52 +10323,57 @@
                         <a:defRPr/>
                       </a:pPr>
                       <a:r>
-                        <a:rPr lang="ru-RU" sz="800" b="1" i="0" u="none" strike="noStrike" dirty="0" smtClean="0">
+                        <a:rPr lang="ru-RU" sz="900" b="1" i="0" u="none" strike="noStrike" dirty="0" smtClean="0">
                           <a:solidFill>
                             <a:srgbClr val="000000"/>
                           </a:solidFill>
                           <a:effectLst/>
-                          <a:latin typeface="Times New Roman" panose="02020603050405020304" pitchFamily="18" charset="0"/>
+                          <a:latin typeface="Calibri" panose="020F0502020204030204" pitchFamily="34" charset="0"/>
+                          <a:cs typeface="Calibri" panose="020F0502020204030204" pitchFamily="34" charset="0"/>
                         </a:rPr>
                         <a:t>Итого 4-й группы инвалидности (</a:t>
                       </a:r>
                       <a:r>
-                        <a:rPr lang="ru-RU" sz="800" b="1" i="0" u="none" strike="noStrike" dirty="0" smtClean="0">
+                        <a:rPr lang="ru-RU" sz="900" b="1" i="0" u="none" strike="noStrike" dirty="0" smtClean="0">
                           <a:solidFill>
                             <a:schemeClr val="tx1"/>
                           </a:solidFill>
                           <a:effectLst/>
-                          <a:latin typeface="Times New Roman" panose="02020603050405020304" pitchFamily="18" charset="0"/>
+                          <a:latin typeface="Calibri" panose="020F0502020204030204" pitchFamily="34" charset="0"/>
+                          <a:cs typeface="Calibri" panose="020F0502020204030204" pitchFamily="34" charset="0"/>
                         </a:rPr>
                         <a:t>ребенок</a:t>
                       </a:r>
                       <a:r>
-                        <a:rPr lang="ru-RU" sz="800" b="1" i="0" u="none" strike="noStrike" baseline="0" dirty="0" smtClean="0">
+                        <a:rPr lang="ru-RU" sz="900" b="1" i="0" u="none" strike="noStrike" baseline="0" dirty="0" smtClean="0">
                           <a:solidFill>
                             <a:schemeClr val="tx1"/>
                           </a:solidFill>
                           <a:effectLst/>
-                          <a:latin typeface="Times New Roman" panose="02020603050405020304" pitchFamily="18" charset="0"/>
+                          <a:latin typeface="Calibri" panose="020F0502020204030204" pitchFamily="34" charset="0"/>
+                          <a:cs typeface="Calibri" panose="020F0502020204030204" pitchFamily="34" charset="0"/>
                         </a:rPr>
                         <a:t>-</a:t>
                       </a:r>
                       <a:r>
-                        <a:rPr lang="ru-RU" sz="800" b="1" i="0" u="none" strike="noStrike" dirty="0" smtClean="0">
+                        <a:rPr lang="ru-RU" sz="900" b="1" i="0" u="none" strike="noStrike" dirty="0" smtClean="0">
                           <a:solidFill>
                             <a:schemeClr val="tx1"/>
                           </a:solidFill>
                           <a:effectLst/>
-                          <a:latin typeface="Times New Roman" panose="02020603050405020304" pitchFamily="18" charset="0"/>
+                          <a:latin typeface="Calibri" panose="020F0502020204030204" pitchFamily="34" charset="0"/>
+                          <a:cs typeface="Calibri" panose="020F0502020204030204" pitchFamily="34" charset="0"/>
                         </a:rPr>
                         <a:t>инвалид</a:t>
                       </a:r>
                       <a:r>
-                        <a:rPr lang="ru-RU" sz="800" b="1" i="0" u="none" strike="noStrike" dirty="0" smtClean="0">
+                        <a:rPr lang="ru-RU" sz="900" b="1" i="0" u="none" strike="noStrike" dirty="0" smtClean="0">
                           <a:solidFill>
                             <a:srgbClr val="000000"/>
                           </a:solidFill>
                           <a:effectLst/>
-                          <a:latin typeface="Times New Roman" panose="02020603050405020304" pitchFamily="18" charset="0"/>
+                          <a:latin typeface="Calibri" panose="020F0502020204030204" pitchFamily="34" charset="0"/>
+                          <a:cs typeface="Calibri" panose="020F0502020204030204" pitchFamily="34" charset="0"/>
                         </a:rPr>
                         <a:t>):</a:t>
                       </a:r>
@@ -10656,23 +10686,23 @@
                     <a:p>
                       <a:pPr algn="ctr" fontAlgn="ctr"/>
                       <a:r>
-                        <a:rPr lang="ru-RU" sz="800" b="1" i="0" u="none" strike="noStrike" dirty="0" smtClean="0">
+                        <a:rPr lang="ru-RU" sz="900" b="1" i="0" u="none" strike="noStrike" dirty="0" smtClean="0">
                           <a:solidFill>
                             <a:srgbClr val="000000"/>
                           </a:solidFill>
                           <a:effectLst/>
-                          <a:latin typeface="Times New Roman" panose="02020603050405020304" pitchFamily="18" charset="0"/>
-                          <a:cs typeface="Times New Roman" panose="02020603050405020304" pitchFamily="18" charset="0"/>
+                          <a:latin typeface="Calibri" panose="020F0502020204030204" pitchFamily="34" charset="0"/>
+                          <a:cs typeface="Calibri" panose="020F0502020204030204" pitchFamily="34" charset="0"/>
                         </a:rPr>
                         <a:t>0</a:t>
                       </a:r>
-                      <a:endParaRPr lang="ru-RU" sz="800" b="1" i="0" u="none" strike="noStrike" dirty="0">
+                      <a:endParaRPr lang="ru-RU" sz="900" b="1" i="0" u="none" strike="noStrike" dirty="0">
                         <a:solidFill>
                           <a:srgbClr val="000000"/>
                         </a:solidFill>
                         <a:effectLst/>
-                        <a:latin typeface="Times New Roman" panose="02020603050405020304" pitchFamily="18" charset="0"/>
-                        <a:cs typeface="Times New Roman" panose="02020603050405020304" pitchFamily="18" charset="0"/>
+                        <a:latin typeface="Calibri" panose="020F0502020204030204" pitchFamily="34" charset="0"/>
+                        <a:cs typeface="Calibri" panose="020F0502020204030204" pitchFamily="34" charset="0"/>
                       </a:endParaRPr>
                     </a:p>
                   </a:txBody>
@@ -10741,7 +10771,7 @@
         </p:nvSpPr>
         <p:spPr>
           <a:xfrm>
-            <a:off x="6878854" y="7328340"/>
+            <a:off x="6761054" y="6851262"/>
             <a:ext cx="5867087" cy="487569"/>
           </a:xfrm>
           <a:prstGeom prst="rect">
@@ -10814,42 +10844,42 @@
           <p:nvPr>
             <p:extLst>
               <p:ext uri="{D42A27DB-BD31-4B8C-83A1-F6EECF244321}">
-                <p14:modId xmlns:p14="http://schemas.microsoft.com/office/powerpoint/2010/main" val="962302302"/>
+                <p14:modId xmlns:p14="http://schemas.microsoft.com/office/powerpoint/2010/main" val="3501707384"/>
               </p:ext>
             </p:extLst>
           </p:nvPr>
         </p:nvGraphicFramePr>
         <p:xfrm>
-          <a:off x="6749248" y="7815909"/>
-          <a:ext cx="5867087" cy="745739"/>
+          <a:off x="6761054" y="7338831"/>
+          <a:ext cx="5768329" cy="787732"/>
         </p:xfrm>
         <a:graphic>
           <a:graphicData uri="http://schemas.openxmlformats.org/drawingml/2006/table">
             <a:tbl>
               <a:tblPr/>
               <a:tblGrid>
-                <a:gridCol w="387083">
+                <a:gridCol w="380567">
                   <a:extLst>
                     <a:ext uri="{9D8B030D-6E8A-4147-A177-3AD203B41FA5}">
                       <a16:colId xmlns="" xmlns:a16="http://schemas.microsoft.com/office/drawing/2014/main" val="20000"/>
                     </a:ext>
                   </a:extLst>
                 </a:gridCol>
-                <a:gridCol w="2335128">
+                <a:gridCol w="2295822">
                   <a:extLst>
                     <a:ext uri="{9D8B030D-6E8A-4147-A177-3AD203B41FA5}">
                       <a16:colId xmlns="" xmlns:a16="http://schemas.microsoft.com/office/drawing/2014/main" val="20001"/>
                     </a:ext>
                   </a:extLst>
                 </a:gridCol>
-                <a:gridCol w="1974290">
+                <a:gridCol w="1941058">
                   <a:extLst>
                     <a:ext uri="{9D8B030D-6E8A-4147-A177-3AD203B41FA5}">
                       <a16:colId xmlns="" xmlns:a16="http://schemas.microsoft.com/office/drawing/2014/main" val="20002"/>
                     </a:ext>
                   </a:extLst>
                 </a:gridCol>
-                <a:gridCol w="1170586">
+                <a:gridCol w="1150882">
                   <a:extLst>
                     <a:ext uri="{9D8B030D-6E8A-4147-A177-3AD203B41FA5}">
                       <a16:colId xmlns="" xmlns:a16="http://schemas.microsoft.com/office/drawing/2014/main" val="20003"/>
@@ -10865,12 +10895,13 @@
                     <a:p>
                       <a:pPr algn="ctr" fontAlgn="ctr"/>
                       <a:r>
-                        <a:rPr lang="ru-RU" sz="800" b="1" i="0" u="none" strike="noStrike" baseline="0" dirty="0" smtClean="0">
+                        <a:rPr lang="ru-RU" sz="900" b="1" i="0" u="none" strike="noStrike" baseline="0" dirty="0" smtClean="0">
                           <a:solidFill>
                             <a:srgbClr val="000000"/>
                           </a:solidFill>
                           <a:effectLst/>
-                          <a:latin typeface="Times New Roman" panose="02020603050405020304" pitchFamily="18" charset="0"/>
+                          <a:latin typeface="Calibri" panose="020F0502020204030204" pitchFamily="34" charset="0"/>
+                          <a:cs typeface="Calibri" panose="020F0502020204030204" pitchFamily="34" charset="0"/>
                         </a:rPr>
                         <a:t>№</a:t>
                       </a:r>
@@ -10878,21 +10909,23 @@
                     <a:p>
                       <a:pPr algn="ctr" fontAlgn="ctr"/>
                       <a:r>
-                        <a:rPr lang="ru-RU" sz="800" b="1" i="0" u="none" strike="noStrike" baseline="0" dirty="0" smtClean="0">
+                        <a:rPr lang="ru-RU" sz="900" b="1" i="0" u="none" strike="noStrike" baseline="0" dirty="0" smtClean="0">
                           <a:solidFill>
                             <a:srgbClr val="000000"/>
                           </a:solidFill>
                           <a:effectLst/>
-                          <a:latin typeface="Times New Roman" panose="02020603050405020304" pitchFamily="18" charset="0"/>
+                          <a:latin typeface="Calibri" panose="020F0502020204030204" pitchFamily="34" charset="0"/>
+                          <a:cs typeface="Calibri" panose="020F0502020204030204" pitchFamily="34" charset="0"/>
                         </a:rPr>
                         <a:t>п/п</a:t>
                       </a:r>
-                      <a:endParaRPr lang="ru-RU" sz="800" b="1" i="0" u="none" strike="noStrike" baseline="0" dirty="0">
+                      <a:endParaRPr lang="ru-RU" sz="900" b="1" i="0" u="none" strike="noStrike" baseline="0" dirty="0">
                         <a:solidFill>
                           <a:srgbClr val="000000"/>
                         </a:solidFill>
                         <a:effectLst/>
-                        <a:latin typeface="Times New Roman" panose="02020603050405020304" pitchFamily="18" charset="0"/>
+                        <a:latin typeface="Calibri" panose="020F0502020204030204" pitchFamily="34" charset="0"/>
+                        <a:cs typeface="Calibri" panose="020F0502020204030204" pitchFamily="34" charset="0"/>
                       </a:endParaRPr>
                     </a:p>
                   </a:txBody>
@@ -10955,12 +10988,13 @@
                     <a:p>
                       <a:pPr algn="ctr" fontAlgn="ctr"/>
                       <a:r>
-                        <a:rPr lang="ru-RU" sz="800" b="1" i="0" u="none" strike="noStrike" baseline="0" dirty="0">
+                        <a:rPr lang="ru-RU" sz="900" b="1" i="0" u="none" strike="noStrike" baseline="0" dirty="0">
                           <a:solidFill>
                             <a:srgbClr val="000000"/>
                           </a:solidFill>
                           <a:effectLst/>
-                          <a:latin typeface="Times New Roman" panose="02020603050405020304" pitchFamily="18" charset="0"/>
+                          <a:latin typeface="Calibri" panose="020F0502020204030204" pitchFamily="34" charset="0"/>
+                          <a:cs typeface="Calibri" panose="020F0502020204030204" pitchFamily="34" charset="0"/>
                         </a:rPr>
                         <a:t>Адрес</a:t>
                       </a:r>
@@ -11025,21 +11059,23 @@
                     <a:p>
                       <a:pPr algn="ctr" fontAlgn="ctr"/>
                       <a:r>
-                        <a:rPr lang="ru-RU" sz="800" b="1" i="0" u="none" strike="noStrike" baseline="0" dirty="0" smtClean="0">
+                        <a:rPr lang="ru-RU" sz="900" b="1" i="0" u="none" strike="noStrike" baseline="0" dirty="0" smtClean="0">
                           <a:solidFill>
                             <a:srgbClr val="000000"/>
                           </a:solidFill>
                           <a:effectLst/>
-                          <a:latin typeface="Times New Roman" panose="02020603050405020304" pitchFamily="18" charset="0"/>
+                          <a:latin typeface="Calibri" panose="020F0502020204030204" pitchFamily="34" charset="0"/>
+                          <a:cs typeface="Calibri" panose="020F0502020204030204" pitchFamily="34" charset="0"/>
                         </a:rPr>
                         <a:t>Правообладатель</a:t>
                       </a:r>
-                      <a:endParaRPr lang="ru-RU" sz="800" b="1" i="0" u="none" strike="noStrike" baseline="0" dirty="0">
+                      <a:endParaRPr lang="ru-RU" sz="900" b="1" i="0" u="none" strike="noStrike" baseline="0" dirty="0">
                         <a:solidFill>
                           <a:srgbClr val="000000"/>
                         </a:solidFill>
                         <a:effectLst/>
-                        <a:latin typeface="Times New Roman" panose="02020603050405020304" pitchFamily="18" charset="0"/>
+                        <a:latin typeface="Calibri" panose="020F0502020204030204" pitchFamily="34" charset="0"/>
+                        <a:cs typeface="Calibri" panose="020F0502020204030204" pitchFamily="34" charset="0"/>
                       </a:endParaRPr>
                     </a:p>
                   </a:txBody>
@@ -11102,21 +11138,23 @@
                     <a:p>
                       <a:pPr algn="ctr" fontAlgn="ctr"/>
                       <a:r>
-                        <a:rPr lang="ru-RU" sz="800" b="1" i="0" u="none" strike="noStrike" baseline="0" dirty="0" smtClean="0">
+                        <a:rPr lang="ru-RU" sz="900" b="1" i="0" u="none" strike="noStrike" baseline="0" dirty="0" smtClean="0">
                           <a:solidFill>
                             <a:srgbClr val="000000"/>
                           </a:solidFill>
                           <a:effectLst/>
-                          <a:latin typeface="Times New Roman" panose="02020603050405020304" pitchFamily="18" charset="0"/>
+                          <a:latin typeface="Calibri" panose="020F0502020204030204" pitchFamily="34" charset="0"/>
+                          <a:cs typeface="Calibri" panose="020F0502020204030204" pitchFamily="34" charset="0"/>
                         </a:rPr>
                         <a:t>Площадь помещений, кв. м.</a:t>
                       </a:r>
-                      <a:endParaRPr lang="ru-RU" sz="800" b="1" i="0" u="none" strike="noStrike" baseline="0" dirty="0">
+                      <a:endParaRPr lang="ru-RU" sz="900" b="1" i="0" u="none" strike="noStrike" baseline="0" dirty="0">
                         <a:solidFill>
                           <a:srgbClr val="000000"/>
                         </a:solidFill>
                         <a:effectLst/>
-                        <a:latin typeface="Times New Roman" panose="02020603050405020304" pitchFamily="18" charset="0"/>
+                        <a:latin typeface="Calibri" panose="020F0502020204030204" pitchFamily="34" charset="0"/>
+                        <a:cs typeface="Calibri" panose="020F0502020204030204" pitchFamily="34" charset="0"/>
                       </a:endParaRPr>
                     </a:p>
                   </a:txBody>
@@ -11186,23 +11224,23 @@
                     <a:p>
                       <a:pPr algn="ctr" fontAlgn="ctr"/>
                       <a:r>
-                        <a:rPr lang="en-US" sz="800" b="0" i="0" u="none" strike="noStrike" baseline="0" dirty="0" smtClean="0">
+                        <a:rPr lang="en-US" sz="900" b="0" i="0" u="none" strike="noStrike" baseline="0" dirty="0" smtClean="0">
                           <a:solidFill>
                             <a:srgbClr val="000000"/>
                           </a:solidFill>
                           <a:effectLst/>
-                          <a:latin typeface="Times New Roman" panose="02020603050405020304" pitchFamily="18" charset="0"/>
-                          <a:cs typeface="Times New Roman" panose="02020603050405020304" pitchFamily="18" charset="0"/>
+                          <a:latin typeface="Calibri" panose="020F0502020204030204" pitchFamily="34" charset="0"/>
+                          <a:cs typeface="Calibri" panose="020F0502020204030204" pitchFamily="34" charset="0"/>
                         </a:rPr>
                         <a:t>1</a:t>
                       </a:r>
-                      <a:endParaRPr lang="ru-RU" sz="800" b="0" i="0" u="none" strike="noStrike" baseline="0" dirty="0">
+                      <a:endParaRPr lang="ru-RU" sz="900" b="0" i="0" u="none" strike="noStrike" baseline="0" dirty="0">
                         <a:solidFill>
                           <a:srgbClr val="000000"/>
                         </a:solidFill>
                         <a:effectLst/>
-                        <a:latin typeface="Times New Roman" panose="02020603050405020304" pitchFamily="18" charset="0"/>
-                        <a:cs typeface="Times New Roman" panose="02020603050405020304" pitchFamily="18" charset="0"/>
+                        <a:latin typeface="Calibri" panose="020F0502020204030204" pitchFamily="34" charset="0"/>
+                        <a:cs typeface="Calibri" panose="020F0502020204030204" pitchFamily="34" charset="0"/>
                       </a:endParaRPr>
                     </a:p>
                   </a:txBody>
@@ -11267,25 +11305,25 @@
                         </a:spcAft>
                       </a:pPr>
                       <a:r>
-                        <a:rPr lang="ru-RU" sz="800" baseline="0" dirty="0" smtClean="0">
+                        <a:rPr lang="ru-RU" sz="900" baseline="0" dirty="0" smtClean="0">
                           <a:solidFill>
                             <a:schemeClr val="tx1"/>
                           </a:solidFill>
                           <a:effectLst/>
-                          <a:latin typeface="Times New Roman" panose="02020603050405020304" pitchFamily="18" charset="0"/>
+                          <a:latin typeface="Calibri" panose="020F0502020204030204" pitchFamily="34" charset="0"/>
                           <a:ea typeface="Calibri" panose="020F0502020204030204" pitchFamily="34" charset="0"/>
-                          <a:cs typeface="Times New Roman" panose="02020603050405020304" pitchFamily="18" charset="0"/>
+                          <a:cs typeface="Calibri" panose="020F0502020204030204" pitchFamily="34" charset="0"/>
                         </a:rPr>
                         <a:t>тест</a:t>
                       </a:r>
-                      <a:endParaRPr lang="ru-RU" sz="800" baseline="0" dirty="0">
+                      <a:endParaRPr lang="ru-RU" sz="900" baseline="0" dirty="0">
                         <a:solidFill>
                           <a:schemeClr val="tx1"/>
                         </a:solidFill>
                         <a:effectLst/>
-                        <a:latin typeface="Times New Roman" panose="02020603050405020304" pitchFamily="18" charset="0"/>
+                        <a:latin typeface="Calibri" panose="020F0502020204030204" pitchFamily="34" charset="0"/>
                         <a:ea typeface="Calibri" panose="020F0502020204030204" pitchFamily="34" charset="0"/>
-                        <a:cs typeface="Times New Roman" panose="02020603050405020304" pitchFamily="18" charset="0"/>
+                        <a:cs typeface="Calibri" panose="020F0502020204030204" pitchFamily="34" charset="0"/>
                       </a:endParaRPr>
                     </a:p>
                   </a:txBody>
@@ -11343,23 +11381,23 @@
                     <a:p>
                       <a:pPr algn="ctr" fontAlgn="ctr"/>
                       <a:r>
-                        <a:rPr lang="ru-RU" sz="800" b="0" i="0" u="none" strike="noStrike" baseline="0" dirty="0" smtClean="0">
+                        <a:rPr lang="ru-RU" sz="900" b="0" i="0" u="none" strike="noStrike" baseline="0" dirty="0" smtClean="0">
                           <a:solidFill>
                             <a:srgbClr val="000000"/>
                           </a:solidFill>
                           <a:effectLst/>
-                          <a:latin typeface="Times New Roman" panose="02020603050405020304" pitchFamily="18" charset="0"/>
-                          <a:cs typeface="Times New Roman" panose="02020603050405020304" pitchFamily="18" charset="0"/>
+                          <a:latin typeface="Calibri" panose="020F0502020204030204" pitchFamily="34" charset="0"/>
+                          <a:cs typeface="Calibri" panose="020F0502020204030204" pitchFamily="34" charset="0"/>
                         </a:rPr>
                         <a:t>тест</a:t>
                       </a:r>
-                      <a:endParaRPr lang="ru-RU" sz="800" b="0" i="0" u="none" strike="noStrike" baseline="0" dirty="0">
+                      <a:endParaRPr lang="ru-RU" sz="900" b="0" i="0" u="none" strike="noStrike" baseline="0" dirty="0">
                         <a:solidFill>
                           <a:srgbClr val="000000"/>
                         </a:solidFill>
                         <a:effectLst/>
-                        <a:latin typeface="Times New Roman" panose="02020603050405020304" pitchFamily="18" charset="0"/>
-                        <a:cs typeface="Times New Roman" panose="02020603050405020304" pitchFamily="18" charset="0"/>
+                        <a:latin typeface="Calibri" panose="020F0502020204030204" pitchFamily="34" charset="0"/>
+                        <a:cs typeface="Calibri" panose="020F0502020204030204" pitchFamily="34" charset="0"/>
                       </a:endParaRPr>
                     </a:p>
                   </a:txBody>
@@ -11417,23 +11455,23 @@
                     <a:p>
                       <a:pPr algn="ctr" fontAlgn="ctr"/>
                       <a:r>
-                        <a:rPr lang="ru-RU" sz="800" b="0" i="0" u="none" strike="noStrike" baseline="0" dirty="0" smtClean="0">
+                        <a:rPr lang="ru-RU" sz="900" b="0" i="0" u="none" strike="noStrike" baseline="0" dirty="0" smtClean="0">
                           <a:solidFill>
                             <a:srgbClr val="000000"/>
                           </a:solidFill>
                           <a:effectLst/>
-                          <a:latin typeface="Times New Roman" panose="02020603050405020304" pitchFamily="18" charset="0"/>
-                          <a:cs typeface="Times New Roman" panose="02020603050405020304" pitchFamily="18" charset="0"/>
+                          <a:latin typeface="Calibri" panose="020F0502020204030204" pitchFamily="34" charset="0"/>
+                          <a:cs typeface="Calibri" panose="020F0502020204030204" pitchFamily="34" charset="0"/>
                         </a:rPr>
                         <a:t>0.00</a:t>
                       </a:r>
-                      <a:endParaRPr lang="ru-RU" sz="800" b="0" i="0" u="none" strike="noStrike" baseline="0" dirty="0">
+                      <a:endParaRPr lang="ru-RU" sz="900" b="0" i="0" u="none" strike="noStrike" baseline="0" dirty="0">
                         <a:solidFill>
                           <a:srgbClr val="000000"/>
                         </a:solidFill>
                         <a:effectLst/>
-                        <a:latin typeface="Times New Roman" panose="02020603050405020304" pitchFamily="18" charset="0"/>
-                        <a:cs typeface="Times New Roman" panose="02020603050405020304" pitchFamily="18" charset="0"/>
+                        <a:latin typeface="Calibri" panose="020F0502020204030204" pitchFamily="34" charset="0"/>
+                        <a:cs typeface="Calibri" panose="020F0502020204030204" pitchFamily="34" charset="0"/>
                       </a:endParaRPr>
                     </a:p>
                   </a:txBody>
@@ -11498,23 +11536,23 @@
                     <a:p>
                       <a:pPr algn="ctr" fontAlgn="ctr"/>
                       <a:r>
-                        <a:rPr lang="ru-RU" sz="800" b="0" i="0" u="none" strike="noStrike" dirty="0" smtClean="0">
+                        <a:rPr lang="ru-RU" sz="900" b="0" i="0" u="none" strike="noStrike" dirty="0" smtClean="0">
                           <a:solidFill>
                             <a:srgbClr val="000000"/>
                           </a:solidFill>
                           <a:effectLst/>
-                          <a:latin typeface="Times New Roman" panose="02020603050405020304" pitchFamily="18" charset="0"/>
-                          <a:cs typeface="Times New Roman" panose="02020603050405020304" pitchFamily="18" charset="0"/>
+                          <a:latin typeface="Calibri" panose="020F0502020204030204" pitchFamily="34" charset="0"/>
+                          <a:cs typeface="Calibri" panose="020F0502020204030204" pitchFamily="34" charset="0"/>
                         </a:rPr>
                         <a:t>тест</a:t>
                       </a:r>
-                      <a:endParaRPr lang="ru-RU" sz="800" b="0" i="0" u="none" strike="noStrike" dirty="0">
+                      <a:endParaRPr lang="ru-RU" sz="900" b="0" i="0" u="none" strike="noStrike" dirty="0">
                         <a:solidFill>
                           <a:srgbClr val="000000"/>
                         </a:solidFill>
                         <a:effectLst/>
-                        <a:latin typeface="Times New Roman" panose="02020603050405020304" pitchFamily="18" charset="0"/>
-                        <a:cs typeface="Times New Roman" panose="02020603050405020304" pitchFamily="18" charset="0"/>
+                        <a:latin typeface="Calibri" panose="020F0502020204030204" pitchFamily="34" charset="0"/>
+                        <a:cs typeface="Calibri" panose="020F0502020204030204" pitchFamily="34" charset="0"/>
                       </a:endParaRPr>
                     </a:p>
                   </a:txBody>
@@ -11790,14 +11828,14 @@
                         <a:defRPr/>
                       </a:pPr>
                       <a:r>
-                        <a:rPr lang="ru-RU" sz="800" b="1" kern="1200" baseline="0" dirty="0" smtClean="0">
+                        <a:rPr lang="ru-RU" sz="900" b="1" kern="1200" baseline="0" dirty="0" smtClean="0">
                           <a:solidFill>
                             <a:srgbClr val="000000"/>
                           </a:solidFill>
                           <a:effectLst/>
-                          <a:latin typeface="Times New Roman" panose="02020603050405020304" pitchFamily="18" charset="0"/>
+                          <a:latin typeface="Calibri" panose="020F0502020204030204" pitchFamily="34" charset="0"/>
                           <a:ea typeface="Times New Roman" panose="02020603050405020304" pitchFamily="18" charset="0"/>
-                          <a:cs typeface="Times New Roman" panose="02020603050405020304" pitchFamily="18" charset="0"/>
+                          <a:cs typeface="Calibri" panose="020F0502020204030204" pitchFamily="34" charset="0"/>
                         </a:rPr>
                         <a:t>ИТОГО:  </a:t>
                       </a:r>
@@ -11945,25 +11983,25 @@
                         </a:spcAft>
                       </a:pPr>
                       <a:r>
-                        <a:rPr lang="ru-RU" sz="800" b="1" kern="1200" baseline="0" dirty="0" smtClean="0">
+                        <a:rPr lang="ru-RU" sz="900" b="1" kern="1200" baseline="0" dirty="0" smtClean="0">
                           <a:solidFill>
                             <a:srgbClr val="000000"/>
                           </a:solidFill>
                           <a:effectLst/>
-                          <a:latin typeface="Times New Roman" panose="02020603050405020304" pitchFamily="18" charset="0"/>
+                          <a:latin typeface="Calibri" panose="020F0502020204030204" pitchFamily="34" charset="0"/>
                           <a:ea typeface="Times New Roman" panose="02020603050405020304" pitchFamily="18" charset="0"/>
-                          <a:cs typeface="Times New Roman" panose="02020603050405020304" pitchFamily="18" charset="0"/>
+                          <a:cs typeface="Calibri" panose="020F0502020204030204" pitchFamily="34" charset="0"/>
                         </a:rPr>
                         <a:t>0.00</a:t>
                       </a:r>
-                      <a:endParaRPr lang="ru-RU" sz="800" b="1" kern="1200" baseline="0" dirty="0">
+                      <a:endParaRPr lang="ru-RU" sz="900" b="1" kern="1200" baseline="0" dirty="0">
                         <a:solidFill>
                           <a:srgbClr val="000000"/>
                         </a:solidFill>
                         <a:effectLst/>
-                        <a:latin typeface="Times New Roman" panose="02020603050405020304" pitchFamily="18" charset="0"/>
+                        <a:latin typeface="Calibri" panose="020F0502020204030204" pitchFamily="34" charset="0"/>
                         <a:ea typeface="Times New Roman" panose="02020603050405020304" pitchFamily="18" charset="0"/>
-                        <a:cs typeface="Times New Roman" panose="02020603050405020304" pitchFamily="18" charset="0"/>
+                        <a:cs typeface="Calibri" panose="020F0502020204030204" pitchFamily="34" charset="0"/>
                       </a:endParaRPr>
                     </a:p>
                   </a:txBody>

</xml_diff>